<commit_message>
added comments to presentation
</commit_message>
<xml_diff>
--- a/reports/presentation_custom_design.pptx
+++ b/reports/presentation_custom_design.pptx
@@ -4,6 +4,9 @@
   <p:sldMasterIdLst>
     <p:sldMasterId id="2147483660" r:id="rId1"/>
   </p:sldMasterIdLst>
+  <p:notesMasterIdLst>
+    <p:notesMasterId r:id="rId29"/>
+  </p:notesMasterIdLst>
   <p:sldIdLst>
     <p:sldId id="256" r:id="rId2"/>
     <p:sldId id="257" r:id="rId3"/>
@@ -147,6 +150,3588 @@
     </p:ext>
   </p:extLst>
 </p:presentation>
+</file>
+
+<file path=ppt/notesMasters/notesMaster1.xml><?xml version="1.0" encoding="utf-8"?>
+<p:notesMaster xmlns:a="http://schemas.openxmlformats.org/drawingml/2006/main" xmlns:r="http://schemas.openxmlformats.org/officeDocument/2006/relationships" xmlns:p="http://schemas.openxmlformats.org/presentationml/2006/main">
+  <p:cSld>
+    <p:bg>
+      <p:bgRef idx="1001">
+        <a:schemeClr val="bg1"/>
+      </p:bgRef>
+    </p:bg>
+    <p:spTree>
+      <p:nvGrpSpPr>
+        <p:cNvPr id="1" name=""/>
+        <p:cNvGrpSpPr/>
+        <p:nvPr/>
+      </p:nvGrpSpPr>
+      <p:grpSpPr>
+        <a:xfrm>
+          <a:off x="0" y="0"/>
+          <a:ext cx="0" cy="0"/>
+          <a:chOff x="0" y="0"/>
+          <a:chExt cx="0" cy="0"/>
+        </a:xfrm>
+      </p:grpSpPr>
+      <p:sp>
+        <p:nvSpPr>
+          <p:cNvPr id="2" name="Kopfzeilenplatzhalter 1"/>
+          <p:cNvSpPr>
+            <a:spLocks noGrp="1"/>
+          </p:cNvSpPr>
+          <p:nvPr>
+            <p:ph type="hdr" sz="quarter"/>
+          </p:nvPr>
+        </p:nvSpPr>
+        <p:spPr>
+          <a:xfrm>
+            <a:off x="0" y="0"/>
+            <a:ext cx="2971800" cy="458788"/>
+          </a:xfrm>
+          <a:prstGeom prst="rect">
+            <a:avLst/>
+          </a:prstGeom>
+        </p:spPr>
+        <p:txBody>
+          <a:bodyPr vert="horz" lIns="91440" tIns="45720" rIns="91440" bIns="45720" rtlCol="0"/>
+          <a:lstStyle>
+            <a:lvl1pPr algn="l">
+              <a:defRPr sz="1200"/>
+            </a:lvl1pPr>
+          </a:lstStyle>
+          <a:p>
+            <a:endParaRPr lang="de-DE"/>
+          </a:p>
+        </p:txBody>
+      </p:sp>
+      <p:sp>
+        <p:nvSpPr>
+          <p:cNvPr id="3" name="Datumsplatzhalter 2"/>
+          <p:cNvSpPr>
+            <a:spLocks noGrp="1"/>
+          </p:cNvSpPr>
+          <p:nvPr>
+            <p:ph type="dt" idx="1"/>
+          </p:nvPr>
+        </p:nvSpPr>
+        <p:spPr>
+          <a:xfrm>
+            <a:off x="3884613" y="0"/>
+            <a:ext cx="2971800" cy="458788"/>
+          </a:xfrm>
+          <a:prstGeom prst="rect">
+            <a:avLst/>
+          </a:prstGeom>
+        </p:spPr>
+        <p:txBody>
+          <a:bodyPr vert="horz" lIns="91440" tIns="45720" rIns="91440" bIns="45720" rtlCol="0"/>
+          <a:lstStyle>
+            <a:lvl1pPr algn="r">
+              <a:defRPr sz="1200"/>
+            </a:lvl1pPr>
+          </a:lstStyle>
+          <a:p>
+            <a:fld id="{0D87E4E2-F149-48B3-92A5-03CD5A3CFF01}" type="datetimeFigureOut">
+              <a:rPr lang="de-DE" smtClean="0"/>
+              <a:t>10.05.2022</a:t>
+            </a:fld>
+            <a:endParaRPr lang="de-DE"/>
+          </a:p>
+        </p:txBody>
+      </p:sp>
+      <p:sp>
+        <p:nvSpPr>
+          <p:cNvPr id="4" name="Folienbildplatzhalter 3"/>
+          <p:cNvSpPr>
+            <a:spLocks noGrp="1" noRot="1" noChangeAspect="1"/>
+          </p:cNvSpPr>
+          <p:nvPr>
+            <p:ph type="sldImg" idx="2"/>
+          </p:nvPr>
+        </p:nvSpPr>
+        <p:spPr>
+          <a:xfrm>
+            <a:off x="685800" y="1143000"/>
+            <a:ext cx="5486400" cy="3086100"/>
+          </a:xfrm>
+          <a:prstGeom prst="rect">
+            <a:avLst/>
+          </a:prstGeom>
+          <a:noFill/>
+          <a:ln w="12700">
+            <a:solidFill>
+              <a:prstClr val="black"/>
+            </a:solidFill>
+          </a:ln>
+        </p:spPr>
+        <p:txBody>
+          <a:bodyPr vert="horz" lIns="91440" tIns="45720" rIns="91440" bIns="45720" rtlCol="0" anchor="ctr"/>
+          <a:lstStyle/>
+          <a:p>
+            <a:endParaRPr lang="de-DE"/>
+          </a:p>
+        </p:txBody>
+      </p:sp>
+      <p:sp>
+        <p:nvSpPr>
+          <p:cNvPr id="5" name="Notizenplatzhalter 4"/>
+          <p:cNvSpPr>
+            <a:spLocks noGrp="1"/>
+          </p:cNvSpPr>
+          <p:nvPr>
+            <p:ph type="body" sz="quarter" idx="3"/>
+          </p:nvPr>
+        </p:nvSpPr>
+        <p:spPr>
+          <a:xfrm>
+            <a:off x="685800" y="4400550"/>
+            <a:ext cx="5486400" cy="3600450"/>
+          </a:xfrm>
+          <a:prstGeom prst="rect">
+            <a:avLst/>
+          </a:prstGeom>
+        </p:spPr>
+        <p:txBody>
+          <a:bodyPr vert="horz" lIns="91440" tIns="45720" rIns="91440" bIns="45720" rtlCol="0"/>
+          <a:lstStyle/>
+          <a:p>
+            <a:pPr lvl="0"/>
+            <a:r>
+              <a:rPr lang="de-DE"/>
+              <a:t>Mastertextformat bearbeiten</a:t>
+            </a:r>
+          </a:p>
+          <a:p>
+            <a:pPr lvl="1"/>
+            <a:r>
+              <a:rPr lang="de-DE"/>
+              <a:t>Zweite Ebene</a:t>
+            </a:r>
+          </a:p>
+          <a:p>
+            <a:pPr lvl="2"/>
+            <a:r>
+              <a:rPr lang="de-DE"/>
+              <a:t>Dritte Ebene</a:t>
+            </a:r>
+          </a:p>
+          <a:p>
+            <a:pPr lvl="3"/>
+            <a:r>
+              <a:rPr lang="de-DE"/>
+              <a:t>Vierte Ebene</a:t>
+            </a:r>
+          </a:p>
+          <a:p>
+            <a:pPr lvl="4"/>
+            <a:r>
+              <a:rPr lang="de-DE"/>
+              <a:t>Fünfte Ebene</a:t>
+            </a:r>
+          </a:p>
+        </p:txBody>
+      </p:sp>
+      <p:sp>
+        <p:nvSpPr>
+          <p:cNvPr id="6" name="Fußzeilenplatzhalter 5"/>
+          <p:cNvSpPr>
+            <a:spLocks noGrp="1"/>
+          </p:cNvSpPr>
+          <p:nvPr>
+            <p:ph type="ftr" sz="quarter" idx="4"/>
+          </p:nvPr>
+        </p:nvSpPr>
+        <p:spPr>
+          <a:xfrm>
+            <a:off x="0" y="8685213"/>
+            <a:ext cx="2971800" cy="458787"/>
+          </a:xfrm>
+          <a:prstGeom prst="rect">
+            <a:avLst/>
+          </a:prstGeom>
+        </p:spPr>
+        <p:txBody>
+          <a:bodyPr vert="horz" lIns="91440" tIns="45720" rIns="91440" bIns="45720" rtlCol="0" anchor="b"/>
+          <a:lstStyle>
+            <a:lvl1pPr algn="l">
+              <a:defRPr sz="1200"/>
+            </a:lvl1pPr>
+          </a:lstStyle>
+          <a:p>
+            <a:endParaRPr lang="de-DE"/>
+          </a:p>
+        </p:txBody>
+      </p:sp>
+      <p:sp>
+        <p:nvSpPr>
+          <p:cNvPr id="7" name="Foliennummernplatzhalter 6"/>
+          <p:cNvSpPr>
+            <a:spLocks noGrp="1"/>
+          </p:cNvSpPr>
+          <p:nvPr>
+            <p:ph type="sldNum" sz="quarter" idx="5"/>
+          </p:nvPr>
+        </p:nvSpPr>
+        <p:spPr>
+          <a:xfrm>
+            <a:off x="3884613" y="8685213"/>
+            <a:ext cx="2971800" cy="458787"/>
+          </a:xfrm>
+          <a:prstGeom prst="rect">
+            <a:avLst/>
+          </a:prstGeom>
+        </p:spPr>
+        <p:txBody>
+          <a:bodyPr vert="horz" lIns="91440" tIns="45720" rIns="91440" bIns="45720" rtlCol="0" anchor="b"/>
+          <a:lstStyle>
+            <a:lvl1pPr algn="r">
+              <a:defRPr sz="1200"/>
+            </a:lvl1pPr>
+          </a:lstStyle>
+          <a:p>
+            <a:fld id="{AB73F393-EB1A-4CCE-B775-A92EAEF2FC41}" type="slidenum">
+              <a:rPr lang="de-DE" smtClean="0"/>
+              <a:t>‹Nr.›</a:t>
+            </a:fld>
+            <a:endParaRPr lang="de-DE"/>
+          </a:p>
+        </p:txBody>
+      </p:sp>
+    </p:spTree>
+    <p:extLst>
+      <p:ext uri="{BB962C8B-B14F-4D97-AF65-F5344CB8AC3E}">
+        <p14:creationId xmlns:p14="http://schemas.microsoft.com/office/powerpoint/2010/main" val="2287220543"/>
+      </p:ext>
+    </p:extLst>
+  </p:cSld>
+  <p:clrMap bg1="lt1" tx1="dk1" bg2="lt2" tx2="dk2" accent1="accent1" accent2="accent2" accent3="accent3" accent4="accent4" accent5="accent5" accent6="accent6" hlink="hlink" folHlink="folHlink"/>
+  <p:notesStyle>
+    <a:lvl1pPr marL="0" algn="l" defTabSz="914400" rtl="0" eaLnBrk="1" latinLnBrk="0" hangingPunct="1">
+      <a:defRPr sz="1200" kern="1200">
+        <a:solidFill>
+          <a:schemeClr val="tx1"/>
+        </a:solidFill>
+        <a:latin typeface="+mn-lt"/>
+        <a:ea typeface="+mn-ea"/>
+        <a:cs typeface="+mn-cs"/>
+      </a:defRPr>
+    </a:lvl1pPr>
+    <a:lvl2pPr marL="457200" algn="l" defTabSz="914400" rtl="0" eaLnBrk="1" latinLnBrk="0" hangingPunct="1">
+      <a:defRPr sz="1200" kern="1200">
+        <a:solidFill>
+          <a:schemeClr val="tx1"/>
+        </a:solidFill>
+        <a:latin typeface="+mn-lt"/>
+        <a:ea typeface="+mn-ea"/>
+        <a:cs typeface="+mn-cs"/>
+      </a:defRPr>
+    </a:lvl2pPr>
+    <a:lvl3pPr marL="914400" algn="l" defTabSz="914400" rtl="0" eaLnBrk="1" latinLnBrk="0" hangingPunct="1">
+      <a:defRPr sz="1200" kern="1200">
+        <a:solidFill>
+          <a:schemeClr val="tx1"/>
+        </a:solidFill>
+        <a:latin typeface="+mn-lt"/>
+        <a:ea typeface="+mn-ea"/>
+        <a:cs typeface="+mn-cs"/>
+      </a:defRPr>
+    </a:lvl3pPr>
+    <a:lvl4pPr marL="1371600" algn="l" defTabSz="914400" rtl="0" eaLnBrk="1" latinLnBrk="0" hangingPunct="1">
+      <a:defRPr sz="1200" kern="1200">
+        <a:solidFill>
+          <a:schemeClr val="tx1"/>
+        </a:solidFill>
+        <a:latin typeface="+mn-lt"/>
+        <a:ea typeface="+mn-ea"/>
+        <a:cs typeface="+mn-cs"/>
+      </a:defRPr>
+    </a:lvl4pPr>
+    <a:lvl5pPr marL="1828800" algn="l" defTabSz="914400" rtl="0" eaLnBrk="1" latinLnBrk="0" hangingPunct="1">
+      <a:defRPr sz="1200" kern="1200">
+        <a:solidFill>
+          <a:schemeClr val="tx1"/>
+        </a:solidFill>
+        <a:latin typeface="+mn-lt"/>
+        <a:ea typeface="+mn-ea"/>
+        <a:cs typeface="+mn-cs"/>
+      </a:defRPr>
+    </a:lvl5pPr>
+    <a:lvl6pPr marL="2286000" algn="l" defTabSz="914400" rtl="0" eaLnBrk="1" latinLnBrk="0" hangingPunct="1">
+      <a:defRPr sz="1200" kern="1200">
+        <a:solidFill>
+          <a:schemeClr val="tx1"/>
+        </a:solidFill>
+        <a:latin typeface="+mn-lt"/>
+        <a:ea typeface="+mn-ea"/>
+        <a:cs typeface="+mn-cs"/>
+      </a:defRPr>
+    </a:lvl6pPr>
+    <a:lvl7pPr marL="2743200" algn="l" defTabSz="914400" rtl="0" eaLnBrk="1" latinLnBrk="0" hangingPunct="1">
+      <a:defRPr sz="1200" kern="1200">
+        <a:solidFill>
+          <a:schemeClr val="tx1"/>
+        </a:solidFill>
+        <a:latin typeface="+mn-lt"/>
+        <a:ea typeface="+mn-ea"/>
+        <a:cs typeface="+mn-cs"/>
+      </a:defRPr>
+    </a:lvl7pPr>
+    <a:lvl8pPr marL="3200400" algn="l" defTabSz="914400" rtl="0" eaLnBrk="1" latinLnBrk="0" hangingPunct="1">
+      <a:defRPr sz="1200" kern="1200">
+        <a:solidFill>
+          <a:schemeClr val="tx1"/>
+        </a:solidFill>
+        <a:latin typeface="+mn-lt"/>
+        <a:ea typeface="+mn-ea"/>
+        <a:cs typeface="+mn-cs"/>
+      </a:defRPr>
+    </a:lvl8pPr>
+    <a:lvl9pPr marL="3657600" algn="l" defTabSz="914400" rtl="0" eaLnBrk="1" latinLnBrk="0" hangingPunct="1">
+      <a:defRPr sz="1200" kern="1200">
+        <a:solidFill>
+          <a:schemeClr val="tx1"/>
+        </a:solidFill>
+        <a:latin typeface="+mn-lt"/>
+        <a:ea typeface="+mn-ea"/>
+        <a:cs typeface="+mn-cs"/>
+      </a:defRPr>
+    </a:lvl9pPr>
+  </p:notesStyle>
+</p:notesMaster>
+</file>
+
+<file path=ppt/notesSlides/notesSlide1.xml><?xml version="1.0" encoding="utf-8"?>
+<p:notes xmlns:a="http://schemas.openxmlformats.org/drawingml/2006/main" xmlns:r="http://schemas.openxmlformats.org/officeDocument/2006/relationships" xmlns:p="http://schemas.openxmlformats.org/presentationml/2006/main">
+  <p:cSld>
+    <p:spTree>
+      <p:nvGrpSpPr>
+        <p:cNvPr id="1" name=""/>
+        <p:cNvGrpSpPr/>
+        <p:nvPr/>
+      </p:nvGrpSpPr>
+      <p:grpSpPr>
+        <a:xfrm>
+          <a:off x="0" y="0"/>
+          <a:ext cx="0" cy="0"/>
+          <a:chOff x="0" y="0"/>
+          <a:chExt cx="0" cy="0"/>
+        </a:xfrm>
+      </p:grpSpPr>
+      <p:sp>
+        <p:nvSpPr>
+          <p:cNvPr id="2" name="Folienbildplatzhalter 1"/>
+          <p:cNvSpPr>
+            <a:spLocks noGrp="1" noRot="1" noChangeAspect="1"/>
+          </p:cNvSpPr>
+          <p:nvPr>
+            <p:ph type="sldImg"/>
+          </p:nvPr>
+        </p:nvSpPr>
+        <p:spPr/>
+      </p:sp>
+      <p:sp>
+        <p:nvSpPr>
+          <p:cNvPr id="3" name="Notizenplatzhalter 2"/>
+          <p:cNvSpPr>
+            <a:spLocks noGrp="1"/>
+          </p:cNvSpPr>
+          <p:nvPr>
+            <p:ph type="body" idx="1"/>
+          </p:nvPr>
+        </p:nvSpPr>
+        <p:spPr/>
+        <p:txBody>
+          <a:bodyPr/>
+          <a:lstStyle/>
+          <a:p>
+            <a:pPr marL="171450" indent="-171450">
+              <a:buFontTx/>
+              <a:buChar char="-"/>
+            </a:pPr>
+            <a:r>
+              <a:rPr lang="de-DE" dirty="0"/>
+              <a:t>Frühe euch durch die Schritte in dem Projekt anhand des Data Science Lifecycles</a:t>
+            </a:r>
+          </a:p>
+          <a:p>
+            <a:pPr marL="171450" indent="-171450">
+              <a:buFontTx/>
+              <a:buChar char="-"/>
+            </a:pPr>
+            <a:r>
+              <a:rPr lang="de-DE" dirty="0"/>
+              <a:t>Am Schluss schauen wir noch das Projekt auf </a:t>
+            </a:r>
+            <a:r>
+              <a:rPr lang="de-DE" dirty="0" err="1"/>
+              <a:t>Github</a:t>
+            </a:r>
+            <a:r>
+              <a:rPr lang="de-DE" dirty="0"/>
+              <a:t> an und ich zeige euch das Dashboard</a:t>
+            </a:r>
+          </a:p>
+        </p:txBody>
+      </p:sp>
+      <p:sp>
+        <p:nvSpPr>
+          <p:cNvPr id="4" name="Foliennummernplatzhalter 3"/>
+          <p:cNvSpPr>
+            <a:spLocks noGrp="1"/>
+          </p:cNvSpPr>
+          <p:nvPr>
+            <p:ph type="sldNum" sz="quarter" idx="5"/>
+          </p:nvPr>
+        </p:nvSpPr>
+        <p:spPr/>
+        <p:txBody>
+          <a:bodyPr/>
+          <a:lstStyle/>
+          <a:p>
+            <a:fld id="{AB73F393-EB1A-4CCE-B775-A92EAEF2FC41}" type="slidenum">
+              <a:rPr lang="de-DE" smtClean="0"/>
+              <a:t>1</a:t>
+            </a:fld>
+            <a:endParaRPr lang="de-DE"/>
+          </a:p>
+        </p:txBody>
+      </p:sp>
+    </p:spTree>
+    <p:extLst>
+      <p:ext uri="{BB962C8B-B14F-4D97-AF65-F5344CB8AC3E}">
+        <p14:creationId xmlns:p14="http://schemas.microsoft.com/office/powerpoint/2010/main" val="4078172400"/>
+      </p:ext>
+    </p:extLst>
+  </p:cSld>
+  <p:clrMapOvr>
+    <a:masterClrMapping/>
+  </p:clrMapOvr>
+</p:notes>
+</file>
+
+<file path=ppt/notesSlides/notesSlide10.xml><?xml version="1.0" encoding="utf-8"?>
+<p:notes xmlns:a="http://schemas.openxmlformats.org/drawingml/2006/main" xmlns:r="http://schemas.openxmlformats.org/officeDocument/2006/relationships" xmlns:p="http://schemas.openxmlformats.org/presentationml/2006/main">
+  <p:cSld>
+    <p:spTree>
+      <p:nvGrpSpPr>
+        <p:cNvPr id="1" name=""/>
+        <p:cNvGrpSpPr/>
+        <p:nvPr/>
+      </p:nvGrpSpPr>
+      <p:grpSpPr>
+        <a:xfrm>
+          <a:off x="0" y="0"/>
+          <a:ext cx="0" cy="0"/>
+          <a:chOff x="0" y="0"/>
+          <a:chExt cx="0" cy="0"/>
+        </a:xfrm>
+      </p:grpSpPr>
+      <p:sp>
+        <p:nvSpPr>
+          <p:cNvPr id="2" name="Folienbildplatzhalter 1"/>
+          <p:cNvSpPr>
+            <a:spLocks noGrp="1" noRot="1" noChangeAspect="1"/>
+          </p:cNvSpPr>
+          <p:nvPr>
+            <p:ph type="sldImg"/>
+          </p:nvPr>
+        </p:nvSpPr>
+        <p:spPr/>
+      </p:sp>
+      <p:sp>
+        <p:nvSpPr>
+          <p:cNvPr id="3" name="Notizenplatzhalter 2"/>
+          <p:cNvSpPr>
+            <a:spLocks noGrp="1"/>
+          </p:cNvSpPr>
+          <p:nvPr>
+            <p:ph type="body" idx="1"/>
+          </p:nvPr>
+        </p:nvSpPr>
+        <p:spPr/>
+        <p:txBody>
+          <a:bodyPr/>
+          <a:lstStyle/>
+          <a:p>
+            <a:r>
+              <a:rPr lang="de-DE" dirty="0"/>
+              <a:t>- Käufe und Verkäufe werden pro Gegenstand </a:t>
+            </a:r>
+            <a:r>
+              <a:rPr lang="de-DE" dirty="0" err="1"/>
+              <a:t>gejoined</a:t>
+            </a:r>
+            <a:r>
+              <a:rPr lang="de-DE" dirty="0"/>
+              <a:t>, sodass in jeder Zeile ein Gegenstand mit Kaufpreis und Verkaufspreis steht</a:t>
+            </a:r>
+          </a:p>
+          <a:p>
+            <a:r>
+              <a:rPr lang="de-DE" dirty="0"/>
+              <a:t>- Berechnung des Profits wie eben erklärt im Code</a:t>
+            </a:r>
+          </a:p>
+        </p:txBody>
+      </p:sp>
+      <p:sp>
+        <p:nvSpPr>
+          <p:cNvPr id="4" name="Foliennummernplatzhalter 3"/>
+          <p:cNvSpPr>
+            <a:spLocks noGrp="1"/>
+          </p:cNvSpPr>
+          <p:nvPr>
+            <p:ph type="sldNum" sz="quarter" idx="5"/>
+          </p:nvPr>
+        </p:nvSpPr>
+        <p:spPr/>
+        <p:txBody>
+          <a:bodyPr/>
+          <a:lstStyle/>
+          <a:p>
+            <a:fld id="{AB73F393-EB1A-4CCE-B775-A92EAEF2FC41}" type="slidenum">
+              <a:rPr lang="de-DE" smtClean="0"/>
+              <a:t>10</a:t>
+            </a:fld>
+            <a:endParaRPr lang="de-DE"/>
+          </a:p>
+        </p:txBody>
+      </p:sp>
+    </p:spTree>
+    <p:extLst>
+      <p:ext uri="{BB962C8B-B14F-4D97-AF65-F5344CB8AC3E}">
+        <p14:creationId xmlns:p14="http://schemas.microsoft.com/office/powerpoint/2010/main" val="4231754689"/>
+      </p:ext>
+    </p:extLst>
+  </p:cSld>
+  <p:clrMapOvr>
+    <a:masterClrMapping/>
+  </p:clrMapOvr>
+</p:notes>
+</file>
+
+<file path=ppt/notesSlides/notesSlide11.xml><?xml version="1.0" encoding="utf-8"?>
+<p:notes xmlns:a="http://schemas.openxmlformats.org/drawingml/2006/main" xmlns:r="http://schemas.openxmlformats.org/officeDocument/2006/relationships" xmlns:p="http://schemas.openxmlformats.org/presentationml/2006/main">
+  <p:cSld>
+    <p:spTree>
+      <p:nvGrpSpPr>
+        <p:cNvPr id="1" name=""/>
+        <p:cNvGrpSpPr/>
+        <p:nvPr/>
+      </p:nvGrpSpPr>
+      <p:grpSpPr>
+        <a:xfrm>
+          <a:off x="0" y="0"/>
+          <a:ext cx="0" cy="0"/>
+          <a:chOff x="0" y="0"/>
+          <a:chExt cx="0" cy="0"/>
+        </a:xfrm>
+      </p:grpSpPr>
+      <p:sp>
+        <p:nvSpPr>
+          <p:cNvPr id="2" name="Folienbildplatzhalter 1"/>
+          <p:cNvSpPr>
+            <a:spLocks noGrp="1" noRot="1" noChangeAspect="1"/>
+          </p:cNvSpPr>
+          <p:nvPr>
+            <p:ph type="sldImg"/>
+          </p:nvPr>
+        </p:nvSpPr>
+        <p:spPr/>
+      </p:sp>
+      <p:sp>
+        <p:nvSpPr>
+          <p:cNvPr id="3" name="Notizenplatzhalter 2"/>
+          <p:cNvSpPr>
+            <a:spLocks noGrp="1"/>
+          </p:cNvSpPr>
+          <p:nvPr>
+            <p:ph type="body" idx="1"/>
+          </p:nvPr>
+        </p:nvSpPr>
+        <p:spPr/>
+        <p:txBody>
+          <a:bodyPr/>
+          <a:lstStyle/>
+          <a:p>
+            <a:pPr marL="171450" indent="-171450">
+              <a:buFontTx/>
+              <a:buChar char="-"/>
+            </a:pPr>
+            <a:r>
+              <a:rPr lang="de-DE" dirty="0"/>
+              <a:t>Annahme: Sehr hohe Profit sind Einzelfälle und nicht relevant, da es sehr lange dauern kann, bis diese verkauft werden (Glück).</a:t>
+            </a:r>
+          </a:p>
+          <a:p>
+            <a:pPr marL="171450" indent="-171450">
+              <a:buFontTx/>
+              <a:buChar char="-"/>
+            </a:pPr>
+            <a:r>
+              <a:rPr lang="de-DE" dirty="0"/>
+              <a:t>Wir wollen Gegenstände finden, die sich schneller drehen.</a:t>
+            </a:r>
+          </a:p>
+          <a:p>
+            <a:pPr marL="171450" indent="-171450">
+              <a:buFontTx/>
+              <a:buChar char="-"/>
+            </a:pPr>
+            <a:r>
+              <a:rPr lang="de-DE" dirty="0"/>
+              <a:t>Daher Filter &lt; 2.5 Gold -&gt; Median 8.15 Silber -&gt; wird in im </a:t>
+            </a:r>
+            <a:r>
+              <a:rPr lang="de-DE" b="1" dirty="0"/>
+              <a:t>Silber-Bereich</a:t>
+            </a:r>
+          </a:p>
+        </p:txBody>
+      </p:sp>
+      <p:sp>
+        <p:nvSpPr>
+          <p:cNvPr id="4" name="Foliennummernplatzhalter 3"/>
+          <p:cNvSpPr>
+            <a:spLocks noGrp="1"/>
+          </p:cNvSpPr>
+          <p:nvPr>
+            <p:ph type="sldNum" sz="quarter" idx="5"/>
+          </p:nvPr>
+        </p:nvSpPr>
+        <p:spPr/>
+        <p:txBody>
+          <a:bodyPr/>
+          <a:lstStyle/>
+          <a:p>
+            <a:fld id="{AB73F393-EB1A-4CCE-B775-A92EAEF2FC41}" type="slidenum">
+              <a:rPr lang="de-DE" smtClean="0"/>
+              <a:t>11</a:t>
+            </a:fld>
+            <a:endParaRPr lang="de-DE"/>
+          </a:p>
+        </p:txBody>
+      </p:sp>
+    </p:spTree>
+    <p:extLst>
+      <p:ext uri="{BB962C8B-B14F-4D97-AF65-F5344CB8AC3E}">
+        <p14:creationId xmlns:p14="http://schemas.microsoft.com/office/powerpoint/2010/main" val="1438058586"/>
+      </p:ext>
+    </p:extLst>
+  </p:cSld>
+  <p:clrMapOvr>
+    <a:masterClrMapping/>
+  </p:clrMapOvr>
+</p:notes>
+</file>
+
+<file path=ppt/notesSlides/notesSlide12.xml><?xml version="1.0" encoding="utf-8"?>
+<p:notes xmlns:a="http://schemas.openxmlformats.org/drawingml/2006/main" xmlns:r="http://schemas.openxmlformats.org/officeDocument/2006/relationships" xmlns:p="http://schemas.openxmlformats.org/presentationml/2006/main">
+  <p:cSld>
+    <p:spTree>
+      <p:nvGrpSpPr>
+        <p:cNvPr id="1" name=""/>
+        <p:cNvGrpSpPr/>
+        <p:nvPr/>
+      </p:nvGrpSpPr>
+      <p:grpSpPr>
+        <a:xfrm>
+          <a:off x="0" y="0"/>
+          <a:ext cx="0" cy="0"/>
+          <a:chOff x="0" y="0"/>
+          <a:chExt cx="0" cy="0"/>
+        </a:xfrm>
+      </p:grpSpPr>
+      <p:sp>
+        <p:nvSpPr>
+          <p:cNvPr id="2" name="Folienbildplatzhalter 1"/>
+          <p:cNvSpPr>
+            <a:spLocks noGrp="1" noRot="1" noChangeAspect="1"/>
+          </p:cNvSpPr>
+          <p:nvPr>
+            <p:ph type="sldImg"/>
+          </p:nvPr>
+        </p:nvSpPr>
+        <p:spPr/>
+      </p:sp>
+      <p:sp>
+        <p:nvSpPr>
+          <p:cNvPr id="3" name="Notizenplatzhalter 2"/>
+          <p:cNvSpPr>
+            <a:spLocks noGrp="1"/>
+          </p:cNvSpPr>
+          <p:nvPr>
+            <p:ph type="body" idx="1"/>
+          </p:nvPr>
+        </p:nvSpPr>
+        <p:spPr/>
+        <p:txBody>
+          <a:bodyPr/>
+          <a:lstStyle/>
+          <a:p>
+            <a:r>
+              <a:rPr lang="de-DE" dirty="0"/>
+              <a:t>- Data </a:t>
+            </a:r>
+            <a:r>
+              <a:rPr lang="de-DE" dirty="0" err="1"/>
+              <a:t>split</a:t>
+            </a:r>
+            <a:r>
+              <a:rPr lang="de-DE" dirty="0"/>
+              <a:t> 75%</a:t>
+            </a:r>
+          </a:p>
+        </p:txBody>
+      </p:sp>
+      <p:sp>
+        <p:nvSpPr>
+          <p:cNvPr id="4" name="Foliennummernplatzhalter 3"/>
+          <p:cNvSpPr>
+            <a:spLocks noGrp="1"/>
+          </p:cNvSpPr>
+          <p:nvPr>
+            <p:ph type="sldNum" sz="quarter" idx="5"/>
+          </p:nvPr>
+        </p:nvSpPr>
+        <p:spPr/>
+        <p:txBody>
+          <a:bodyPr/>
+          <a:lstStyle/>
+          <a:p>
+            <a:fld id="{AB73F393-EB1A-4CCE-B775-A92EAEF2FC41}" type="slidenum">
+              <a:rPr lang="de-DE" smtClean="0"/>
+              <a:t>12</a:t>
+            </a:fld>
+            <a:endParaRPr lang="de-DE"/>
+          </a:p>
+        </p:txBody>
+      </p:sp>
+    </p:spTree>
+    <p:extLst>
+      <p:ext uri="{BB962C8B-B14F-4D97-AF65-F5344CB8AC3E}">
+        <p14:creationId xmlns:p14="http://schemas.microsoft.com/office/powerpoint/2010/main" val="3250021947"/>
+      </p:ext>
+    </p:extLst>
+  </p:cSld>
+  <p:clrMapOvr>
+    <a:masterClrMapping/>
+  </p:clrMapOvr>
+</p:notes>
+</file>
+
+<file path=ppt/notesSlides/notesSlide13.xml><?xml version="1.0" encoding="utf-8"?>
+<p:notes xmlns:a="http://schemas.openxmlformats.org/drawingml/2006/main" xmlns:r="http://schemas.openxmlformats.org/officeDocument/2006/relationships" xmlns:p="http://schemas.openxmlformats.org/presentationml/2006/main">
+  <p:cSld>
+    <p:spTree>
+      <p:nvGrpSpPr>
+        <p:cNvPr id="1" name=""/>
+        <p:cNvGrpSpPr/>
+        <p:nvPr/>
+      </p:nvGrpSpPr>
+      <p:grpSpPr>
+        <a:xfrm>
+          <a:off x="0" y="0"/>
+          <a:ext cx="0" cy="0"/>
+          <a:chOff x="0" y="0"/>
+          <a:chExt cx="0" cy="0"/>
+        </a:xfrm>
+      </p:grpSpPr>
+      <p:sp>
+        <p:nvSpPr>
+          <p:cNvPr id="2" name="Folienbildplatzhalter 1"/>
+          <p:cNvSpPr>
+            <a:spLocks noGrp="1" noRot="1" noChangeAspect="1"/>
+          </p:cNvSpPr>
+          <p:nvPr>
+            <p:ph type="sldImg"/>
+          </p:nvPr>
+        </p:nvSpPr>
+        <p:spPr/>
+      </p:sp>
+      <p:sp>
+        <p:nvSpPr>
+          <p:cNvPr id="3" name="Notizenplatzhalter 2"/>
+          <p:cNvSpPr>
+            <a:spLocks noGrp="1"/>
+          </p:cNvSpPr>
+          <p:nvPr>
+            <p:ph type="body" idx="1"/>
+          </p:nvPr>
+        </p:nvSpPr>
+        <p:spPr/>
+        <p:txBody>
+          <a:bodyPr/>
+          <a:lstStyle/>
+          <a:p>
+            <a:pPr marL="171450" indent="-171450">
+              <a:buFontTx/>
+              <a:buChar char="-"/>
+            </a:pPr>
+            <a:r>
+              <a:rPr lang="de-DE" dirty="0"/>
+              <a:t>Keine Abhängigkeiten zwischen den Daten erkannt</a:t>
+            </a:r>
+          </a:p>
+          <a:p>
+            <a:pPr marL="171450" indent="-171450">
+              <a:buFontTx/>
+              <a:buChar char="-"/>
+            </a:pPr>
+            <a:r>
+              <a:rPr lang="de-DE" dirty="0"/>
+              <a:t>Evtl. hätte man mit mehr Informationen mehr Zusammenhänge identifizieren können (z.B. wie viel Schaden/Waffe, wie viel Rüstungswert/Rüstung etc.) – extrem aufwändig</a:t>
+            </a:r>
+          </a:p>
+          <a:p>
+            <a:pPr marL="171450" indent="-171450">
+              <a:buFontTx/>
+              <a:buChar char="-"/>
+            </a:pPr>
+            <a:r>
+              <a:rPr lang="de-DE" dirty="0"/>
+              <a:t>Einzige Abhängigkeit zwischen Kauf und Verkaufspreis erkennbar</a:t>
+            </a:r>
+          </a:p>
+        </p:txBody>
+      </p:sp>
+      <p:sp>
+        <p:nvSpPr>
+          <p:cNvPr id="4" name="Foliennummernplatzhalter 3"/>
+          <p:cNvSpPr>
+            <a:spLocks noGrp="1"/>
+          </p:cNvSpPr>
+          <p:nvPr>
+            <p:ph type="sldNum" sz="quarter" idx="5"/>
+          </p:nvPr>
+        </p:nvSpPr>
+        <p:spPr/>
+        <p:txBody>
+          <a:bodyPr/>
+          <a:lstStyle/>
+          <a:p>
+            <a:fld id="{AB73F393-EB1A-4CCE-B775-A92EAEF2FC41}" type="slidenum">
+              <a:rPr lang="de-DE" smtClean="0"/>
+              <a:t>13</a:t>
+            </a:fld>
+            <a:endParaRPr lang="de-DE"/>
+          </a:p>
+        </p:txBody>
+      </p:sp>
+    </p:spTree>
+    <p:extLst>
+      <p:ext uri="{BB962C8B-B14F-4D97-AF65-F5344CB8AC3E}">
+        <p14:creationId xmlns:p14="http://schemas.microsoft.com/office/powerpoint/2010/main" val="3161247503"/>
+      </p:ext>
+    </p:extLst>
+  </p:cSld>
+  <p:clrMapOvr>
+    <a:masterClrMapping/>
+  </p:clrMapOvr>
+</p:notes>
+</file>
+
+<file path=ppt/notesSlides/notesSlide14.xml><?xml version="1.0" encoding="utf-8"?>
+<p:notes xmlns:a="http://schemas.openxmlformats.org/drawingml/2006/main" xmlns:r="http://schemas.openxmlformats.org/officeDocument/2006/relationships" xmlns:p="http://schemas.openxmlformats.org/presentationml/2006/main">
+  <p:cSld>
+    <p:spTree>
+      <p:nvGrpSpPr>
+        <p:cNvPr id="1" name=""/>
+        <p:cNvGrpSpPr/>
+        <p:nvPr/>
+      </p:nvGrpSpPr>
+      <p:grpSpPr>
+        <a:xfrm>
+          <a:off x="0" y="0"/>
+          <a:ext cx="0" cy="0"/>
+          <a:chOff x="0" y="0"/>
+          <a:chExt cx="0" cy="0"/>
+        </a:xfrm>
+      </p:grpSpPr>
+      <p:sp>
+        <p:nvSpPr>
+          <p:cNvPr id="2" name="Folienbildplatzhalter 1"/>
+          <p:cNvSpPr>
+            <a:spLocks noGrp="1" noRot="1" noChangeAspect="1"/>
+          </p:cNvSpPr>
+          <p:nvPr>
+            <p:ph type="sldImg"/>
+          </p:nvPr>
+        </p:nvSpPr>
+        <p:spPr/>
+      </p:sp>
+      <p:sp>
+        <p:nvSpPr>
+          <p:cNvPr id="3" name="Notizenplatzhalter 2"/>
+          <p:cNvSpPr>
+            <a:spLocks noGrp="1"/>
+          </p:cNvSpPr>
+          <p:nvPr>
+            <p:ph type="body" idx="1"/>
+          </p:nvPr>
+        </p:nvSpPr>
+        <p:spPr/>
+        <p:txBody>
+          <a:bodyPr/>
+          <a:lstStyle/>
+          <a:p>
+            <a:r>
+              <a:rPr lang="de-DE" dirty="0"/>
+              <a:t>- Keine besonders auffällige Verteilung der Gegenstände</a:t>
+            </a:r>
+          </a:p>
+        </p:txBody>
+      </p:sp>
+      <p:sp>
+        <p:nvSpPr>
+          <p:cNvPr id="4" name="Foliennummernplatzhalter 3"/>
+          <p:cNvSpPr>
+            <a:spLocks noGrp="1"/>
+          </p:cNvSpPr>
+          <p:nvPr>
+            <p:ph type="sldNum" sz="quarter" idx="5"/>
+          </p:nvPr>
+        </p:nvSpPr>
+        <p:spPr/>
+        <p:txBody>
+          <a:bodyPr/>
+          <a:lstStyle/>
+          <a:p>
+            <a:fld id="{AB73F393-EB1A-4CCE-B775-A92EAEF2FC41}" type="slidenum">
+              <a:rPr lang="de-DE" smtClean="0"/>
+              <a:t>14</a:t>
+            </a:fld>
+            <a:endParaRPr lang="de-DE"/>
+          </a:p>
+        </p:txBody>
+      </p:sp>
+    </p:spTree>
+    <p:extLst>
+      <p:ext uri="{BB962C8B-B14F-4D97-AF65-F5344CB8AC3E}">
+        <p14:creationId xmlns:p14="http://schemas.microsoft.com/office/powerpoint/2010/main" val="4097896766"/>
+      </p:ext>
+    </p:extLst>
+  </p:cSld>
+  <p:clrMapOvr>
+    <a:masterClrMapping/>
+  </p:clrMapOvr>
+</p:notes>
+</file>
+
+<file path=ppt/notesSlides/notesSlide15.xml><?xml version="1.0" encoding="utf-8"?>
+<p:notes xmlns:a="http://schemas.openxmlformats.org/drawingml/2006/main" xmlns:r="http://schemas.openxmlformats.org/officeDocument/2006/relationships" xmlns:p="http://schemas.openxmlformats.org/presentationml/2006/main">
+  <p:cSld>
+    <p:spTree>
+      <p:nvGrpSpPr>
+        <p:cNvPr id="1" name=""/>
+        <p:cNvGrpSpPr/>
+        <p:nvPr/>
+      </p:nvGrpSpPr>
+      <p:grpSpPr>
+        <a:xfrm>
+          <a:off x="0" y="0"/>
+          <a:ext cx="0" cy="0"/>
+          <a:chOff x="0" y="0"/>
+          <a:chExt cx="0" cy="0"/>
+        </a:xfrm>
+      </p:grpSpPr>
+      <p:sp>
+        <p:nvSpPr>
+          <p:cNvPr id="2" name="Folienbildplatzhalter 1"/>
+          <p:cNvSpPr>
+            <a:spLocks noGrp="1" noRot="1" noChangeAspect="1"/>
+          </p:cNvSpPr>
+          <p:nvPr>
+            <p:ph type="sldImg"/>
+          </p:nvPr>
+        </p:nvSpPr>
+        <p:spPr/>
+      </p:sp>
+      <p:sp>
+        <p:nvSpPr>
+          <p:cNvPr id="3" name="Notizenplatzhalter 2"/>
+          <p:cNvSpPr>
+            <a:spLocks noGrp="1"/>
+          </p:cNvSpPr>
+          <p:nvPr>
+            <p:ph type="body" idx="1"/>
+          </p:nvPr>
+        </p:nvSpPr>
+        <p:spPr/>
+        <p:txBody>
+          <a:bodyPr/>
+          <a:lstStyle/>
+          <a:p>
+            <a:pPr marL="171450" indent="-171450">
+              <a:buFontTx/>
+              <a:buChar char="-"/>
+            </a:pPr>
+            <a:r>
+              <a:rPr lang="de-DE" dirty="0"/>
+              <a:t>von Jan </a:t>
+            </a:r>
+            <a:r>
+              <a:rPr lang="de-DE" dirty="0" err="1"/>
+              <a:t>Kirenz</a:t>
+            </a:r>
+            <a:r>
+              <a:rPr lang="de-DE" dirty="0"/>
+              <a:t>‘ Blog </a:t>
+            </a:r>
+          </a:p>
+          <a:p>
+            <a:pPr marL="171450" indent="-171450">
+              <a:buFontTx/>
+              <a:buChar char="-"/>
+            </a:pPr>
+            <a:r>
+              <a:rPr lang="de-DE" dirty="0"/>
+              <a:t>Je höher die Y-Achse desto unähnlicher die Daten</a:t>
+            </a:r>
+          </a:p>
+          <a:p>
+            <a:pPr marL="171450" indent="-171450">
+              <a:buFontTx/>
+              <a:buChar char="-"/>
+            </a:pPr>
+            <a:r>
+              <a:rPr lang="de-DE" dirty="0"/>
+              <a:t>Festlegung auf 4 Cluster</a:t>
+            </a:r>
+          </a:p>
+        </p:txBody>
+      </p:sp>
+      <p:sp>
+        <p:nvSpPr>
+          <p:cNvPr id="4" name="Foliennummernplatzhalter 3"/>
+          <p:cNvSpPr>
+            <a:spLocks noGrp="1"/>
+          </p:cNvSpPr>
+          <p:nvPr>
+            <p:ph type="sldNum" sz="quarter" idx="5"/>
+          </p:nvPr>
+        </p:nvSpPr>
+        <p:spPr/>
+        <p:txBody>
+          <a:bodyPr/>
+          <a:lstStyle/>
+          <a:p>
+            <a:fld id="{AB73F393-EB1A-4CCE-B775-A92EAEF2FC41}" type="slidenum">
+              <a:rPr lang="de-DE" smtClean="0"/>
+              <a:t>15</a:t>
+            </a:fld>
+            <a:endParaRPr lang="de-DE"/>
+          </a:p>
+        </p:txBody>
+      </p:sp>
+    </p:spTree>
+    <p:extLst>
+      <p:ext uri="{BB962C8B-B14F-4D97-AF65-F5344CB8AC3E}">
+        <p14:creationId xmlns:p14="http://schemas.microsoft.com/office/powerpoint/2010/main" val="3634375325"/>
+      </p:ext>
+    </p:extLst>
+  </p:cSld>
+  <p:clrMapOvr>
+    <a:masterClrMapping/>
+  </p:clrMapOvr>
+</p:notes>
+</file>
+
+<file path=ppt/notesSlides/notesSlide16.xml><?xml version="1.0" encoding="utf-8"?>
+<p:notes xmlns:a="http://schemas.openxmlformats.org/drawingml/2006/main" xmlns:r="http://schemas.openxmlformats.org/officeDocument/2006/relationships" xmlns:p="http://schemas.openxmlformats.org/presentationml/2006/main">
+  <p:cSld>
+    <p:spTree>
+      <p:nvGrpSpPr>
+        <p:cNvPr id="1" name=""/>
+        <p:cNvGrpSpPr/>
+        <p:nvPr/>
+      </p:nvGrpSpPr>
+      <p:grpSpPr>
+        <a:xfrm>
+          <a:off x="0" y="0"/>
+          <a:ext cx="0" cy="0"/>
+          <a:chOff x="0" y="0"/>
+          <a:chExt cx="0" cy="0"/>
+        </a:xfrm>
+      </p:grpSpPr>
+      <p:sp>
+        <p:nvSpPr>
+          <p:cNvPr id="2" name="Folienbildplatzhalter 1"/>
+          <p:cNvSpPr>
+            <a:spLocks noGrp="1" noRot="1" noChangeAspect="1"/>
+          </p:cNvSpPr>
+          <p:nvPr>
+            <p:ph type="sldImg"/>
+          </p:nvPr>
+        </p:nvSpPr>
+        <p:spPr/>
+      </p:sp>
+      <p:sp>
+        <p:nvSpPr>
+          <p:cNvPr id="3" name="Notizenplatzhalter 2"/>
+          <p:cNvSpPr>
+            <a:spLocks noGrp="1"/>
+          </p:cNvSpPr>
+          <p:nvPr>
+            <p:ph type="body" idx="1"/>
+          </p:nvPr>
+        </p:nvSpPr>
+        <p:spPr/>
+        <p:txBody>
+          <a:bodyPr/>
+          <a:lstStyle/>
+          <a:p>
+            <a:r>
+              <a:rPr lang="de-DE" dirty="0"/>
+              <a:t>-   1) nicht kaufen</a:t>
+            </a:r>
+          </a:p>
+          <a:p>
+            <a:pPr marL="171450" indent="-171450">
+              <a:buFontTx/>
+              <a:buChar char="-"/>
+            </a:pPr>
+            <a:r>
+              <a:rPr lang="de-DE" dirty="0"/>
+              <a:t>2) eher nicht kaufen</a:t>
+            </a:r>
+          </a:p>
+          <a:p>
+            <a:pPr marL="171450" indent="-171450">
+              <a:buFontTx/>
+              <a:buChar char="-"/>
+            </a:pPr>
+            <a:r>
+              <a:rPr lang="de-DE" dirty="0"/>
+              <a:t>3) ab 0 kaufen, einige im Bereich zw. 1 und 2</a:t>
+            </a:r>
+          </a:p>
+          <a:p>
+            <a:pPr marL="171450" indent="-171450">
+              <a:buFontTx/>
+              <a:buChar char="-"/>
+            </a:pPr>
+            <a:r>
+              <a:rPr lang="de-DE" dirty="0"/>
+              <a:t>4) sehr vereinzelt</a:t>
+            </a:r>
+          </a:p>
+          <a:p>
+            <a:pPr marL="171450" indent="-171450">
+              <a:buFontTx/>
+              <a:buChar char="-"/>
+            </a:pPr>
+            <a:endParaRPr lang="de-DE" dirty="0"/>
+          </a:p>
+          <a:p>
+            <a:pPr marL="0" indent="0">
+              <a:buFontTx/>
+              <a:buNone/>
+            </a:pPr>
+            <a:r>
+              <a:rPr lang="de-DE" dirty="0"/>
+              <a:t>Achtung, keine Aussage über Preis, da die Werte normalisiert wurden!!</a:t>
+            </a:r>
+          </a:p>
+          <a:p>
+            <a:pPr marL="0" indent="0">
+              <a:buFontTx/>
+              <a:buNone/>
+            </a:pPr>
+            <a:r>
+              <a:rPr lang="de-DE" dirty="0"/>
+              <a:t>Es wurde aber sichtbar, dass es einige lohnenswerte Gegenstände gibt (und auch einige die sich nicht lohnen)</a:t>
+            </a:r>
+          </a:p>
+        </p:txBody>
+      </p:sp>
+      <p:sp>
+        <p:nvSpPr>
+          <p:cNvPr id="4" name="Foliennummernplatzhalter 3"/>
+          <p:cNvSpPr>
+            <a:spLocks noGrp="1"/>
+          </p:cNvSpPr>
+          <p:nvPr>
+            <p:ph type="sldNum" sz="quarter" idx="5"/>
+          </p:nvPr>
+        </p:nvSpPr>
+        <p:spPr/>
+        <p:txBody>
+          <a:bodyPr/>
+          <a:lstStyle/>
+          <a:p>
+            <a:fld id="{AB73F393-EB1A-4CCE-B775-A92EAEF2FC41}" type="slidenum">
+              <a:rPr lang="de-DE" smtClean="0"/>
+              <a:t>16</a:t>
+            </a:fld>
+            <a:endParaRPr lang="de-DE"/>
+          </a:p>
+        </p:txBody>
+      </p:sp>
+    </p:spTree>
+    <p:extLst>
+      <p:ext uri="{BB962C8B-B14F-4D97-AF65-F5344CB8AC3E}">
+        <p14:creationId xmlns:p14="http://schemas.microsoft.com/office/powerpoint/2010/main" val="2777370587"/>
+      </p:ext>
+    </p:extLst>
+  </p:cSld>
+  <p:clrMapOvr>
+    <a:masterClrMapping/>
+  </p:clrMapOvr>
+</p:notes>
+</file>
+
+<file path=ppt/notesSlides/notesSlide17.xml><?xml version="1.0" encoding="utf-8"?>
+<p:notes xmlns:a="http://schemas.openxmlformats.org/drawingml/2006/main" xmlns:r="http://schemas.openxmlformats.org/officeDocument/2006/relationships" xmlns:p="http://schemas.openxmlformats.org/presentationml/2006/main">
+  <p:cSld>
+    <p:spTree>
+      <p:nvGrpSpPr>
+        <p:cNvPr id="1" name=""/>
+        <p:cNvGrpSpPr/>
+        <p:nvPr/>
+      </p:nvGrpSpPr>
+      <p:grpSpPr>
+        <a:xfrm>
+          <a:off x="0" y="0"/>
+          <a:ext cx="0" cy="0"/>
+          <a:chOff x="0" y="0"/>
+          <a:chExt cx="0" cy="0"/>
+        </a:xfrm>
+      </p:grpSpPr>
+      <p:sp>
+        <p:nvSpPr>
+          <p:cNvPr id="2" name="Folienbildplatzhalter 1"/>
+          <p:cNvSpPr>
+            <a:spLocks noGrp="1" noRot="1" noChangeAspect="1"/>
+          </p:cNvSpPr>
+          <p:nvPr>
+            <p:ph type="sldImg"/>
+          </p:nvPr>
+        </p:nvSpPr>
+        <p:spPr/>
+      </p:sp>
+      <p:sp>
+        <p:nvSpPr>
+          <p:cNvPr id="3" name="Notizenplatzhalter 2"/>
+          <p:cNvSpPr>
+            <a:spLocks noGrp="1"/>
+          </p:cNvSpPr>
+          <p:nvPr>
+            <p:ph type="body" idx="1"/>
+          </p:nvPr>
+        </p:nvSpPr>
+        <p:spPr/>
+        <p:txBody>
+          <a:bodyPr/>
+          <a:lstStyle/>
+          <a:p>
+            <a:r>
+              <a:rPr lang="de-DE" dirty="0"/>
+              <a:t>- Profit </a:t>
+            </a:r>
+            <a:r>
+              <a:rPr lang="de-DE" dirty="0" err="1"/>
+              <a:t>by</a:t>
+            </a:r>
+            <a:r>
+              <a:rPr lang="de-DE" dirty="0"/>
+              <a:t> </a:t>
+            </a:r>
+            <a:r>
+              <a:rPr lang="de-DE" dirty="0" err="1"/>
+              <a:t>Cost</a:t>
+            </a:r>
+            <a:r>
+              <a:rPr lang="de-DE" dirty="0"/>
+              <a:t> ist Profit / </a:t>
+            </a:r>
+            <a:r>
+              <a:rPr lang="de-DE" dirty="0" err="1"/>
+              <a:t>Cost</a:t>
+            </a:r>
+            <a:r>
+              <a:rPr lang="de-DE" dirty="0"/>
+              <a:t> und beschreibt den initialen Geldeinsatz im Vergleich zum Gewinn.</a:t>
+            </a:r>
+          </a:p>
+          <a:p>
+            <a:pPr marL="171450" indent="-171450">
+              <a:buFontTx/>
+              <a:buChar char="-"/>
+            </a:pPr>
+            <a:r>
+              <a:rPr lang="de-DE" dirty="0"/>
+              <a:t>Wollte nicht zu viel Gold ausgeben, da Ergebnis ungewiss</a:t>
+            </a:r>
+          </a:p>
+          <a:p>
+            <a:pPr marL="171450" indent="-171450">
+              <a:buFontTx/>
+              <a:buChar char="-"/>
+            </a:pPr>
+            <a:r>
+              <a:rPr lang="de-DE" dirty="0"/>
+              <a:t>Festlegung auf </a:t>
+            </a:r>
+            <a:r>
+              <a:rPr lang="de-DE" dirty="0" err="1"/>
+              <a:t>Asuran</a:t>
+            </a:r>
+            <a:r>
+              <a:rPr lang="de-DE" dirty="0"/>
+              <a:t> </a:t>
+            </a:r>
+            <a:r>
+              <a:rPr lang="de-DE" dirty="0" err="1"/>
+              <a:t>Harpoon</a:t>
+            </a:r>
+            <a:r>
+              <a:rPr lang="de-DE" dirty="0"/>
+              <a:t>, relativ </a:t>
+            </a:r>
+            <a:r>
+              <a:rPr lang="de-DE" dirty="0" err="1"/>
+              <a:t>gerine</a:t>
+            </a:r>
+            <a:r>
+              <a:rPr lang="de-DE" dirty="0"/>
+              <a:t> Kaufkosten, guter Gewinn und v.a. häufiger Gekauft.</a:t>
+            </a:r>
+          </a:p>
+        </p:txBody>
+      </p:sp>
+      <p:sp>
+        <p:nvSpPr>
+          <p:cNvPr id="4" name="Foliennummernplatzhalter 3"/>
+          <p:cNvSpPr>
+            <a:spLocks noGrp="1"/>
+          </p:cNvSpPr>
+          <p:nvPr>
+            <p:ph type="sldNum" sz="quarter" idx="5"/>
+          </p:nvPr>
+        </p:nvSpPr>
+        <p:spPr/>
+        <p:txBody>
+          <a:bodyPr/>
+          <a:lstStyle/>
+          <a:p>
+            <a:fld id="{AB73F393-EB1A-4CCE-B775-A92EAEF2FC41}" type="slidenum">
+              <a:rPr lang="de-DE" smtClean="0"/>
+              <a:t>17</a:t>
+            </a:fld>
+            <a:endParaRPr lang="de-DE"/>
+          </a:p>
+        </p:txBody>
+      </p:sp>
+    </p:spTree>
+    <p:extLst>
+      <p:ext uri="{BB962C8B-B14F-4D97-AF65-F5344CB8AC3E}">
+        <p14:creationId xmlns:p14="http://schemas.microsoft.com/office/powerpoint/2010/main" val="1314294464"/>
+      </p:ext>
+    </p:extLst>
+  </p:cSld>
+  <p:clrMapOvr>
+    <a:masterClrMapping/>
+  </p:clrMapOvr>
+</p:notes>
+</file>
+
+<file path=ppt/notesSlides/notesSlide18.xml><?xml version="1.0" encoding="utf-8"?>
+<p:notes xmlns:a="http://schemas.openxmlformats.org/drawingml/2006/main" xmlns:r="http://schemas.openxmlformats.org/officeDocument/2006/relationships" xmlns:p="http://schemas.openxmlformats.org/presentationml/2006/main">
+  <p:cSld>
+    <p:spTree>
+      <p:nvGrpSpPr>
+        <p:cNvPr id="1" name=""/>
+        <p:cNvGrpSpPr/>
+        <p:nvPr/>
+      </p:nvGrpSpPr>
+      <p:grpSpPr>
+        <a:xfrm>
+          <a:off x="0" y="0"/>
+          <a:ext cx="0" cy="0"/>
+          <a:chOff x="0" y="0"/>
+          <a:chExt cx="0" cy="0"/>
+        </a:xfrm>
+      </p:grpSpPr>
+      <p:sp>
+        <p:nvSpPr>
+          <p:cNvPr id="2" name="Folienbildplatzhalter 1"/>
+          <p:cNvSpPr>
+            <a:spLocks noGrp="1" noRot="1" noChangeAspect="1"/>
+          </p:cNvSpPr>
+          <p:nvPr>
+            <p:ph type="sldImg"/>
+          </p:nvPr>
+        </p:nvSpPr>
+        <p:spPr/>
+      </p:sp>
+      <p:sp>
+        <p:nvSpPr>
+          <p:cNvPr id="3" name="Notizenplatzhalter 2"/>
+          <p:cNvSpPr>
+            <a:spLocks noGrp="1"/>
+          </p:cNvSpPr>
+          <p:nvPr>
+            <p:ph type="body" idx="1"/>
+          </p:nvPr>
+        </p:nvSpPr>
+        <p:spPr/>
+        <p:txBody>
+          <a:bodyPr/>
+          <a:lstStyle/>
+          <a:p>
+            <a:pPr marL="171450" indent="-171450">
+              <a:buFontTx/>
+              <a:buChar char="-"/>
+            </a:pPr>
+            <a:r>
+              <a:rPr lang="de-DE" dirty="0"/>
+              <a:t>Im Prinzip Ziel erreich, Gegenstände mit denen Gewinn erzielt werden kann</a:t>
+            </a:r>
+          </a:p>
+          <a:p>
+            <a:pPr marL="171450" indent="-171450">
+              <a:buFontTx/>
+              <a:buChar char="-"/>
+            </a:pPr>
+            <a:r>
+              <a:rPr lang="de-DE" dirty="0"/>
+              <a:t>Ich wollte aber auch wissen wie man ein Modell baut, daher Idee -&gt; Regression der Kaufpreise/Verkaufspreise</a:t>
+            </a:r>
+          </a:p>
+          <a:p>
+            <a:pPr marL="171450" indent="-171450">
+              <a:buFontTx/>
+              <a:buChar char="-"/>
+            </a:pPr>
+            <a:r>
+              <a:rPr lang="de-DE" dirty="0"/>
+              <a:t>Bereits im </a:t>
+            </a:r>
+            <a:r>
+              <a:rPr lang="en-US" sz="1200" dirty="0"/>
+              <a:t>Spearman </a:t>
+            </a:r>
+            <a:r>
+              <a:rPr lang="en-US" sz="1200" dirty="0" err="1"/>
+              <a:t>Schaubild</a:t>
+            </a:r>
+            <a:r>
+              <a:rPr lang="en-US" sz="1200" dirty="0"/>
+              <a:t> </a:t>
+            </a:r>
+            <a:r>
+              <a:rPr lang="de-DE" dirty="0"/>
+              <a:t>erfahren: Kaum Abhängigkeiten zwischen den Variablen</a:t>
+            </a:r>
+          </a:p>
+        </p:txBody>
+      </p:sp>
+      <p:sp>
+        <p:nvSpPr>
+          <p:cNvPr id="4" name="Foliennummernplatzhalter 3"/>
+          <p:cNvSpPr>
+            <a:spLocks noGrp="1"/>
+          </p:cNvSpPr>
+          <p:nvPr>
+            <p:ph type="sldNum" sz="quarter" idx="5"/>
+          </p:nvPr>
+        </p:nvSpPr>
+        <p:spPr/>
+        <p:txBody>
+          <a:bodyPr/>
+          <a:lstStyle/>
+          <a:p>
+            <a:fld id="{AB73F393-EB1A-4CCE-B775-A92EAEF2FC41}" type="slidenum">
+              <a:rPr lang="de-DE" smtClean="0"/>
+              <a:t>18</a:t>
+            </a:fld>
+            <a:endParaRPr lang="de-DE"/>
+          </a:p>
+        </p:txBody>
+      </p:sp>
+    </p:spTree>
+    <p:extLst>
+      <p:ext uri="{BB962C8B-B14F-4D97-AF65-F5344CB8AC3E}">
+        <p14:creationId xmlns:p14="http://schemas.microsoft.com/office/powerpoint/2010/main" val="3548704459"/>
+      </p:ext>
+    </p:extLst>
+  </p:cSld>
+  <p:clrMapOvr>
+    <a:masterClrMapping/>
+  </p:clrMapOvr>
+</p:notes>
+</file>
+
+<file path=ppt/notesSlides/notesSlide19.xml><?xml version="1.0" encoding="utf-8"?>
+<p:notes xmlns:a="http://schemas.openxmlformats.org/drawingml/2006/main" xmlns:r="http://schemas.openxmlformats.org/officeDocument/2006/relationships" xmlns:p="http://schemas.openxmlformats.org/presentationml/2006/main">
+  <p:cSld>
+    <p:spTree>
+      <p:nvGrpSpPr>
+        <p:cNvPr id="1" name=""/>
+        <p:cNvGrpSpPr/>
+        <p:nvPr/>
+      </p:nvGrpSpPr>
+      <p:grpSpPr>
+        <a:xfrm>
+          <a:off x="0" y="0"/>
+          <a:ext cx="0" cy="0"/>
+          <a:chOff x="0" y="0"/>
+          <a:chExt cx="0" cy="0"/>
+        </a:xfrm>
+      </p:grpSpPr>
+      <p:sp>
+        <p:nvSpPr>
+          <p:cNvPr id="2" name="Folienbildplatzhalter 1"/>
+          <p:cNvSpPr>
+            <a:spLocks noGrp="1" noRot="1" noChangeAspect="1"/>
+          </p:cNvSpPr>
+          <p:nvPr>
+            <p:ph type="sldImg"/>
+          </p:nvPr>
+        </p:nvSpPr>
+        <p:spPr/>
+      </p:sp>
+      <p:sp>
+        <p:nvSpPr>
+          <p:cNvPr id="3" name="Notizenplatzhalter 2"/>
+          <p:cNvSpPr>
+            <a:spLocks noGrp="1"/>
+          </p:cNvSpPr>
+          <p:nvPr>
+            <p:ph type="body" idx="1"/>
+          </p:nvPr>
+        </p:nvSpPr>
+        <p:spPr/>
+        <p:txBody>
+          <a:bodyPr/>
+          <a:lstStyle/>
+          <a:p>
+            <a:r>
+              <a:rPr lang="de-DE" dirty="0"/>
+              <a:t>- Trotzdem einmal alle relevanten </a:t>
+            </a:r>
+            <a:r>
+              <a:rPr lang="de-DE" dirty="0" err="1"/>
+              <a:t>features</a:t>
+            </a:r>
+            <a:r>
+              <a:rPr lang="de-DE" dirty="0"/>
+              <a:t> als </a:t>
+            </a:r>
+            <a:r>
+              <a:rPr lang="de-DE" dirty="0" err="1"/>
+              <a:t>input</a:t>
+            </a:r>
+            <a:r>
+              <a:rPr lang="de-DE" dirty="0"/>
+              <a:t> (der </a:t>
+            </a:r>
+            <a:r>
+              <a:rPr lang="de-DE" dirty="0" err="1"/>
+              <a:t>glmnet</a:t>
+            </a:r>
+            <a:r>
+              <a:rPr lang="de-DE" dirty="0"/>
+              <a:t> Algorithmus braucht auch mehr als 1 </a:t>
+            </a:r>
+            <a:r>
+              <a:rPr lang="de-DE" dirty="0" err="1"/>
+              <a:t>predictor</a:t>
+            </a:r>
+            <a:r>
+              <a:rPr lang="de-DE" dirty="0"/>
+              <a:t>)</a:t>
+            </a:r>
+          </a:p>
+          <a:p>
+            <a:r>
+              <a:rPr lang="de-DE" dirty="0"/>
+              <a:t>- </a:t>
+            </a:r>
+            <a:r>
+              <a:rPr lang="de-DE" dirty="0" err="1"/>
+              <a:t>Id</a:t>
+            </a:r>
+            <a:r>
+              <a:rPr lang="de-DE" dirty="0"/>
+              <a:t> und Name nur zur Info als ID</a:t>
+            </a:r>
+          </a:p>
+        </p:txBody>
+      </p:sp>
+      <p:sp>
+        <p:nvSpPr>
+          <p:cNvPr id="4" name="Foliennummernplatzhalter 3"/>
+          <p:cNvSpPr>
+            <a:spLocks noGrp="1"/>
+          </p:cNvSpPr>
+          <p:nvPr>
+            <p:ph type="sldNum" sz="quarter" idx="5"/>
+          </p:nvPr>
+        </p:nvSpPr>
+        <p:spPr/>
+        <p:txBody>
+          <a:bodyPr/>
+          <a:lstStyle/>
+          <a:p>
+            <a:fld id="{AB73F393-EB1A-4CCE-B775-A92EAEF2FC41}" type="slidenum">
+              <a:rPr lang="de-DE" smtClean="0"/>
+              <a:t>19</a:t>
+            </a:fld>
+            <a:endParaRPr lang="de-DE"/>
+          </a:p>
+        </p:txBody>
+      </p:sp>
+    </p:spTree>
+    <p:extLst>
+      <p:ext uri="{BB962C8B-B14F-4D97-AF65-F5344CB8AC3E}">
+        <p14:creationId xmlns:p14="http://schemas.microsoft.com/office/powerpoint/2010/main" val="2480570031"/>
+      </p:ext>
+    </p:extLst>
+  </p:cSld>
+  <p:clrMapOvr>
+    <a:masterClrMapping/>
+  </p:clrMapOvr>
+</p:notes>
+</file>
+
+<file path=ppt/notesSlides/notesSlide2.xml><?xml version="1.0" encoding="utf-8"?>
+<p:notes xmlns:a="http://schemas.openxmlformats.org/drawingml/2006/main" xmlns:r="http://schemas.openxmlformats.org/officeDocument/2006/relationships" xmlns:p="http://schemas.openxmlformats.org/presentationml/2006/main">
+  <p:cSld>
+    <p:spTree>
+      <p:nvGrpSpPr>
+        <p:cNvPr id="1" name=""/>
+        <p:cNvGrpSpPr/>
+        <p:nvPr/>
+      </p:nvGrpSpPr>
+      <p:grpSpPr>
+        <a:xfrm>
+          <a:off x="0" y="0"/>
+          <a:ext cx="0" cy="0"/>
+          <a:chOff x="0" y="0"/>
+          <a:chExt cx="0" cy="0"/>
+        </a:xfrm>
+      </p:grpSpPr>
+      <p:sp>
+        <p:nvSpPr>
+          <p:cNvPr id="2" name="Folienbildplatzhalter 1"/>
+          <p:cNvSpPr>
+            <a:spLocks noGrp="1" noRot="1" noChangeAspect="1"/>
+          </p:cNvSpPr>
+          <p:nvPr>
+            <p:ph type="sldImg"/>
+          </p:nvPr>
+        </p:nvSpPr>
+        <p:spPr/>
+      </p:sp>
+      <p:sp>
+        <p:nvSpPr>
+          <p:cNvPr id="3" name="Notizenplatzhalter 2"/>
+          <p:cNvSpPr>
+            <a:spLocks noGrp="1"/>
+          </p:cNvSpPr>
+          <p:nvPr>
+            <p:ph type="body" idx="1"/>
+          </p:nvPr>
+        </p:nvSpPr>
+        <p:spPr/>
+        <p:txBody>
+          <a:bodyPr/>
+          <a:lstStyle/>
+          <a:p>
+            <a:pPr marL="171450" indent="-171450">
+              <a:buFontTx/>
+              <a:buChar char="-"/>
+            </a:pPr>
+            <a:r>
+              <a:rPr lang="de-DE" dirty="0"/>
+              <a:t>Geld ist nicht alles, solange man genug davon hat</a:t>
+            </a:r>
+          </a:p>
+          <a:p>
+            <a:pPr marL="171450" indent="-171450">
+              <a:buFontTx/>
+              <a:buChar char="-"/>
+            </a:pPr>
+            <a:r>
+              <a:rPr lang="de-DE" dirty="0"/>
+              <a:t>Gilt in der realen Welt genau so wie in Computerspielen</a:t>
+            </a:r>
+          </a:p>
+          <a:p>
+            <a:pPr marL="171450" indent="-171450">
+              <a:buFontTx/>
+              <a:buChar char="-"/>
+            </a:pPr>
+            <a:r>
+              <a:rPr lang="de-DE" dirty="0"/>
+              <a:t>Immer mehr Spiele sind zunächst kostenlos, enthalten aber bezahlte Dienste</a:t>
+            </a:r>
+          </a:p>
+          <a:p>
+            <a:pPr marL="171450" indent="-171450">
+              <a:buFontTx/>
+              <a:buChar char="-"/>
+            </a:pPr>
+            <a:r>
+              <a:rPr lang="de-DE" dirty="0"/>
+              <a:t>Diese werden meistens mit einer speziellen Währung bezahlt, die entweder in Echtgeld oder </a:t>
+            </a:r>
+            <a:r>
+              <a:rPr lang="de-DE" dirty="0" err="1"/>
+              <a:t>unsummen</a:t>
+            </a:r>
+            <a:r>
+              <a:rPr lang="de-DE" dirty="0"/>
+              <a:t> an „normaler“ in-game Währung bezahlt werden kann.</a:t>
+            </a:r>
+          </a:p>
+          <a:p>
+            <a:pPr marL="171450" indent="-171450">
+              <a:buFontTx/>
+              <a:buChar char="-"/>
+            </a:pPr>
+            <a:r>
+              <a:rPr lang="de-DE" dirty="0"/>
+              <a:t>Beispiel Guild Wars:  </a:t>
+            </a:r>
+          </a:p>
+          <a:p>
+            <a:pPr marL="171450" indent="-171450">
+              <a:buFontTx/>
+              <a:buChar char="-"/>
+            </a:pPr>
+            <a:r>
+              <a:rPr lang="de-DE" dirty="0"/>
+              <a:t>GW war bis 2012 kostenpflichtig, daher keine Spielrelevanten Gegenstände im Echtgeld-Shop, dafür umso mehr im Auktionshaus</a:t>
+            </a:r>
+          </a:p>
+        </p:txBody>
+      </p:sp>
+      <p:sp>
+        <p:nvSpPr>
+          <p:cNvPr id="4" name="Foliennummernplatzhalter 3"/>
+          <p:cNvSpPr>
+            <a:spLocks noGrp="1"/>
+          </p:cNvSpPr>
+          <p:nvPr>
+            <p:ph type="sldNum" sz="quarter" idx="5"/>
+          </p:nvPr>
+        </p:nvSpPr>
+        <p:spPr/>
+        <p:txBody>
+          <a:bodyPr/>
+          <a:lstStyle/>
+          <a:p>
+            <a:fld id="{AB73F393-EB1A-4CCE-B775-A92EAEF2FC41}" type="slidenum">
+              <a:rPr lang="de-DE" smtClean="0"/>
+              <a:t>2</a:t>
+            </a:fld>
+            <a:endParaRPr lang="de-DE"/>
+          </a:p>
+        </p:txBody>
+      </p:sp>
+    </p:spTree>
+    <p:extLst>
+      <p:ext uri="{BB962C8B-B14F-4D97-AF65-F5344CB8AC3E}">
+        <p14:creationId xmlns:p14="http://schemas.microsoft.com/office/powerpoint/2010/main" val="2109449546"/>
+      </p:ext>
+    </p:extLst>
+  </p:cSld>
+  <p:clrMapOvr>
+    <a:masterClrMapping/>
+  </p:clrMapOvr>
+</p:notes>
+</file>
+
+<file path=ppt/notesSlides/notesSlide20.xml><?xml version="1.0" encoding="utf-8"?>
+<p:notes xmlns:a="http://schemas.openxmlformats.org/drawingml/2006/main" xmlns:r="http://schemas.openxmlformats.org/officeDocument/2006/relationships" xmlns:p="http://schemas.openxmlformats.org/presentationml/2006/main">
+  <p:cSld>
+    <p:spTree>
+      <p:nvGrpSpPr>
+        <p:cNvPr id="1" name=""/>
+        <p:cNvGrpSpPr/>
+        <p:nvPr/>
+      </p:nvGrpSpPr>
+      <p:grpSpPr>
+        <a:xfrm>
+          <a:off x="0" y="0"/>
+          <a:ext cx="0" cy="0"/>
+          <a:chOff x="0" y="0"/>
+          <a:chExt cx="0" cy="0"/>
+        </a:xfrm>
+      </p:grpSpPr>
+      <p:sp>
+        <p:nvSpPr>
+          <p:cNvPr id="2" name="Folienbildplatzhalter 1"/>
+          <p:cNvSpPr>
+            <a:spLocks noGrp="1" noRot="1" noChangeAspect="1"/>
+          </p:cNvSpPr>
+          <p:nvPr>
+            <p:ph type="sldImg"/>
+          </p:nvPr>
+        </p:nvSpPr>
+        <p:spPr/>
+      </p:sp>
+      <p:sp>
+        <p:nvSpPr>
+          <p:cNvPr id="3" name="Notizenplatzhalter 2"/>
+          <p:cNvSpPr>
+            <a:spLocks noGrp="1"/>
+          </p:cNvSpPr>
+          <p:nvPr>
+            <p:ph type="body" idx="1"/>
+          </p:nvPr>
+        </p:nvSpPr>
+        <p:spPr/>
+        <p:txBody>
+          <a:bodyPr/>
+          <a:lstStyle/>
+          <a:p>
+            <a:pPr marL="171450" indent="-171450">
+              <a:buFontTx/>
+              <a:buChar char="-"/>
+            </a:pPr>
+            <a:r>
+              <a:rPr lang="de-DE" dirty="0"/>
+              <a:t>Random Forst Regression und </a:t>
+            </a:r>
+            <a:r>
+              <a:rPr lang="de-DE" dirty="0" err="1"/>
+              <a:t>glmnet</a:t>
+            </a:r>
+            <a:r>
+              <a:rPr lang="de-DE" dirty="0"/>
+              <a:t> Regression (Lasso)</a:t>
+            </a:r>
+          </a:p>
+          <a:p>
+            <a:pPr marL="171450" indent="-171450">
+              <a:buFontTx/>
+              <a:buChar char="-"/>
+            </a:pPr>
+            <a:r>
+              <a:rPr lang="de-DE" dirty="0"/>
+              <a:t>Lasso =&gt; </a:t>
+            </a:r>
+            <a:r>
+              <a:rPr lang="de-DE" dirty="0" err="1"/>
+              <a:t>penalty</a:t>
+            </a:r>
+            <a:r>
+              <a:rPr lang="de-DE" dirty="0"/>
+              <a:t> = 0.1 =&gt; unwichtige </a:t>
+            </a:r>
+            <a:r>
+              <a:rPr lang="de-DE" dirty="0" err="1"/>
+              <a:t>features</a:t>
+            </a:r>
+            <a:r>
+              <a:rPr lang="de-DE" dirty="0"/>
+              <a:t> werden weniger berücksichtigt.</a:t>
+            </a:r>
+          </a:p>
+          <a:p>
+            <a:pPr marL="171450" indent="-171450">
+              <a:buFontTx/>
+              <a:buChar char="-"/>
+            </a:pPr>
+            <a:r>
+              <a:rPr lang="de-DE" dirty="0"/>
+              <a:t>Rezept entsprechend aufgebaut</a:t>
+            </a:r>
+          </a:p>
+          <a:p>
+            <a:pPr marL="171450" indent="-171450">
+              <a:buFontTx/>
+              <a:buChar char="-"/>
+            </a:pPr>
+            <a:r>
+              <a:rPr lang="de-DE" dirty="0"/>
+              <a:t>Fit anhand </a:t>
+            </a:r>
+            <a:r>
+              <a:rPr lang="de-DE" dirty="0" err="1"/>
+              <a:t>df_train</a:t>
+            </a:r>
+            <a:r>
+              <a:rPr lang="de-DE" dirty="0"/>
+              <a:t>, </a:t>
+            </a:r>
+            <a:r>
+              <a:rPr lang="de-DE" dirty="0" err="1"/>
+              <a:t>predict</a:t>
+            </a:r>
+            <a:r>
+              <a:rPr lang="de-DE" dirty="0"/>
+              <a:t> anhand </a:t>
+            </a:r>
+            <a:r>
+              <a:rPr lang="de-DE" dirty="0" err="1"/>
+              <a:t>test_data</a:t>
+            </a:r>
+            <a:endParaRPr lang="de-DE" dirty="0"/>
+          </a:p>
+        </p:txBody>
+      </p:sp>
+      <p:sp>
+        <p:nvSpPr>
+          <p:cNvPr id="4" name="Foliennummernplatzhalter 3"/>
+          <p:cNvSpPr>
+            <a:spLocks noGrp="1"/>
+          </p:cNvSpPr>
+          <p:nvPr>
+            <p:ph type="sldNum" sz="quarter" idx="5"/>
+          </p:nvPr>
+        </p:nvSpPr>
+        <p:spPr/>
+        <p:txBody>
+          <a:bodyPr/>
+          <a:lstStyle/>
+          <a:p>
+            <a:fld id="{AB73F393-EB1A-4CCE-B775-A92EAEF2FC41}" type="slidenum">
+              <a:rPr lang="de-DE" smtClean="0"/>
+              <a:t>20</a:t>
+            </a:fld>
+            <a:endParaRPr lang="de-DE"/>
+          </a:p>
+        </p:txBody>
+      </p:sp>
+    </p:spTree>
+    <p:extLst>
+      <p:ext uri="{BB962C8B-B14F-4D97-AF65-F5344CB8AC3E}">
+        <p14:creationId xmlns:p14="http://schemas.microsoft.com/office/powerpoint/2010/main" val="1829491255"/>
+      </p:ext>
+    </p:extLst>
+  </p:cSld>
+  <p:clrMapOvr>
+    <a:masterClrMapping/>
+  </p:clrMapOvr>
+</p:notes>
+</file>
+
+<file path=ppt/notesSlides/notesSlide21.xml><?xml version="1.0" encoding="utf-8"?>
+<p:notes xmlns:a="http://schemas.openxmlformats.org/drawingml/2006/main" xmlns:r="http://schemas.openxmlformats.org/officeDocument/2006/relationships" xmlns:p="http://schemas.openxmlformats.org/presentationml/2006/main">
+  <p:cSld>
+    <p:spTree>
+      <p:nvGrpSpPr>
+        <p:cNvPr id="1" name=""/>
+        <p:cNvGrpSpPr/>
+        <p:nvPr/>
+      </p:nvGrpSpPr>
+      <p:grpSpPr>
+        <a:xfrm>
+          <a:off x="0" y="0"/>
+          <a:ext cx="0" cy="0"/>
+          <a:chOff x="0" y="0"/>
+          <a:chExt cx="0" cy="0"/>
+        </a:xfrm>
+      </p:grpSpPr>
+      <p:sp>
+        <p:nvSpPr>
+          <p:cNvPr id="2" name="Folienbildplatzhalter 1"/>
+          <p:cNvSpPr>
+            <a:spLocks noGrp="1" noRot="1" noChangeAspect="1"/>
+          </p:cNvSpPr>
+          <p:nvPr>
+            <p:ph type="sldImg"/>
+          </p:nvPr>
+        </p:nvSpPr>
+        <p:spPr/>
+      </p:sp>
+      <p:sp>
+        <p:nvSpPr>
+          <p:cNvPr id="3" name="Notizenplatzhalter 2"/>
+          <p:cNvSpPr>
+            <a:spLocks noGrp="1"/>
+          </p:cNvSpPr>
+          <p:nvPr>
+            <p:ph type="body" idx="1"/>
+          </p:nvPr>
+        </p:nvSpPr>
+        <p:spPr/>
+        <p:txBody>
+          <a:bodyPr/>
+          <a:lstStyle/>
+          <a:p>
+            <a:r>
+              <a:rPr lang="de-DE" dirty="0"/>
+              <a:t>- Extrem gute </a:t>
+            </a:r>
+            <a:r>
+              <a:rPr lang="de-DE" dirty="0" err="1"/>
+              <a:t>Prediction</a:t>
+            </a:r>
+            <a:r>
+              <a:rPr lang="de-DE" dirty="0"/>
+              <a:t>, v.a. bei Lasso</a:t>
+            </a:r>
+          </a:p>
+        </p:txBody>
+      </p:sp>
+      <p:sp>
+        <p:nvSpPr>
+          <p:cNvPr id="4" name="Foliennummernplatzhalter 3"/>
+          <p:cNvSpPr>
+            <a:spLocks noGrp="1"/>
+          </p:cNvSpPr>
+          <p:nvPr>
+            <p:ph type="sldNum" sz="quarter" idx="5"/>
+          </p:nvPr>
+        </p:nvSpPr>
+        <p:spPr/>
+        <p:txBody>
+          <a:bodyPr/>
+          <a:lstStyle/>
+          <a:p>
+            <a:fld id="{AB73F393-EB1A-4CCE-B775-A92EAEF2FC41}" type="slidenum">
+              <a:rPr lang="de-DE" smtClean="0"/>
+              <a:t>21</a:t>
+            </a:fld>
+            <a:endParaRPr lang="de-DE"/>
+          </a:p>
+        </p:txBody>
+      </p:sp>
+    </p:spTree>
+    <p:extLst>
+      <p:ext uri="{BB962C8B-B14F-4D97-AF65-F5344CB8AC3E}">
+        <p14:creationId xmlns:p14="http://schemas.microsoft.com/office/powerpoint/2010/main" val="1666459097"/>
+      </p:ext>
+    </p:extLst>
+  </p:cSld>
+  <p:clrMapOvr>
+    <a:masterClrMapping/>
+  </p:clrMapOvr>
+</p:notes>
+</file>
+
+<file path=ppt/notesSlides/notesSlide22.xml><?xml version="1.0" encoding="utf-8"?>
+<p:notes xmlns:a="http://schemas.openxmlformats.org/drawingml/2006/main" xmlns:r="http://schemas.openxmlformats.org/officeDocument/2006/relationships" xmlns:p="http://schemas.openxmlformats.org/presentationml/2006/main">
+  <p:cSld>
+    <p:spTree>
+      <p:nvGrpSpPr>
+        <p:cNvPr id="1" name=""/>
+        <p:cNvGrpSpPr/>
+        <p:nvPr/>
+      </p:nvGrpSpPr>
+      <p:grpSpPr>
+        <a:xfrm>
+          <a:off x="0" y="0"/>
+          <a:ext cx="0" cy="0"/>
+          <a:chOff x="0" y="0"/>
+          <a:chExt cx="0" cy="0"/>
+        </a:xfrm>
+      </p:grpSpPr>
+      <p:sp>
+        <p:nvSpPr>
+          <p:cNvPr id="2" name="Folienbildplatzhalter 1"/>
+          <p:cNvSpPr>
+            <a:spLocks noGrp="1" noRot="1" noChangeAspect="1"/>
+          </p:cNvSpPr>
+          <p:nvPr>
+            <p:ph type="sldImg"/>
+          </p:nvPr>
+        </p:nvSpPr>
+        <p:spPr/>
+      </p:sp>
+      <p:sp>
+        <p:nvSpPr>
+          <p:cNvPr id="3" name="Notizenplatzhalter 2"/>
+          <p:cNvSpPr>
+            <a:spLocks noGrp="1"/>
+          </p:cNvSpPr>
+          <p:nvPr>
+            <p:ph type="body" idx="1"/>
+          </p:nvPr>
+        </p:nvSpPr>
+        <p:spPr/>
+        <p:txBody>
+          <a:bodyPr/>
+          <a:lstStyle/>
+          <a:p>
+            <a:r>
+              <a:rPr lang="de-DE" dirty="0"/>
+              <a:t>- Hier sieht man, dass wirklich nur der Kaufpreis </a:t>
+            </a:r>
+            <a:r>
+              <a:rPr lang="de-DE" dirty="0" err="1"/>
+              <a:t>auswirklung</a:t>
+            </a:r>
+            <a:r>
+              <a:rPr lang="de-DE" dirty="0"/>
+              <a:t> auf das Modell hat. Daher ist der Lasso-Algorithmus so genau (gut?)</a:t>
+            </a:r>
+          </a:p>
+        </p:txBody>
+      </p:sp>
+      <p:sp>
+        <p:nvSpPr>
+          <p:cNvPr id="4" name="Foliennummernplatzhalter 3"/>
+          <p:cNvSpPr>
+            <a:spLocks noGrp="1"/>
+          </p:cNvSpPr>
+          <p:nvPr>
+            <p:ph type="sldNum" sz="quarter" idx="5"/>
+          </p:nvPr>
+        </p:nvSpPr>
+        <p:spPr/>
+        <p:txBody>
+          <a:bodyPr/>
+          <a:lstStyle/>
+          <a:p>
+            <a:fld id="{AB73F393-EB1A-4CCE-B775-A92EAEF2FC41}" type="slidenum">
+              <a:rPr lang="de-DE" smtClean="0"/>
+              <a:t>22</a:t>
+            </a:fld>
+            <a:endParaRPr lang="de-DE"/>
+          </a:p>
+        </p:txBody>
+      </p:sp>
+    </p:spTree>
+    <p:extLst>
+      <p:ext uri="{BB962C8B-B14F-4D97-AF65-F5344CB8AC3E}">
+        <p14:creationId xmlns:p14="http://schemas.microsoft.com/office/powerpoint/2010/main" val="3635001781"/>
+      </p:ext>
+    </p:extLst>
+  </p:cSld>
+  <p:clrMapOvr>
+    <a:masterClrMapping/>
+  </p:clrMapOvr>
+</p:notes>
+</file>
+
+<file path=ppt/notesSlides/notesSlide23.xml><?xml version="1.0" encoding="utf-8"?>
+<p:notes xmlns:a="http://schemas.openxmlformats.org/drawingml/2006/main" xmlns:r="http://schemas.openxmlformats.org/officeDocument/2006/relationships" xmlns:p="http://schemas.openxmlformats.org/presentationml/2006/main">
+  <p:cSld>
+    <p:spTree>
+      <p:nvGrpSpPr>
+        <p:cNvPr id="1" name=""/>
+        <p:cNvGrpSpPr/>
+        <p:nvPr/>
+      </p:nvGrpSpPr>
+      <p:grpSpPr>
+        <a:xfrm>
+          <a:off x="0" y="0"/>
+          <a:ext cx="0" cy="0"/>
+          <a:chOff x="0" y="0"/>
+          <a:chExt cx="0" cy="0"/>
+        </a:xfrm>
+      </p:grpSpPr>
+      <p:sp>
+        <p:nvSpPr>
+          <p:cNvPr id="2" name="Folienbildplatzhalter 1"/>
+          <p:cNvSpPr>
+            <a:spLocks noGrp="1" noRot="1" noChangeAspect="1"/>
+          </p:cNvSpPr>
+          <p:nvPr>
+            <p:ph type="sldImg"/>
+          </p:nvPr>
+        </p:nvSpPr>
+        <p:spPr/>
+      </p:sp>
+      <p:sp>
+        <p:nvSpPr>
+          <p:cNvPr id="3" name="Notizenplatzhalter 2"/>
+          <p:cNvSpPr>
+            <a:spLocks noGrp="1"/>
+          </p:cNvSpPr>
+          <p:nvPr>
+            <p:ph type="body" idx="1"/>
+          </p:nvPr>
+        </p:nvSpPr>
+        <p:spPr/>
+        <p:txBody>
+          <a:bodyPr/>
+          <a:lstStyle/>
+          <a:p>
+            <a:r>
+              <a:rPr lang="de-DE" dirty="0"/>
+              <a:t>- Hyperparametertuning ausprobiert, aber kein Effekt</a:t>
+            </a:r>
+          </a:p>
+        </p:txBody>
+      </p:sp>
+      <p:sp>
+        <p:nvSpPr>
+          <p:cNvPr id="4" name="Foliennummernplatzhalter 3"/>
+          <p:cNvSpPr>
+            <a:spLocks noGrp="1"/>
+          </p:cNvSpPr>
+          <p:nvPr>
+            <p:ph type="sldNum" sz="quarter" idx="5"/>
+          </p:nvPr>
+        </p:nvSpPr>
+        <p:spPr/>
+        <p:txBody>
+          <a:bodyPr/>
+          <a:lstStyle/>
+          <a:p>
+            <a:fld id="{AB73F393-EB1A-4CCE-B775-A92EAEF2FC41}" type="slidenum">
+              <a:rPr lang="de-DE" smtClean="0"/>
+              <a:t>23</a:t>
+            </a:fld>
+            <a:endParaRPr lang="de-DE"/>
+          </a:p>
+        </p:txBody>
+      </p:sp>
+    </p:spTree>
+    <p:extLst>
+      <p:ext uri="{BB962C8B-B14F-4D97-AF65-F5344CB8AC3E}">
+        <p14:creationId xmlns:p14="http://schemas.microsoft.com/office/powerpoint/2010/main" val="2577465082"/>
+      </p:ext>
+    </p:extLst>
+  </p:cSld>
+  <p:clrMapOvr>
+    <a:masterClrMapping/>
+  </p:clrMapOvr>
+</p:notes>
+</file>
+
+<file path=ppt/notesSlides/notesSlide24.xml><?xml version="1.0" encoding="utf-8"?>
+<p:notes xmlns:a="http://schemas.openxmlformats.org/drawingml/2006/main" xmlns:r="http://schemas.openxmlformats.org/officeDocument/2006/relationships" xmlns:p="http://schemas.openxmlformats.org/presentationml/2006/main">
+  <p:cSld>
+    <p:spTree>
+      <p:nvGrpSpPr>
+        <p:cNvPr id="1" name=""/>
+        <p:cNvGrpSpPr/>
+        <p:nvPr/>
+      </p:nvGrpSpPr>
+      <p:grpSpPr>
+        <a:xfrm>
+          <a:off x="0" y="0"/>
+          <a:ext cx="0" cy="0"/>
+          <a:chOff x="0" y="0"/>
+          <a:chExt cx="0" cy="0"/>
+        </a:xfrm>
+      </p:grpSpPr>
+      <p:sp>
+        <p:nvSpPr>
+          <p:cNvPr id="2" name="Folienbildplatzhalter 1"/>
+          <p:cNvSpPr>
+            <a:spLocks noGrp="1" noRot="1" noChangeAspect="1"/>
+          </p:cNvSpPr>
+          <p:nvPr>
+            <p:ph type="sldImg"/>
+          </p:nvPr>
+        </p:nvSpPr>
+        <p:spPr/>
+      </p:sp>
+      <p:sp>
+        <p:nvSpPr>
+          <p:cNvPr id="3" name="Notizenplatzhalter 2"/>
+          <p:cNvSpPr>
+            <a:spLocks noGrp="1"/>
+          </p:cNvSpPr>
+          <p:nvPr>
+            <p:ph type="body" idx="1"/>
+          </p:nvPr>
+        </p:nvSpPr>
+        <p:spPr/>
+        <p:txBody>
+          <a:bodyPr/>
+          <a:lstStyle/>
+          <a:p>
+            <a:pPr marL="171450" indent="-171450">
+              <a:buFontTx/>
+              <a:buChar char="-"/>
+            </a:pPr>
+            <a:r>
+              <a:rPr lang="de-DE" dirty="0"/>
+              <a:t>Neues Datenset per API geholt, vorherige Transformationen ausgeführt (bis zum </a:t>
+            </a:r>
+            <a:r>
+              <a:rPr lang="de-DE" dirty="0" err="1"/>
+              <a:t>data_split</a:t>
+            </a:r>
+            <a:r>
+              <a:rPr lang="de-DE" dirty="0"/>
+              <a:t>), Modell nochmal darauf ausgeführt.</a:t>
+            </a:r>
+          </a:p>
+          <a:p>
+            <a:pPr marL="171450" indent="-171450">
+              <a:buFontTx/>
+              <a:buChar char="-"/>
+            </a:pPr>
+            <a:r>
+              <a:rPr lang="de-DE" dirty="0"/>
+              <a:t>Schaubild sehr ähnlich zu vorherigem, hier Zoom auf </a:t>
+            </a:r>
+            <a:r>
+              <a:rPr lang="de-DE" dirty="0" err="1"/>
+              <a:t>Prediction</a:t>
+            </a:r>
+            <a:r>
+              <a:rPr lang="de-DE" dirty="0"/>
+              <a:t> Value &lt; 1</a:t>
+            </a:r>
+          </a:p>
+          <a:p>
+            <a:pPr marL="171450" indent="-171450">
+              <a:buFontTx/>
+              <a:buChar char="-"/>
+            </a:pPr>
+            <a:r>
+              <a:rPr lang="de-DE" dirty="0"/>
+              <a:t>Man sieht schon gewisse Abweichungen, die meisten Gegenstände zu niedrig geschätzt, v.a. Crafting-Material. </a:t>
+            </a:r>
+            <a:r>
+              <a:rPr lang="de-DE" dirty="0" err="1"/>
+              <a:t>Consumables</a:t>
+            </a:r>
+            <a:r>
+              <a:rPr lang="de-DE" dirty="0"/>
+              <a:t> eher zu hoch eingeschätzt</a:t>
+            </a:r>
+          </a:p>
+        </p:txBody>
+      </p:sp>
+      <p:sp>
+        <p:nvSpPr>
+          <p:cNvPr id="4" name="Foliennummernplatzhalter 3"/>
+          <p:cNvSpPr>
+            <a:spLocks noGrp="1"/>
+          </p:cNvSpPr>
+          <p:nvPr>
+            <p:ph type="sldNum" sz="quarter" idx="5"/>
+          </p:nvPr>
+        </p:nvSpPr>
+        <p:spPr/>
+        <p:txBody>
+          <a:bodyPr/>
+          <a:lstStyle/>
+          <a:p>
+            <a:fld id="{AB73F393-EB1A-4CCE-B775-A92EAEF2FC41}" type="slidenum">
+              <a:rPr lang="de-DE" smtClean="0"/>
+              <a:t>24</a:t>
+            </a:fld>
+            <a:endParaRPr lang="de-DE"/>
+          </a:p>
+        </p:txBody>
+      </p:sp>
+    </p:spTree>
+    <p:extLst>
+      <p:ext uri="{BB962C8B-B14F-4D97-AF65-F5344CB8AC3E}">
+        <p14:creationId xmlns:p14="http://schemas.microsoft.com/office/powerpoint/2010/main" val="796524575"/>
+      </p:ext>
+    </p:extLst>
+  </p:cSld>
+  <p:clrMapOvr>
+    <a:masterClrMapping/>
+  </p:clrMapOvr>
+</p:notes>
+</file>
+
+<file path=ppt/notesSlides/notesSlide25.xml><?xml version="1.0" encoding="utf-8"?>
+<p:notes xmlns:a="http://schemas.openxmlformats.org/drawingml/2006/main" xmlns:r="http://schemas.openxmlformats.org/officeDocument/2006/relationships" xmlns:p="http://schemas.openxmlformats.org/presentationml/2006/main">
+  <p:cSld>
+    <p:spTree>
+      <p:nvGrpSpPr>
+        <p:cNvPr id="1" name=""/>
+        <p:cNvGrpSpPr/>
+        <p:nvPr/>
+      </p:nvGrpSpPr>
+      <p:grpSpPr>
+        <a:xfrm>
+          <a:off x="0" y="0"/>
+          <a:ext cx="0" cy="0"/>
+          <a:chOff x="0" y="0"/>
+          <a:chExt cx="0" cy="0"/>
+        </a:xfrm>
+      </p:grpSpPr>
+      <p:sp>
+        <p:nvSpPr>
+          <p:cNvPr id="2" name="Folienbildplatzhalter 1"/>
+          <p:cNvSpPr>
+            <a:spLocks noGrp="1" noRot="1" noChangeAspect="1"/>
+          </p:cNvSpPr>
+          <p:nvPr>
+            <p:ph type="sldImg"/>
+          </p:nvPr>
+        </p:nvSpPr>
+        <p:spPr/>
+      </p:sp>
+      <p:sp>
+        <p:nvSpPr>
+          <p:cNvPr id="3" name="Notizenplatzhalter 2"/>
+          <p:cNvSpPr>
+            <a:spLocks noGrp="1"/>
+          </p:cNvSpPr>
+          <p:nvPr>
+            <p:ph type="body" idx="1"/>
+          </p:nvPr>
+        </p:nvSpPr>
+        <p:spPr/>
+        <p:txBody>
+          <a:bodyPr/>
+          <a:lstStyle/>
+          <a:p>
+            <a:r>
+              <a:rPr lang="de-DE" dirty="0"/>
+              <a:t>- Wenig gewinn bei wenig Einsatz</a:t>
+            </a:r>
+          </a:p>
+        </p:txBody>
+      </p:sp>
+      <p:sp>
+        <p:nvSpPr>
+          <p:cNvPr id="4" name="Foliennummernplatzhalter 3"/>
+          <p:cNvSpPr>
+            <a:spLocks noGrp="1"/>
+          </p:cNvSpPr>
+          <p:nvPr>
+            <p:ph type="sldNum" sz="quarter" idx="5"/>
+          </p:nvPr>
+        </p:nvSpPr>
+        <p:spPr/>
+        <p:txBody>
+          <a:bodyPr/>
+          <a:lstStyle/>
+          <a:p>
+            <a:fld id="{AB73F393-EB1A-4CCE-B775-A92EAEF2FC41}" type="slidenum">
+              <a:rPr lang="de-DE" smtClean="0"/>
+              <a:t>25</a:t>
+            </a:fld>
+            <a:endParaRPr lang="de-DE"/>
+          </a:p>
+        </p:txBody>
+      </p:sp>
+    </p:spTree>
+    <p:extLst>
+      <p:ext uri="{BB962C8B-B14F-4D97-AF65-F5344CB8AC3E}">
+        <p14:creationId xmlns:p14="http://schemas.microsoft.com/office/powerpoint/2010/main" val="1236496984"/>
+      </p:ext>
+    </p:extLst>
+  </p:cSld>
+  <p:clrMapOvr>
+    <a:masterClrMapping/>
+  </p:clrMapOvr>
+</p:notes>
+</file>
+
+<file path=ppt/notesSlides/notesSlide26.xml><?xml version="1.0" encoding="utf-8"?>
+<p:notes xmlns:a="http://schemas.openxmlformats.org/drawingml/2006/main" xmlns:r="http://schemas.openxmlformats.org/officeDocument/2006/relationships" xmlns:p="http://schemas.openxmlformats.org/presentationml/2006/main">
+  <p:cSld>
+    <p:spTree>
+      <p:nvGrpSpPr>
+        <p:cNvPr id="1" name=""/>
+        <p:cNvGrpSpPr/>
+        <p:nvPr/>
+      </p:nvGrpSpPr>
+      <p:grpSpPr>
+        <a:xfrm>
+          <a:off x="0" y="0"/>
+          <a:ext cx="0" cy="0"/>
+          <a:chOff x="0" y="0"/>
+          <a:chExt cx="0" cy="0"/>
+        </a:xfrm>
+      </p:grpSpPr>
+      <p:sp>
+        <p:nvSpPr>
+          <p:cNvPr id="2" name="Folienbildplatzhalter 1"/>
+          <p:cNvSpPr>
+            <a:spLocks noGrp="1" noRot="1" noChangeAspect="1"/>
+          </p:cNvSpPr>
+          <p:nvPr>
+            <p:ph type="sldImg"/>
+          </p:nvPr>
+        </p:nvSpPr>
+        <p:spPr/>
+      </p:sp>
+      <p:sp>
+        <p:nvSpPr>
+          <p:cNvPr id="3" name="Notizenplatzhalter 2"/>
+          <p:cNvSpPr>
+            <a:spLocks noGrp="1"/>
+          </p:cNvSpPr>
+          <p:nvPr>
+            <p:ph type="body" idx="1"/>
+          </p:nvPr>
+        </p:nvSpPr>
+        <p:spPr/>
+        <p:txBody>
+          <a:bodyPr/>
+          <a:lstStyle/>
+          <a:p>
+            <a:r>
+              <a:rPr lang="de-DE" dirty="0"/>
+              <a:t>- Modell hat leider nur ein Wert berücksichtigt</a:t>
+            </a:r>
+          </a:p>
+          <a:p>
+            <a:pPr marL="171450" indent="-171450">
+              <a:buFontTx/>
+              <a:buChar char="-"/>
+            </a:pPr>
+            <a:r>
+              <a:rPr lang="de-DE" dirty="0"/>
+              <a:t>Vorhersage relativ genau, aber keine großen Ausreißer, die man sich näher hätte anschauen können</a:t>
+            </a:r>
+          </a:p>
+          <a:p>
+            <a:pPr marL="171450" indent="-171450">
+              <a:buFontTx/>
+              <a:buChar char="-"/>
+            </a:pPr>
+            <a:r>
+              <a:rPr lang="de-DE" dirty="0"/>
+              <a:t>Es gibt einige Personen, die auf diese Weise versuchen Geld zu verdienen</a:t>
+            </a:r>
+          </a:p>
+          <a:p>
+            <a:pPr marL="171450" indent="-171450">
+              <a:buFontTx/>
+              <a:buChar char="-"/>
+            </a:pPr>
+            <a:r>
+              <a:rPr lang="de-DE" dirty="0"/>
+              <a:t>Sieht man auch an den Fan-Webseite</a:t>
+            </a:r>
+          </a:p>
+        </p:txBody>
+      </p:sp>
+      <p:sp>
+        <p:nvSpPr>
+          <p:cNvPr id="4" name="Foliennummernplatzhalter 3"/>
+          <p:cNvSpPr>
+            <a:spLocks noGrp="1"/>
+          </p:cNvSpPr>
+          <p:nvPr>
+            <p:ph type="sldNum" sz="quarter" idx="5"/>
+          </p:nvPr>
+        </p:nvSpPr>
+        <p:spPr/>
+        <p:txBody>
+          <a:bodyPr/>
+          <a:lstStyle/>
+          <a:p>
+            <a:fld id="{AB73F393-EB1A-4CCE-B775-A92EAEF2FC41}" type="slidenum">
+              <a:rPr lang="de-DE" smtClean="0"/>
+              <a:t>26</a:t>
+            </a:fld>
+            <a:endParaRPr lang="de-DE"/>
+          </a:p>
+        </p:txBody>
+      </p:sp>
+    </p:spTree>
+    <p:extLst>
+      <p:ext uri="{BB962C8B-B14F-4D97-AF65-F5344CB8AC3E}">
+        <p14:creationId xmlns:p14="http://schemas.microsoft.com/office/powerpoint/2010/main" val="3624150930"/>
+      </p:ext>
+    </p:extLst>
+  </p:cSld>
+  <p:clrMapOvr>
+    <a:masterClrMapping/>
+  </p:clrMapOvr>
+</p:notes>
+</file>
+
+<file path=ppt/notesSlides/notesSlide27.xml><?xml version="1.0" encoding="utf-8"?>
+<p:notes xmlns:a="http://schemas.openxmlformats.org/drawingml/2006/main" xmlns:r="http://schemas.openxmlformats.org/officeDocument/2006/relationships" xmlns:p="http://schemas.openxmlformats.org/presentationml/2006/main">
+  <p:cSld>
+    <p:spTree>
+      <p:nvGrpSpPr>
+        <p:cNvPr id="1" name=""/>
+        <p:cNvGrpSpPr/>
+        <p:nvPr/>
+      </p:nvGrpSpPr>
+      <p:grpSpPr>
+        <a:xfrm>
+          <a:off x="0" y="0"/>
+          <a:ext cx="0" cy="0"/>
+          <a:chOff x="0" y="0"/>
+          <a:chExt cx="0" cy="0"/>
+        </a:xfrm>
+      </p:grpSpPr>
+      <p:sp>
+        <p:nvSpPr>
+          <p:cNvPr id="2" name="Folienbildplatzhalter 1"/>
+          <p:cNvSpPr>
+            <a:spLocks noGrp="1" noRot="1" noChangeAspect="1"/>
+          </p:cNvSpPr>
+          <p:nvPr>
+            <p:ph type="sldImg"/>
+          </p:nvPr>
+        </p:nvSpPr>
+        <p:spPr/>
+      </p:sp>
+      <p:sp>
+        <p:nvSpPr>
+          <p:cNvPr id="3" name="Notizenplatzhalter 2"/>
+          <p:cNvSpPr>
+            <a:spLocks noGrp="1"/>
+          </p:cNvSpPr>
+          <p:nvPr>
+            <p:ph type="body" idx="1"/>
+          </p:nvPr>
+        </p:nvSpPr>
+        <p:spPr/>
+        <p:txBody>
+          <a:bodyPr/>
+          <a:lstStyle/>
+          <a:p>
+            <a:pPr marL="171450" indent="-171450">
+              <a:buFontTx/>
+              <a:buChar char="-"/>
+            </a:pPr>
+            <a:r>
+              <a:rPr lang="de-DE" dirty="0"/>
+              <a:t>Dashboard ist </a:t>
+            </a:r>
+            <a:r>
+              <a:rPr lang="de-DE" dirty="0" err="1"/>
+              <a:t>gehosted</a:t>
+            </a:r>
+            <a:r>
+              <a:rPr lang="de-DE" dirty="0"/>
+              <a:t> als Docker Container in Azure (Container </a:t>
+            </a:r>
+            <a:r>
+              <a:rPr lang="de-DE" dirty="0" err="1"/>
+              <a:t>Instances</a:t>
+            </a:r>
+            <a:r>
+              <a:rPr lang="de-DE" dirty="0"/>
+              <a:t>)</a:t>
+            </a:r>
+          </a:p>
+          <a:p>
+            <a:pPr marL="171450" indent="-171450">
+              <a:buFontTx/>
+              <a:buChar char="-"/>
+            </a:pPr>
+            <a:r>
+              <a:rPr lang="de-DE"/>
+              <a:t>Globale Filter</a:t>
+            </a:r>
+            <a:endParaRPr lang="de-DE" dirty="0"/>
+          </a:p>
+        </p:txBody>
+      </p:sp>
+      <p:sp>
+        <p:nvSpPr>
+          <p:cNvPr id="4" name="Foliennummernplatzhalter 3"/>
+          <p:cNvSpPr>
+            <a:spLocks noGrp="1"/>
+          </p:cNvSpPr>
+          <p:nvPr>
+            <p:ph type="sldNum" sz="quarter" idx="5"/>
+          </p:nvPr>
+        </p:nvSpPr>
+        <p:spPr/>
+        <p:txBody>
+          <a:bodyPr/>
+          <a:lstStyle/>
+          <a:p>
+            <a:fld id="{AB73F393-EB1A-4CCE-B775-A92EAEF2FC41}" type="slidenum">
+              <a:rPr lang="de-DE" smtClean="0"/>
+              <a:t>27</a:t>
+            </a:fld>
+            <a:endParaRPr lang="de-DE"/>
+          </a:p>
+        </p:txBody>
+      </p:sp>
+    </p:spTree>
+    <p:extLst>
+      <p:ext uri="{BB962C8B-B14F-4D97-AF65-F5344CB8AC3E}">
+        <p14:creationId xmlns:p14="http://schemas.microsoft.com/office/powerpoint/2010/main" val="1982687662"/>
+      </p:ext>
+    </p:extLst>
+  </p:cSld>
+  <p:clrMapOvr>
+    <a:masterClrMapping/>
+  </p:clrMapOvr>
+</p:notes>
+</file>
+
+<file path=ppt/notesSlides/notesSlide3.xml><?xml version="1.0" encoding="utf-8"?>
+<p:notes xmlns:a="http://schemas.openxmlformats.org/drawingml/2006/main" xmlns:r="http://schemas.openxmlformats.org/officeDocument/2006/relationships" xmlns:p="http://schemas.openxmlformats.org/presentationml/2006/main">
+  <p:cSld>
+    <p:spTree>
+      <p:nvGrpSpPr>
+        <p:cNvPr id="1" name=""/>
+        <p:cNvGrpSpPr/>
+        <p:nvPr/>
+      </p:nvGrpSpPr>
+      <p:grpSpPr>
+        <a:xfrm>
+          <a:off x="0" y="0"/>
+          <a:ext cx="0" cy="0"/>
+          <a:chOff x="0" y="0"/>
+          <a:chExt cx="0" cy="0"/>
+        </a:xfrm>
+      </p:grpSpPr>
+      <p:sp>
+        <p:nvSpPr>
+          <p:cNvPr id="2" name="Folienbildplatzhalter 1"/>
+          <p:cNvSpPr>
+            <a:spLocks noGrp="1" noRot="1" noChangeAspect="1"/>
+          </p:cNvSpPr>
+          <p:nvPr>
+            <p:ph type="sldImg"/>
+          </p:nvPr>
+        </p:nvSpPr>
+        <p:spPr/>
+      </p:sp>
+      <p:sp>
+        <p:nvSpPr>
+          <p:cNvPr id="3" name="Notizenplatzhalter 2"/>
+          <p:cNvSpPr>
+            <a:spLocks noGrp="1"/>
+          </p:cNvSpPr>
+          <p:nvPr>
+            <p:ph type="body" idx="1"/>
+          </p:nvPr>
+        </p:nvSpPr>
+        <p:spPr/>
+        <p:txBody>
+          <a:bodyPr/>
+          <a:lstStyle/>
+          <a:p>
+            <a:pPr marL="171450" indent="-171450">
+              <a:buFontTx/>
+              <a:buChar char="-"/>
+            </a:pPr>
+            <a:r>
+              <a:rPr lang="de-DE" dirty="0"/>
+              <a:t>Guild Wars bietet eine REST-API um Daten zum Spiel abzurufen wie Karteninformationen, Statistiken über Spieler, Gegenstände usw.</a:t>
+            </a:r>
+          </a:p>
+          <a:p>
+            <a:pPr marL="171450" indent="-171450">
+              <a:buFontTx/>
+              <a:buChar char="-"/>
+            </a:pPr>
+            <a:r>
+              <a:rPr lang="de-DE" dirty="0"/>
+              <a:t>Ich nutze drei APIs: Alle Gegenstände abrufen, Kauf- und Verkaufsauktionen sowie Detailinformationen pro Gegenstand abrufen</a:t>
+            </a:r>
+          </a:p>
+          <a:p>
+            <a:pPr marL="171450" indent="-171450">
+              <a:buFontTx/>
+              <a:buChar char="-"/>
+            </a:pPr>
+            <a:r>
+              <a:rPr lang="de-DE" dirty="0"/>
+              <a:t>Extrem viele Daten (siehe Slide) </a:t>
+            </a:r>
+            <a:r>
+              <a:rPr lang="de-DE" dirty="0">
+                <a:sym typeface="Wingdings" panose="05000000000000000000" pitchFamily="2" charset="2"/>
+              </a:rPr>
+              <a:t> nächste Seite</a:t>
+            </a:r>
+            <a:endParaRPr lang="de-DE" dirty="0"/>
+          </a:p>
+        </p:txBody>
+      </p:sp>
+      <p:sp>
+        <p:nvSpPr>
+          <p:cNvPr id="4" name="Foliennummernplatzhalter 3"/>
+          <p:cNvSpPr>
+            <a:spLocks noGrp="1"/>
+          </p:cNvSpPr>
+          <p:nvPr>
+            <p:ph type="sldNum" sz="quarter" idx="5"/>
+          </p:nvPr>
+        </p:nvSpPr>
+        <p:spPr/>
+        <p:txBody>
+          <a:bodyPr/>
+          <a:lstStyle/>
+          <a:p>
+            <a:fld id="{AB73F393-EB1A-4CCE-B775-A92EAEF2FC41}" type="slidenum">
+              <a:rPr lang="de-DE" smtClean="0"/>
+              <a:t>3</a:t>
+            </a:fld>
+            <a:endParaRPr lang="de-DE"/>
+          </a:p>
+        </p:txBody>
+      </p:sp>
+    </p:spTree>
+    <p:extLst>
+      <p:ext uri="{BB962C8B-B14F-4D97-AF65-F5344CB8AC3E}">
+        <p14:creationId xmlns:p14="http://schemas.microsoft.com/office/powerpoint/2010/main" val="1483081981"/>
+      </p:ext>
+    </p:extLst>
+  </p:cSld>
+  <p:clrMapOvr>
+    <a:masterClrMapping/>
+  </p:clrMapOvr>
+</p:notes>
+</file>
+
+<file path=ppt/notesSlides/notesSlide4.xml><?xml version="1.0" encoding="utf-8"?>
+<p:notes xmlns:a="http://schemas.openxmlformats.org/drawingml/2006/main" xmlns:r="http://schemas.openxmlformats.org/officeDocument/2006/relationships" xmlns:p="http://schemas.openxmlformats.org/presentationml/2006/main">
+  <p:cSld>
+    <p:spTree>
+      <p:nvGrpSpPr>
+        <p:cNvPr id="1" name=""/>
+        <p:cNvGrpSpPr/>
+        <p:nvPr/>
+      </p:nvGrpSpPr>
+      <p:grpSpPr>
+        <a:xfrm>
+          <a:off x="0" y="0"/>
+          <a:ext cx="0" cy="0"/>
+          <a:chOff x="0" y="0"/>
+          <a:chExt cx="0" cy="0"/>
+        </a:xfrm>
+      </p:grpSpPr>
+      <p:sp>
+        <p:nvSpPr>
+          <p:cNvPr id="2" name="Folienbildplatzhalter 1"/>
+          <p:cNvSpPr>
+            <a:spLocks noGrp="1" noRot="1" noChangeAspect="1"/>
+          </p:cNvSpPr>
+          <p:nvPr>
+            <p:ph type="sldImg"/>
+          </p:nvPr>
+        </p:nvSpPr>
+        <p:spPr/>
+      </p:sp>
+      <p:sp>
+        <p:nvSpPr>
+          <p:cNvPr id="3" name="Notizenplatzhalter 2"/>
+          <p:cNvSpPr>
+            <a:spLocks noGrp="1"/>
+          </p:cNvSpPr>
+          <p:nvPr>
+            <p:ph type="body" idx="1"/>
+          </p:nvPr>
+        </p:nvSpPr>
+        <p:spPr/>
+        <p:txBody>
+          <a:bodyPr/>
+          <a:lstStyle/>
+          <a:p>
+            <a:pPr marL="171450" indent="-171450">
+              <a:buFontTx/>
+              <a:buChar char="-"/>
+            </a:pPr>
+            <a:r>
+              <a:rPr lang="de-DE" dirty="0"/>
+              <a:t>Nur als Beispiel (</a:t>
+            </a:r>
+            <a:r>
+              <a:rPr lang="de-DE" dirty="0" err="1"/>
+              <a:t>current</a:t>
+            </a:r>
+            <a:r>
+              <a:rPr lang="de-DE" dirty="0"/>
+              <a:t> </a:t>
+            </a:r>
+            <a:r>
+              <a:rPr lang="de-DE" dirty="0" err="1"/>
+              <a:t>batch</a:t>
+            </a:r>
+            <a:r>
+              <a:rPr lang="de-DE" dirty="0"/>
+              <a:t> = Liste aus 200 Gegenstands-IDs)</a:t>
+            </a:r>
+          </a:p>
+          <a:p>
+            <a:pPr marL="171450" indent="-171450">
+              <a:buFontTx/>
+              <a:buChar char="-"/>
+            </a:pPr>
+            <a:r>
+              <a:rPr lang="de-DE" dirty="0"/>
+              <a:t>Daher war es nötig die Daten in Batches à 200 (Maximum) abzurufen</a:t>
+            </a:r>
+          </a:p>
+          <a:p>
+            <a:pPr marL="171450" indent="-171450">
+              <a:buFontTx/>
+              <a:buChar char="-"/>
+            </a:pPr>
+            <a:r>
+              <a:rPr lang="de-DE" dirty="0"/>
+              <a:t>Nutzen der Pakete: </a:t>
+            </a:r>
+            <a:r>
+              <a:rPr lang="de-DE" dirty="0" err="1"/>
+              <a:t>httr</a:t>
+            </a:r>
+            <a:r>
+              <a:rPr lang="de-DE" dirty="0"/>
+              <a:t> (Client) und </a:t>
+            </a:r>
+            <a:r>
+              <a:rPr lang="de-DE" dirty="0" err="1"/>
+              <a:t>jsonlite</a:t>
+            </a:r>
+            <a:r>
+              <a:rPr lang="de-DE" dirty="0"/>
+              <a:t> (JSON </a:t>
+            </a:r>
+            <a:r>
+              <a:rPr lang="de-DE" dirty="0" err="1"/>
+              <a:t>deserialisierung</a:t>
+            </a:r>
+            <a:r>
+              <a:rPr lang="de-DE" dirty="0"/>
+              <a:t>)</a:t>
+            </a:r>
+          </a:p>
+          <a:p>
+            <a:pPr marL="171450" indent="-171450">
+              <a:buFontTx/>
+              <a:buChar char="-"/>
+            </a:pPr>
+            <a:r>
+              <a:rPr lang="de-DE" dirty="0" err="1"/>
+              <a:t>Buys</a:t>
+            </a:r>
+            <a:r>
+              <a:rPr lang="de-DE" dirty="0"/>
+              <a:t> auslesen (analog </a:t>
+            </a:r>
+            <a:r>
+              <a:rPr lang="de-DE" dirty="0" err="1"/>
+              <a:t>sells</a:t>
+            </a:r>
+            <a:r>
+              <a:rPr lang="de-DE" dirty="0"/>
+              <a:t>)</a:t>
+            </a:r>
+          </a:p>
+          <a:p>
+            <a:endParaRPr lang="de-DE" dirty="0"/>
+          </a:p>
+        </p:txBody>
+      </p:sp>
+      <p:sp>
+        <p:nvSpPr>
+          <p:cNvPr id="4" name="Foliennummernplatzhalter 3"/>
+          <p:cNvSpPr>
+            <a:spLocks noGrp="1"/>
+          </p:cNvSpPr>
+          <p:nvPr>
+            <p:ph type="sldNum" sz="quarter" idx="5"/>
+          </p:nvPr>
+        </p:nvSpPr>
+        <p:spPr/>
+        <p:txBody>
+          <a:bodyPr/>
+          <a:lstStyle/>
+          <a:p>
+            <a:fld id="{AB73F393-EB1A-4CCE-B775-A92EAEF2FC41}" type="slidenum">
+              <a:rPr lang="de-DE" smtClean="0"/>
+              <a:t>4</a:t>
+            </a:fld>
+            <a:endParaRPr lang="de-DE"/>
+          </a:p>
+        </p:txBody>
+      </p:sp>
+    </p:spTree>
+    <p:extLst>
+      <p:ext uri="{BB962C8B-B14F-4D97-AF65-F5344CB8AC3E}">
+        <p14:creationId xmlns:p14="http://schemas.microsoft.com/office/powerpoint/2010/main" val="1588427074"/>
+      </p:ext>
+    </p:extLst>
+  </p:cSld>
+  <p:clrMapOvr>
+    <a:masterClrMapping/>
+  </p:clrMapOvr>
+</p:notes>
+</file>
+
+<file path=ppt/notesSlides/notesSlide5.xml><?xml version="1.0" encoding="utf-8"?>
+<p:notes xmlns:a="http://schemas.openxmlformats.org/drawingml/2006/main" xmlns:r="http://schemas.openxmlformats.org/officeDocument/2006/relationships" xmlns:p="http://schemas.openxmlformats.org/presentationml/2006/main">
+  <p:cSld>
+    <p:spTree>
+      <p:nvGrpSpPr>
+        <p:cNvPr id="1" name=""/>
+        <p:cNvGrpSpPr/>
+        <p:nvPr/>
+      </p:nvGrpSpPr>
+      <p:grpSpPr>
+        <a:xfrm>
+          <a:off x="0" y="0"/>
+          <a:ext cx="0" cy="0"/>
+          <a:chOff x="0" y="0"/>
+          <a:chExt cx="0" cy="0"/>
+        </a:xfrm>
+      </p:grpSpPr>
+      <p:sp>
+        <p:nvSpPr>
+          <p:cNvPr id="2" name="Folienbildplatzhalter 1"/>
+          <p:cNvSpPr>
+            <a:spLocks noGrp="1" noRot="1" noChangeAspect="1"/>
+          </p:cNvSpPr>
+          <p:nvPr>
+            <p:ph type="sldImg"/>
+          </p:nvPr>
+        </p:nvSpPr>
+        <p:spPr/>
+      </p:sp>
+      <p:sp>
+        <p:nvSpPr>
+          <p:cNvPr id="3" name="Notizenplatzhalter 2"/>
+          <p:cNvSpPr>
+            <a:spLocks noGrp="1"/>
+          </p:cNvSpPr>
+          <p:nvPr>
+            <p:ph type="body" idx="1"/>
+          </p:nvPr>
+        </p:nvSpPr>
+        <p:spPr/>
+        <p:txBody>
+          <a:bodyPr/>
+          <a:lstStyle/>
+          <a:p>
+            <a:pPr marL="171450" indent="-171450">
+              <a:buFontTx/>
+              <a:buChar char="-"/>
+            </a:pPr>
+            <a:r>
+              <a:rPr lang="de-DE" dirty="0"/>
+              <a:t>Alle Daten anhand der </a:t>
+            </a:r>
+            <a:r>
+              <a:rPr lang="de-DE" dirty="0" err="1"/>
+              <a:t>GegenstandsID</a:t>
+            </a:r>
+            <a:r>
+              <a:rPr lang="de-DE" dirty="0"/>
+              <a:t> zusammengeführt</a:t>
+            </a:r>
+          </a:p>
+          <a:p>
+            <a:pPr marL="171450" indent="-171450">
+              <a:buFontTx/>
+              <a:buChar char="-"/>
+            </a:pPr>
+            <a:r>
+              <a:rPr lang="de-DE" dirty="0"/>
+              <a:t>D.h. </a:t>
+            </a:r>
+            <a:r>
+              <a:rPr lang="de-DE" dirty="0" err="1"/>
+              <a:t>unit_price</a:t>
+            </a:r>
+            <a:r>
+              <a:rPr lang="de-DE" dirty="0"/>
+              <a:t> (Preis), </a:t>
+            </a:r>
+            <a:r>
+              <a:rPr lang="de-DE" dirty="0" err="1"/>
+              <a:t>quantity</a:t>
+            </a:r>
+            <a:r>
+              <a:rPr lang="de-DE" dirty="0"/>
+              <a:t> (Wie oft wird verkauft) aber auch </a:t>
+            </a:r>
+            <a:r>
+              <a:rPr lang="de-DE" dirty="0" err="1"/>
+              <a:t>name</a:t>
+            </a:r>
+            <a:r>
+              <a:rPr lang="de-DE" dirty="0"/>
+              <a:t>, type (Waffe, Rüstung etc.), </a:t>
+            </a:r>
+            <a:r>
+              <a:rPr lang="de-DE" dirty="0" err="1"/>
+              <a:t>rarity</a:t>
+            </a:r>
+            <a:r>
+              <a:rPr lang="de-DE" dirty="0"/>
+              <a:t> (Seltenheit)</a:t>
+            </a:r>
+          </a:p>
+        </p:txBody>
+      </p:sp>
+      <p:sp>
+        <p:nvSpPr>
+          <p:cNvPr id="4" name="Foliennummernplatzhalter 3"/>
+          <p:cNvSpPr>
+            <a:spLocks noGrp="1"/>
+          </p:cNvSpPr>
+          <p:nvPr>
+            <p:ph type="sldNum" sz="quarter" idx="5"/>
+          </p:nvPr>
+        </p:nvSpPr>
+        <p:spPr/>
+        <p:txBody>
+          <a:bodyPr/>
+          <a:lstStyle/>
+          <a:p>
+            <a:fld id="{AB73F393-EB1A-4CCE-B775-A92EAEF2FC41}" type="slidenum">
+              <a:rPr lang="de-DE" smtClean="0"/>
+              <a:t>5</a:t>
+            </a:fld>
+            <a:endParaRPr lang="de-DE"/>
+          </a:p>
+        </p:txBody>
+      </p:sp>
+    </p:spTree>
+    <p:extLst>
+      <p:ext uri="{BB962C8B-B14F-4D97-AF65-F5344CB8AC3E}">
+        <p14:creationId xmlns:p14="http://schemas.microsoft.com/office/powerpoint/2010/main" val="2902092334"/>
+      </p:ext>
+    </p:extLst>
+  </p:cSld>
+  <p:clrMapOvr>
+    <a:masterClrMapping/>
+  </p:clrMapOvr>
+</p:notes>
+</file>
+
+<file path=ppt/notesSlides/notesSlide6.xml><?xml version="1.0" encoding="utf-8"?>
+<p:notes xmlns:a="http://schemas.openxmlformats.org/drawingml/2006/main" xmlns:r="http://schemas.openxmlformats.org/officeDocument/2006/relationships" xmlns:p="http://schemas.openxmlformats.org/presentationml/2006/main">
+  <p:cSld>
+    <p:spTree>
+      <p:nvGrpSpPr>
+        <p:cNvPr id="1" name=""/>
+        <p:cNvGrpSpPr/>
+        <p:nvPr/>
+      </p:nvGrpSpPr>
+      <p:grpSpPr>
+        <a:xfrm>
+          <a:off x="0" y="0"/>
+          <a:ext cx="0" cy="0"/>
+          <a:chOff x="0" y="0"/>
+          <a:chExt cx="0" cy="0"/>
+        </a:xfrm>
+      </p:grpSpPr>
+      <p:sp>
+        <p:nvSpPr>
+          <p:cNvPr id="2" name="Folienbildplatzhalter 1"/>
+          <p:cNvSpPr>
+            <a:spLocks noGrp="1" noRot="1" noChangeAspect="1"/>
+          </p:cNvSpPr>
+          <p:nvPr>
+            <p:ph type="sldImg"/>
+          </p:nvPr>
+        </p:nvSpPr>
+        <p:spPr/>
+      </p:sp>
+      <p:sp>
+        <p:nvSpPr>
+          <p:cNvPr id="3" name="Notizenplatzhalter 2"/>
+          <p:cNvSpPr>
+            <a:spLocks noGrp="1"/>
+          </p:cNvSpPr>
+          <p:nvPr>
+            <p:ph type="body" idx="1"/>
+          </p:nvPr>
+        </p:nvSpPr>
+        <p:spPr/>
+        <p:txBody>
+          <a:bodyPr/>
+          <a:lstStyle/>
+          <a:p>
+            <a:r>
+              <a:rPr lang="de-DE" dirty="0"/>
+              <a:t>Unit Price wird in Kupfer angegeben (kleinste Währung)</a:t>
+            </a:r>
+          </a:p>
+          <a:p>
+            <a:r>
+              <a:rPr lang="de-DE" dirty="0"/>
+              <a:t>10.000 Kupfer = 100 Silber = 1 Gold</a:t>
+            </a:r>
+          </a:p>
+        </p:txBody>
+      </p:sp>
+      <p:sp>
+        <p:nvSpPr>
+          <p:cNvPr id="4" name="Foliennummernplatzhalter 3"/>
+          <p:cNvSpPr>
+            <a:spLocks noGrp="1"/>
+          </p:cNvSpPr>
+          <p:nvPr>
+            <p:ph type="sldNum" sz="quarter" idx="5"/>
+          </p:nvPr>
+        </p:nvSpPr>
+        <p:spPr/>
+        <p:txBody>
+          <a:bodyPr/>
+          <a:lstStyle/>
+          <a:p>
+            <a:fld id="{AB73F393-EB1A-4CCE-B775-A92EAEF2FC41}" type="slidenum">
+              <a:rPr lang="de-DE" smtClean="0"/>
+              <a:t>6</a:t>
+            </a:fld>
+            <a:endParaRPr lang="de-DE"/>
+          </a:p>
+        </p:txBody>
+      </p:sp>
+    </p:spTree>
+    <p:extLst>
+      <p:ext uri="{BB962C8B-B14F-4D97-AF65-F5344CB8AC3E}">
+        <p14:creationId xmlns:p14="http://schemas.microsoft.com/office/powerpoint/2010/main" val="972454359"/>
+      </p:ext>
+    </p:extLst>
+  </p:cSld>
+  <p:clrMapOvr>
+    <a:masterClrMapping/>
+  </p:clrMapOvr>
+</p:notes>
+</file>
+
+<file path=ppt/notesSlides/notesSlide7.xml><?xml version="1.0" encoding="utf-8"?>
+<p:notes xmlns:a="http://schemas.openxmlformats.org/drawingml/2006/main" xmlns:r="http://schemas.openxmlformats.org/officeDocument/2006/relationships" xmlns:p="http://schemas.openxmlformats.org/presentationml/2006/main">
+  <p:cSld>
+    <p:spTree>
+      <p:nvGrpSpPr>
+        <p:cNvPr id="1" name=""/>
+        <p:cNvGrpSpPr/>
+        <p:nvPr/>
+      </p:nvGrpSpPr>
+      <p:grpSpPr>
+        <a:xfrm>
+          <a:off x="0" y="0"/>
+          <a:ext cx="0" cy="0"/>
+          <a:chOff x="0" y="0"/>
+          <a:chExt cx="0" cy="0"/>
+        </a:xfrm>
+      </p:grpSpPr>
+      <p:sp>
+        <p:nvSpPr>
+          <p:cNvPr id="2" name="Folienbildplatzhalter 1"/>
+          <p:cNvSpPr>
+            <a:spLocks noGrp="1" noRot="1" noChangeAspect="1"/>
+          </p:cNvSpPr>
+          <p:nvPr>
+            <p:ph type="sldImg"/>
+          </p:nvPr>
+        </p:nvSpPr>
+        <p:spPr/>
+      </p:sp>
+      <p:sp>
+        <p:nvSpPr>
+          <p:cNvPr id="3" name="Notizenplatzhalter 2"/>
+          <p:cNvSpPr>
+            <a:spLocks noGrp="1"/>
+          </p:cNvSpPr>
+          <p:nvPr>
+            <p:ph type="body" idx="1"/>
+          </p:nvPr>
+        </p:nvSpPr>
+        <p:spPr/>
+        <p:txBody>
+          <a:bodyPr/>
+          <a:lstStyle/>
+          <a:p>
+            <a:r>
+              <a:rPr lang="de-DE" dirty="0"/>
+              <a:t>Jetzt wird es interessant, wie funktioniert der Kauf/Verkauf?</a:t>
+            </a:r>
+          </a:p>
+          <a:p>
+            <a:endParaRPr lang="de-DE" dirty="0"/>
+          </a:p>
+          <a:p>
+            <a:r>
+              <a:rPr lang="de-DE" dirty="0"/>
+              <a:t>Wenn ein Spieler etwas verkaufen möchte, kann er zum teuersten Preis verkaufen (linke Seite) – Preis nimmt nach unten hin ab.</a:t>
+            </a:r>
+          </a:p>
+          <a:p>
+            <a:r>
+              <a:rPr lang="de-DE" dirty="0"/>
+              <a:t>Wenn ein Spieler etwas kaufen möchte, kann er zum günstigsten Verkaufspreis kaufen (rechte Seite) – Preis nimmt nach unten hin zu.</a:t>
+            </a:r>
+          </a:p>
+          <a:p>
+            <a:r>
+              <a:rPr lang="de-DE" dirty="0"/>
+              <a:t>Das Spiel wählt automatisch das für den Spieler beste Angebot, d.h. alle anderen Angebote sind relativ irrelevant (je nachdem wie oft das Angebot vorkommt).</a:t>
+            </a:r>
+          </a:p>
+          <a:p>
+            <a:endParaRPr lang="de-DE" dirty="0"/>
+          </a:p>
+        </p:txBody>
+      </p:sp>
+      <p:sp>
+        <p:nvSpPr>
+          <p:cNvPr id="4" name="Foliennummernplatzhalter 3"/>
+          <p:cNvSpPr>
+            <a:spLocks noGrp="1"/>
+          </p:cNvSpPr>
+          <p:nvPr>
+            <p:ph type="sldNum" sz="quarter" idx="5"/>
+          </p:nvPr>
+        </p:nvSpPr>
+        <p:spPr/>
+        <p:txBody>
+          <a:bodyPr/>
+          <a:lstStyle/>
+          <a:p>
+            <a:fld id="{AB73F393-EB1A-4CCE-B775-A92EAEF2FC41}" type="slidenum">
+              <a:rPr lang="de-DE" smtClean="0"/>
+              <a:t>7</a:t>
+            </a:fld>
+            <a:endParaRPr lang="de-DE"/>
+          </a:p>
+        </p:txBody>
+      </p:sp>
+    </p:spTree>
+    <p:extLst>
+      <p:ext uri="{BB962C8B-B14F-4D97-AF65-F5344CB8AC3E}">
+        <p14:creationId xmlns:p14="http://schemas.microsoft.com/office/powerpoint/2010/main" val="1694921965"/>
+      </p:ext>
+    </p:extLst>
+  </p:cSld>
+  <p:clrMapOvr>
+    <a:masterClrMapping/>
+  </p:clrMapOvr>
+</p:notes>
+</file>
+
+<file path=ppt/notesSlides/notesSlide8.xml><?xml version="1.0" encoding="utf-8"?>
+<p:notes xmlns:a="http://schemas.openxmlformats.org/drawingml/2006/main" xmlns:r="http://schemas.openxmlformats.org/officeDocument/2006/relationships" xmlns:p="http://schemas.openxmlformats.org/presentationml/2006/main">
+  <p:cSld>
+    <p:spTree>
+      <p:nvGrpSpPr>
+        <p:cNvPr id="1" name=""/>
+        <p:cNvGrpSpPr/>
+        <p:nvPr/>
+      </p:nvGrpSpPr>
+      <p:grpSpPr>
+        <a:xfrm>
+          <a:off x="0" y="0"/>
+          <a:ext cx="0" cy="0"/>
+          <a:chOff x="0" y="0"/>
+          <a:chExt cx="0" cy="0"/>
+        </a:xfrm>
+      </p:grpSpPr>
+      <p:sp>
+        <p:nvSpPr>
+          <p:cNvPr id="2" name="Folienbildplatzhalter 1"/>
+          <p:cNvSpPr>
+            <a:spLocks noGrp="1" noRot="1" noChangeAspect="1"/>
+          </p:cNvSpPr>
+          <p:nvPr>
+            <p:ph type="sldImg"/>
+          </p:nvPr>
+        </p:nvSpPr>
+        <p:spPr/>
+      </p:sp>
+      <p:sp>
+        <p:nvSpPr>
+          <p:cNvPr id="3" name="Notizenplatzhalter 2"/>
+          <p:cNvSpPr>
+            <a:spLocks noGrp="1"/>
+          </p:cNvSpPr>
+          <p:nvPr>
+            <p:ph type="body" idx="1"/>
+          </p:nvPr>
+        </p:nvSpPr>
+        <p:spPr/>
+        <p:txBody>
+          <a:bodyPr/>
+          <a:lstStyle/>
+          <a:p>
+            <a:pPr marL="171450" indent="-171450">
+              <a:buFontTx/>
+              <a:buChar char="-"/>
+            </a:pPr>
+            <a:r>
+              <a:rPr lang="de-DE" dirty="0"/>
+              <a:t>Da es noch immer sehr viele Daten sind, filtern wir nur genau diese Angebote (max. Kaufpreis und analog min. Verkaufspreis)</a:t>
+            </a:r>
+          </a:p>
+          <a:p>
+            <a:pPr marL="171450" indent="-171450">
+              <a:buFontTx/>
+              <a:buChar char="-"/>
+            </a:pPr>
+            <a:r>
+              <a:rPr lang="de-DE" dirty="0"/>
+              <a:t>Dadurch werden auch bereits viele unrelevante Angebote gefiltert</a:t>
+            </a:r>
+          </a:p>
+          <a:p>
+            <a:pPr marL="171450" indent="-171450">
+              <a:buFontTx/>
+              <a:buChar char="-"/>
+            </a:pPr>
+            <a:r>
+              <a:rPr lang="de-DE" dirty="0"/>
+              <a:t>Wenn das utopische Angebot allerdings das einzige war, wird es noch immer vorkommen (sehen wir gleich)</a:t>
+            </a:r>
+          </a:p>
+        </p:txBody>
+      </p:sp>
+      <p:sp>
+        <p:nvSpPr>
+          <p:cNvPr id="4" name="Foliennummernplatzhalter 3"/>
+          <p:cNvSpPr>
+            <a:spLocks noGrp="1"/>
+          </p:cNvSpPr>
+          <p:nvPr>
+            <p:ph type="sldNum" sz="quarter" idx="5"/>
+          </p:nvPr>
+        </p:nvSpPr>
+        <p:spPr/>
+        <p:txBody>
+          <a:bodyPr/>
+          <a:lstStyle/>
+          <a:p>
+            <a:fld id="{AB73F393-EB1A-4CCE-B775-A92EAEF2FC41}" type="slidenum">
+              <a:rPr lang="de-DE" smtClean="0"/>
+              <a:t>8</a:t>
+            </a:fld>
+            <a:endParaRPr lang="de-DE"/>
+          </a:p>
+        </p:txBody>
+      </p:sp>
+    </p:spTree>
+    <p:extLst>
+      <p:ext uri="{BB962C8B-B14F-4D97-AF65-F5344CB8AC3E}">
+        <p14:creationId xmlns:p14="http://schemas.microsoft.com/office/powerpoint/2010/main" val="1834237257"/>
+      </p:ext>
+    </p:extLst>
+  </p:cSld>
+  <p:clrMapOvr>
+    <a:masterClrMapping/>
+  </p:clrMapOvr>
+</p:notes>
+</file>
+
+<file path=ppt/notesSlides/notesSlide9.xml><?xml version="1.0" encoding="utf-8"?>
+<p:notes xmlns:a="http://schemas.openxmlformats.org/drawingml/2006/main" xmlns:r="http://schemas.openxmlformats.org/officeDocument/2006/relationships" xmlns:p="http://schemas.openxmlformats.org/presentationml/2006/main">
+  <p:cSld>
+    <p:spTree>
+      <p:nvGrpSpPr>
+        <p:cNvPr id="1" name=""/>
+        <p:cNvGrpSpPr/>
+        <p:nvPr/>
+      </p:nvGrpSpPr>
+      <p:grpSpPr>
+        <a:xfrm>
+          <a:off x="0" y="0"/>
+          <a:ext cx="0" cy="0"/>
+          <a:chOff x="0" y="0"/>
+          <a:chExt cx="0" cy="0"/>
+        </a:xfrm>
+      </p:grpSpPr>
+      <p:sp>
+        <p:nvSpPr>
+          <p:cNvPr id="2" name="Folienbildplatzhalter 1"/>
+          <p:cNvSpPr>
+            <a:spLocks noGrp="1" noRot="1" noChangeAspect="1"/>
+          </p:cNvSpPr>
+          <p:nvPr>
+            <p:ph type="sldImg"/>
+          </p:nvPr>
+        </p:nvSpPr>
+        <p:spPr/>
+      </p:sp>
+      <p:sp>
+        <p:nvSpPr>
+          <p:cNvPr id="3" name="Notizenplatzhalter 2"/>
+          <p:cNvSpPr>
+            <a:spLocks noGrp="1"/>
+          </p:cNvSpPr>
+          <p:nvPr>
+            <p:ph type="body" idx="1"/>
+          </p:nvPr>
+        </p:nvSpPr>
+        <p:spPr/>
+        <p:txBody>
+          <a:bodyPr/>
+          <a:lstStyle/>
+          <a:p>
+            <a:pPr marL="171450" indent="-171450">
+              <a:buFontTx/>
+              <a:buChar char="-"/>
+            </a:pPr>
+            <a:r>
+              <a:rPr lang="de-DE" dirty="0"/>
+              <a:t>Der Staat möchte immer etwas mitverdienen, so ist es bei Guild Wars auch - was ist unser wirklicher Gewinn?</a:t>
+            </a:r>
+          </a:p>
+          <a:p>
+            <a:pPr marL="171450" indent="-171450">
+              <a:buFontTx/>
+              <a:buChar char="-"/>
+            </a:pPr>
+            <a:r>
+              <a:rPr lang="de-DE" dirty="0"/>
+              <a:t>5% für das Einstellen eines Angebots werden sofort abgezogen, d.h. am besten einen Gegenstand nur 1x einstellen. </a:t>
+            </a:r>
+          </a:p>
+          <a:p>
+            <a:pPr marL="171450" indent="-171450">
+              <a:buFontTx/>
+              <a:buChar char="-"/>
+            </a:pPr>
+            <a:r>
+              <a:rPr lang="de-DE" dirty="0"/>
+              <a:t>Das war teuer für denjenigen, der den Gegenstand für 10.000 Gold eingestellt hat (500 Gold direkt weg)</a:t>
+            </a:r>
+          </a:p>
+          <a:p>
+            <a:pPr marL="171450" indent="-171450">
+              <a:buFontTx/>
+              <a:buChar char="-"/>
+            </a:pPr>
+            <a:r>
+              <a:rPr lang="de-DE" dirty="0"/>
+              <a:t>Wenn wir etwas verkaufen, werden 10% weniger überwiesen</a:t>
+            </a:r>
+          </a:p>
+          <a:p>
+            <a:pPr marL="171450" indent="-171450">
+              <a:buFontTx/>
+              <a:buChar char="-"/>
+            </a:pPr>
+            <a:r>
+              <a:rPr lang="de-DE" dirty="0"/>
+              <a:t>D.h. unser Gewinn ist nur 85%</a:t>
+            </a:r>
+          </a:p>
+          <a:p>
+            <a:pPr marL="171450" indent="-171450">
+              <a:buFontTx/>
+              <a:buChar char="-"/>
+            </a:pPr>
+            <a:endParaRPr lang="de-DE" dirty="0"/>
+          </a:p>
+        </p:txBody>
+      </p:sp>
+      <p:sp>
+        <p:nvSpPr>
+          <p:cNvPr id="4" name="Foliennummernplatzhalter 3"/>
+          <p:cNvSpPr>
+            <a:spLocks noGrp="1"/>
+          </p:cNvSpPr>
+          <p:nvPr>
+            <p:ph type="sldNum" sz="quarter" idx="5"/>
+          </p:nvPr>
+        </p:nvSpPr>
+        <p:spPr/>
+        <p:txBody>
+          <a:bodyPr/>
+          <a:lstStyle/>
+          <a:p>
+            <a:fld id="{AB73F393-EB1A-4CCE-B775-A92EAEF2FC41}" type="slidenum">
+              <a:rPr lang="de-DE" smtClean="0"/>
+              <a:t>9</a:t>
+            </a:fld>
+            <a:endParaRPr lang="de-DE"/>
+          </a:p>
+        </p:txBody>
+      </p:sp>
+    </p:spTree>
+    <p:extLst>
+      <p:ext uri="{BB962C8B-B14F-4D97-AF65-F5344CB8AC3E}">
+        <p14:creationId xmlns:p14="http://schemas.microsoft.com/office/powerpoint/2010/main" val="3039752348"/>
+      </p:ext>
+    </p:extLst>
+  </p:cSld>
+  <p:clrMapOvr>
+    <a:masterClrMapping/>
+  </p:clrMapOvr>
+</p:notes>
 </file>
 
 <file path=ppt/slideLayouts/slideLayout1.xml><?xml version="1.0" encoding="utf-8"?>
@@ -9080,7 +12665,7 @@
           </p:nvPr>
         </p:nvPicPr>
         <p:blipFill rotWithShape="1">
-          <a:blip r:embed="rId2">
+          <a:blip r:embed="rId3">
             <a:extLst>
               <a:ext uri="{28A0092B-C50C-407E-A947-70E740481C1C}">
                 <a14:useLocalDpi xmlns:a14="http://schemas.microsoft.com/office/drawing/2010/main" val="0"/>
@@ -9124,7 +12709,7 @@
           </p:nvPr>
         </p:nvPicPr>
         <p:blipFill rotWithShape="1">
-          <a:blip r:embed="rId3">
+          <a:blip r:embed="rId4">
             <a:extLst>
               <a:ext uri="{28A0092B-C50C-407E-A947-70E740481C1C}">
                 <a14:useLocalDpi xmlns:a14="http://schemas.microsoft.com/office/drawing/2010/main" val="0"/>
@@ -9248,7 +12833,7 @@
           </p:nvPr>
         </p:nvPicPr>
         <p:blipFill rotWithShape="1">
-          <a:blip r:embed="rId4">
+          <a:blip r:embed="rId5">
             <a:extLst>
               <a:ext uri="{28A0092B-C50C-407E-A947-70E740481C1C}">
                 <a14:useLocalDpi xmlns:a14="http://schemas.microsoft.com/office/drawing/2010/main" val="0"/>
@@ -9292,7 +12877,7 @@
           </p:nvPr>
         </p:nvPicPr>
         <p:blipFill rotWithShape="1">
-          <a:blip r:embed="rId5">
+          <a:blip r:embed="rId6">
             <a:extLst>
               <a:ext uri="{28A0092B-C50C-407E-A947-70E740481C1C}">
                 <a14:useLocalDpi xmlns:a14="http://schemas.microsoft.com/office/drawing/2010/main" val="0"/>
@@ -9866,7 +13451,7 @@
           <a:p>
             <a:pPr marL="0" lvl="0" indent="0" defTabSz="457200"/>
             <a:r>
-              <a:rPr lang="en-US" sz="4200" b="0" i="0" kern="1200" dirty="0" err="1">
+              <a:rPr lang="de-DE" sz="4200" b="0" i="0" kern="1200" dirty="0">
                 <a:solidFill>
                   <a:srgbClr val="EBEBEB"/>
                 </a:solidFill>
@@ -9874,38 +13459,8 @@
                 <a:ea typeface="+mj-ea"/>
                 <a:cs typeface="+mj-cs"/>
               </a:rPr>
-              <a:t>Daten</a:t>
-            </a:r>
-            <a:r>
-              <a:rPr lang="en-US" sz="4200" b="0" i="0" kern="1200" dirty="0">
-                <a:solidFill>
-                  <a:srgbClr val="EBEBEB"/>
-                </a:solidFill>
-                <a:latin typeface="+mj-lt"/>
-                <a:ea typeface="+mj-ea"/>
-                <a:cs typeface="+mj-cs"/>
-              </a:rPr>
-              <a:t> </a:t>
-            </a:r>
-            <a:r>
-              <a:rPr lang="en-US" sz="4200" b="0" i="0" kern="1200" dirty="0" err="1">
-                <a:solidFill>
-                  <a:srgbClr val="EBEBEB"/>
-                </a:solidFill>
-                <a:latin typeface="+mj-lt"/>
-                <a:ea typeface="+mj-ea"/>
-                <a:cs typeface="+mj-cs"/>
-              </a:rPr>
-              <a:t>Überblick</a:t>
-            </a:r>
-            <a:endParaRPr lang="en-US" sz="4200" b="0" i="0" kern="1200" dirty="0">
-              <a:solidFill>
-                <a:srgbClr val="EBEBEB"/>
-              </a:solidFill>
-              <a:latin typeface="+mj-lt"/>
-              <a:ea typeface="+mj-ea"/>
-              <a:cs typeface="+mj-cs"/>
-            </a:endParaRPr>
+              <a:t>Ausreißer</a:t>
+            </a:r>
           </a:p>
         </p:txBody>
       </p:sp>
@@ -10489,7 +14044,7 @@
           <p:nvPr/>
         </p:nvPicPr>
         <p:blipFill>
-          <a:blip r:embed="rId6"/>
+          <a:blip r:embed="rId7"/>
           <a:stretch>
             <a:fillRect/>
           </a:stretch>
@@ -12093,7 +15648,7 @@
           </p:nvPr>
         </p:nvPicPr>
         <p:blipFill rotWithShape="1">
-          <a:blip r:embed="rId2">
+          <a:blip r:embed="rId3">
             <a:extLst>
               <a:ext uri="{28A0092B-C50C-407E-A947-70E740481C1C}">
                 <a14:useLocalDpi xmlns:a14="http://schemas.microsoft.com/office/drawing/2010/main" val="0"/>
@@ -12137,7 +15692,7 @@
           </p:nvPr>
         </p:nvPicPr>
         <p:blipFill rotWithShape="1">
-          <a:blip r:embed="rId3">
+          <a:blip r:embed="rId4">
             <a:extLst>
               <a:ext uri="{28A0092B-C50C-407E-A947-70E740481C1C}">
                 <a14:useLocalDpi xmlns:a14="http://schemas.microsoft.com/office/drawing/2010/main" val="0"/>
@@ -12261,7 +15816,7 @@
           </p:nvPr>
         </p:nvPicPr>
         <p:blipFill rotWithShape="1">
-          <a:blip r:embed="rId4">
+          <a:blip r:embed="rId5">
             <a:extLst>
               <a:ext uri="{28A0092B-C50C-407E-A947-70E740481C1C}">
                 <a14:useLocalDpi xmlns:a14="http://schemas.microsoft.com/office/drawing/2010/main" val="0"/>
@@ -12305,7 +15860,7 @@
           </p:nvPr>
         </p:nvPicPr>
         <p:blipFill rotWithShape="1">
-          <a:blip r:embed="rId5">
+          <a:blip r:embed="rId6">
             <a:extLst>
               <a:ext uri="{28A0092B-C50C-407E-A947-70E740481C1C}">
                 <a14:useLocalDpi xmlns:a14="http://schemas.microsoft.com/office/drawing/2010/main" val="0"/>
@@ -13445,7 +17000,7 @@
           <p:nvPr/>
         </p:nvPicPr>
         <p:blipFill rotWithShape="1">
-          <a:blip r:embed="rId6"/>
+          <a:blip r:embed="rId7"/>
           <a:srcRect l="3901" t="6804"/>
           <a:stretch/>
         </p:blipFill>
@@ -13555,7 +17110,7 @@
           </p:nvPr>
         </p:nvPicPr>
         <p:blipFill rotWithShape="1">
-          <a:blip r:embed="rId2">
+          <a:blip r:embed="rId3">
             <a:extLst>
               <a:ext uri="{28A0092B-C50C-407E-A947-70E740481C1C}">
                 <a14:useLocalDpi xmlns:a14="http://schemas.microsoft.com/office/drawing/2010/main" val="0"/>
@@ -13599,7 +17154,7 @@
           </p:nvPr>
         </p:nvPicPr>
         <p:blipFill rotWithShape="1">
-          <a:blip r:embed="rId3">
+          <a:blip r:embed="rId4">
             <a:extLst>
               <a:ext uri="{28A0092B-C50C-407E-A947-70E740481C1C}">
                 <a14:useLocalDpi xmlns:a14="http://schemas.microsoft.com/office/drawing/2010/main" val="0"/>
@@ -13723,7 +17278,7 @@
           </p:nvPr>
         </p:nvPicPr>
         <p:blipFill rotWithShape="1">
-          <a:blip r:embed="rId4">
+          <a:blip r:embed="rId5">
             <a:extLst>
               <a:ext uri="{28A0092B-C50C-407E-A947-70E740481C1C}">
                 <a14:useLocalDpi xmlns:a14="http://schemas.microsoft.com/office/drawing/2010/main" val="0"/>
@@ -13767,7 +17322,7 @@
           </p:nvPr>
         </p:nvPicPr>
         <p:blipFill rotWithShape="1">
-          <a:blip r:embed="rId5">
+          <a:blip r:embed="rId6">
             <a:extLst>
               <a:ext uri="{28A0092B-C50C-407E-A947-70E740481C1C}">
                 <a14:useLocalDpi xmlns:a14="http://schemas.microsoft.com/office/drawing/2010/main" val="0"/>
@@ -14840,7 +18395,7 @@
           <p:nvPr/>
         </p:nvPicPr>
         <p:blipFill>
-          <a:blip r:embed="rId6"/>
+          <a:blip r:embed="rId7"/>
           <a:stretch>
             <a:fillRect/>
           </a:stretch>
@@ -14951,7 +18506,7 @@
           </p:nvPr>
         </p:nvPicPr>
         <p:blipFill rotWithShape="1">
-          <a:blip r:embed="rId2">
+          <a:blip r:embed="rId3">
             <a:extLst>
               <a:ext uri="{28A0092B-C50C-407E-A947-70E740481C1C}">
                 <a14:useLocalDpi xmlns:a14="http://schemas.microsoft.com/office/drawing/2010/main" val="0"/>
@@ -14995,7 +18550,7 @@
           </p:nvPr>
         </p:nvPicPr>
         <p:blipFill rotWithShape="1">
-          <a:blip r:embed="rId3">
+          <a:blip r:embed="rId4">
             <a:extLst>
               <a:ext uri="{28A0092B-C50C-407E-A947-70E740481C1C}">
                 <a14:useLocalDpi xmlns:a14="http://schemas.microsoft.com/office/drawing/2010/main" val="0"/>
@@ -15119,7 +18674,7 @@
           </p:nvPr>
         </p:nvPicPr>
         <p:blipFill rotWithShape="1">
-          <a:blip r:embed="rId4">
+          <a:blip r:embed="rId5">
             <a:extLst>
               <a:ext uri="{28A0092B-C50C-407E-A947-70E740481C1C}">
                 <a14:useLocalDpi xmlns:a14="http://schemas.microsoft.com/office/drawing/2010/main" val="0"/>
@@ -15163,7 +18718,7 @@
           </p:nvPr>
         </p:nvPicPr>
         <p:blipFill rotWithShape="1">
-          <a:blip r:embed="rId5">
+          <a:blip r:embed="rId6">
             <a:extLst>
               <a:ext uri="{28A0092B-C50C-407E-A947-70E740481C1C}">
                 <a14:useLocalDpi xmlns:a14="http://schemas.microsoft.com/office/drawing/2010/main" val="0"/>
@@ -16288,7 +19843,7 @@
           <p:nvPr/>
         </p:nvPicPr>
         <p:blipFill rotWithShape="1">
-          <a:blip r:embed="rId6"/>
+          <a:blip r:embed="rId7"/>
           <a:srcRect t="6335" r="7565"/>
           <a:stretch/>
         </p:blipFill>
@@ -16407,7 +19962,7 @@
           </p:nvPr>
         </p:nvPicPr>
         <p:blipFill rotWithShape="1">
-          <a:blip r:embed="rId2">
+          <a:blip r:embed="rId3">
             <a:extLst>
               <a:ext uri="{28A0092B-C50C-407E-A947-70E740481C1C}">
                 <a14:useLocalDpi xmlns:a14="http://schemas.microsoft.com/office/drawing/2010/main" val="0"/>
@@ -16451,7 +20006,7 @@
           </p:nvPr>
         </p:nvPicPr>
         <p:blipFill rotWithShape="1">
-          <a:blip r:embed="rId3">
+          <a:blip r:embed="rId4">
             <a:extLst>
               <a:ext uri="{28A0092B-C50C-407E-A947-70E740481C1C}">
                 <a14:useLocalDpi xmlns:a14="http://schemas.microsoft.com/office/drawing/2010/main" val="0"/>
@@ -16575,7 +20130,7 @@
           </p:nvPr>
         </p:nvPicPr>
         <p:blipFill rotWithShape="1">
-          <a:blip r:embed="rId4">
+          <a:blip r:embed="rId5">
             <a:extLst>
               <a:ext uri="{28A0092B-C50C-407E-A947-70E740481C1C}">
                 <a14:useLocalDpi xmlns:a14="http://schemas.microsoft.com/office/drawing/2010/main" val="0"/>
@@ -16619,7 +20174,7 @@
           </p:nvPr>
         </p:nvPicPr>
         <p:blipFill rotWithShape="1">
-          <a:blip r:embed="rId5">
+          <a:blip r:embed="rId6">
             <a:extLst>
               <a:ext uri="{28A0092B-C50C-407E-A947-70E740481C1C}">
                 <a14:useLocalDpi xmlns:a14="http://schemas.microsoft.com/office/drawing/2010/main" val="0"/>
@@ -17791,7 +21346,7 @@
           <p:nvPr/>
         </p:nvPicPr>
         <p:blipFill>
-          <a:blip r:embed="rId6"/>
+          <a:blip r:embed="rId7"/>
           <a:stretch>
             <a:fillRect/>
           </a:stretch>
@@ -18383,7 +21938,7 @@
               </a:lnSpc>
             </a:pPr>
             <a:r>
-              <a:rPr lang="en-US" sz="3600" b="0" i="0" kern="1200">
+              <a:rPr lang="en-US" sz="3600" b="0" i="0" kern="1200" dirty="0" err="1">
                 <a:solidFill>
                   <a:srgbClr val="EBEBEB"/>
                 </a:solidFill>
@@ -18391,8 +21946,38 @@
                 <a:ea typeface="+mj-ea"/>
                 <a:cs typeface="+mj-cs"/>
               </a:rPr>
-              <a:t>Beste Gegenstände nach ROI</a:t>
-            </a:r>
+              <a:t>Beste</a:t>
+            </a:r>
+            <a:r>
+              <a:rPr lang="en-US" sz="3600" b="0" i="0" kern="1200" dirty="0">
+                <a:solidFill>
+                  <a:srgbClr val="EBEBEB"/>
+                </a:solidFill>
+                <a:latin typeface="+mj-lt"/>
+                <a:ea typeface="+mj-ea"/>
+                <a:cs typeface="+mj-cs"/>
+              </a:rPr>
+              <a:t> </a:t>
+            </a:r>
+            <a:r>
+              <a:rPr lang="en-US" sz="3600" b="0" i="0" kern="1200" dirty="0" err="1">
+                <a:solidFill>
+                  <a:srgbClr val="EBEBEB"/>
+                </a:solidFill>
+                <a:latin typeface="+mj-lt"/>
+                <a:ea typeface="+mj-ea"/>
+                <a:cs typeface="+mj-cs"/>
+              </a:rPr>
+              <a:t>Gegenstände</a:t>
+            </a:r>
+            <a:endParaRPr lang="en-US" sz="3600" b="0" i="0" kern="1200" dirty="0">
+              <a:solidFill>
+                <a:srgbClr val="EBEBEB"/>
+              </a:solidFill>
+              <a:latin typeface="+mj-lt"/>
+              <a:ea typeface="+mj-ea"/>
+              <a:cs typeface="+mj-cs"/>
+            </a:endParaRPr>
           </a:p>
         </p:txBody>
       </p:sp>
@@ -18914,7 +22499,7 @@
           <p:nvPr/>
         </p:nvPicPr>
         <p:blipFill>
-          <a:blip r:embed="rId2"/>
+          <a:blip r:embed="rId3"/>
           <a:stretch>
             <a:fillRect/>
           </a:stretch>
@@ -21650,7 +25235,7 @@
           </p:nvPr>
         </p:nvPicPr>
         <p:blipFill rotWithShape="1">
-          <a:blip r:embed="rId2">
+          <a:blip r:embed="rId3">
             <a:extLst>
               <a:ext uri="{28A0092B-C50C-407E-A947-70E740481C1C}">
                 <a14:useLocalDpi xmlns:a14="http://schemas.microsoft.com/office/drawing/2010/main" val="0"/>
@@ -21694,7 +25279,7 @@
           </p:nvPr>
         </p:nvPicPr>
         <p:blipFill rotWithShape="1">
-          <a:blip r:embed="rId3">
+          <a:blip r:embed="rId4">
             <a:extLst>
               <a:ext uri="{28A0092B-C50C-407E-A947-70E740481C1C}">
                 <a14:useLocalDpi xmlns:a14="http://schemas.microsoft.com/office/drawing/2010/main" val="0"/>
@@ -21818,7 +25403,7 @@
           </p:nvPr>
         </p:nvPicPr>
         <p:blipFill rotWithShape="1">
-          <a:blip r:embed="rId4">
+          <a:blip r:embed="rId5">
             <a:extLst>
               <a:ext uri="{28A0092B-C50C-407E-A947-70E740481C1C}">
                 <a14:useLocalDpi xmlns:a14="http://schemas.microsoft.com/office/drawing/2010/main" val="0"/>
@@ -21862,7 +25447,7 @@
           </p:nvPr>
         </p:nvPicPr>
         <p:blipFill rotWithShape="1">
-          <a:blip r:embed="rId5">
+          <a:blip r:embed="rId6">
             <a:extLst>
               <a:ext uri="{28A0092B-C50C-407E-A947-70E740481C1C}">
                 <a14:useLocalDpi xmlns:a14="http://schemas.microsoft.com/office/drawing/2010/main" val="0"/>
@@ -23082,7 +26667,7 @@
           <p:nvPr/>
         </p:nvPicPr>
         <p:blipFill>
-          <a:blip r:embed="rId6"/>
+          <a:blip r:embed="rId7"/>
           <a:stretch>
             <a:fillRect/>
           </a:stretch>
@@ -25347,7 +28932,7 @@
           </p:nvPr>
         </p:nvPicPr>
         <p:blipFill rotWithShape="1">
-          <a:blip r:embed="rId2">
+          <a:blip r:embed="rId3">
             <a:extLst>
               <a:ext uri="{28A0092B-C50C-407E-A947-70E740481C1C}">
                 <a14:useLocalDpi xmlns:a14="http://schemas.microsoft.com/office/drawing/2010/main" val="0"/>
@@ -25391,7 +28976,7 @@
           </p:nvPr>
         </p:nvPicPr>
         <p:blipFill rotWithShape="1">
-          <a:blip r:embed="rId3">
+          <a:blip r:embed="rId4">
             <a:extLst>
               <a:ext uri="{28A0092B-C50C-407E-A947-70E740481C1C}">
                 <a14:useLocalDpi xmlns:a14="http://schemas.microsoft.com/office/drawing/2010/main" val="0"/>
@@ -25515,7 +29100,7 @@
           </p:nvPr>
         </p:nvPicPr>
         <p:blipFill rotWithShape="1">
-          <a:blip r:embed="rId4">
+          <a:blip r:embed="rId5">
             <a:extLst>
               <a:ext uri="{28A0092B-C50C-407E-A947-70E740481C1C}">
                 <a14:useLocalDpi xmlns:a14="http://schemas.microsoft.com/office/drawing/2010/main" val="0"/>
@@ -25559,7 +29144,7 @@
           </p:nvPr>
         </p:nvPicPr>
         <p:blipFill rotWithShape="1">
-          <a:blip r:embed="rId5">
+          <a:blip r:embed="rId6">
             <a:extLst>
               <a:ext uri="{28A0092B-C50C-407E-A947-70E740481C1C}">
                 <a14:useLocalDpi xmlns:a14="http://schemas.microsoft.com/office/drawing/2010/main" val="0"/>
@@ -26632,7 +30217,7 @@
           <p:nvPr/>
         </p:nvPicPr>
         <p:blipFill>
-          <a:blip r:embed="rId6"/>
+          <a:blip r:embed="rId7"/>
           <a:stretch>
             <a:fillRect/>
           </a:stretch>
@@ -28193,7 +31778,7 @@
           </p:nvPr>
         </p:nvPicPr>
         <p:blipFill rotWithShape="1">
-          <a:blip r:embed="rId2">
+          <a:blip r:embed="rId3">
             <a:extLst>
               <a:ext uri="{28A0092B-C50C-407E-A947-70E740481C1C}">
                 <a14:useLocalDpi xmlns:a14="http://schemas.microsoft.com/office/drawing/2010/main" val="0"/>
@@ -28237,7 +31822,7 @@
           </p:nvPr>
         </p:nvPicPr>
         <p:blipFill rotWithShape="1">
-          <a:blip r:embed="rId3">
+          <a:blip r:embed="rId4">
             <a:extLst>
               <a:ext uri="{28A0092B-C50C-407E-A947-70E740481C1C}">
                 <a14:useLocalDpi xmlns:a14="http://schemas.microsoft.com/office/drawing/2010/main" val="0"/>
@@ -28361,7 +31946,7 @@
           </p:nvPr>
         </p:nvPicPr>
         <p:blipFill rotWithShape="1">
-          <a:blip r:embed="rId4">
+          <a:blip r:embed="rId5">
             <a:extLst>
               <a:ext uri="{28A0092B-C50C-407E-A947-70E740481C1C}">
                 <a14:useLocalDpi xmlns:a14="http://schemas.microsoft.com/office/drawing/2010/main" val="0"/>
@@ -28405,7 +31990,7 @@
           </p:nvPr>
         </p:nvPicPr>
         <p:blipFill rotWithShape="1">
-          <a:blip r:embed="rId5">
+          <a:blip r:embed="rId6">
             <a:extLst>
               <a:ext uri="{28A0092B-C50C-407E-A947-70E740481C1C}">
                 <a14:useLocalDpi xmlns:a14="http://schemas.microsoft.com/office/drawing/2010/main" val="0"/>
@@ -29498,7 +33083,7 @@
           <p:nvPr/>
         </p:nvPicPr>
         <p:blipFill>
-          <a:blip r:embed="rId6"/>
+          <a:blip r:embed="rId7"/>
           <a:stretch>
             <a:fillRect/>
           </a:stretch>
@@ -29609,7 +33194,7 @@
           </p:nvPr>
         </p:nvPicPr>
         <p:blipFill rotWithShape="1">
-          <a:blip r:embed="rId2">
+          <a:blip r:embed="rId3">
             <a:extLst>
               <a:ext uri="{28A0092B-C50C-407E-A947-70E740481C1C}">
                 <a14:useLocalDpi xmlns:a14="http://schemas.microsoft.com/office/drawing/2010/main" val="0"/>
@@ -29653,7 +33238,7 @@
           </p:nvPr>
         </p:nvPicPr>
         <p:blipFill rotWithShape="1">
-          <a:blip r:embed="rId3">
+          <a:blip r:embed="rId4">
             <a:extLst>
               <a:ext uri="{28A0092B-C50C-407E-A947-70E740481C1C}">
                 <a14:useLocalDpi xmlns:a14="http://schemas.microsoft.com/office/drawing/2010/main" val="0"/>
@@ -29777,7 +33362,7 @@
           </p:nvPr>
         </p:nvPicPr>
         <p:blipFill rotWithShape="1">
-          <a:blip r:embed="rId4">
+          <a:blip r:embed="rId5">
             <a:extLst>
               <a:ext uri="{28A0092B-C50C-407E-A947-70E740481C1C}">
                 <a14:useLocalDpi xmlns:a14="http://schemas.microsoft.com/office/drawing/2010/main" val="0"/>
@@ -29821,7 +33406,7 @@
           </p:nvPr>
         </p:nvPicPr>
         <p:blipFill rotWithShape="1">
-          <a:blip r:embed="rId5">
+          <a:blip r:embed="rId6">
             <a:extLst>
               <a:ext uri="{28A0092B-C50C-407E-A947-70E740481C1C}">
                 <a14:useLocalDpi xmlns:a14="http://schemas.microsoft.com/office/drawing/2010/main" val="0"/>
@@ -30929,56 +34514,8 @@
               <a:t>. </a:t>
             </a:r>
             <a:r>
-              <a:rPr lang="en-US" dirty="0" err="1"/>
-              <a:t>Hier</a:t>
-            </a:r>
-            <a:r>
-              <a:rPr lang="en-US" dirty="0"/>
-              <a:t> </a:t>
-            </a:r>
-            <a:r>
-              <a:rPr lang="en-US" dirty="0" err="1"/>
-              <a:t>ist</a:t>
-            </a:r>
-            <a:r>
-              <a:rPr lang="en-US" dirty="0"/>
-              <a:t> </a:t>
-            </a:r>
-            <a:r>
-              <a:rPr lang="en-US" dirty="0" err="1"/>
-              <a:t>eine</a:t>
-            </a:r>
-            <a:r>
-              <a:rPr lang="en-US" dirty="0"/>
-              <a:t> </a:t>
-            </a:r>
-            <a:r>
-              <a:rPr lang="en-US" dirty="0" err="1"/>
-              <a:t>deutlichere</a:t>
-            </a:r>
-            <a:r>
-              <a:rPr lang="en-US" dirty="0"/>
-              <a:t> </a:t>
-            </a:r>
-            <a:r>
-              <a:rPr lang="en-US" dirty="0" err="1"/>
-              <a:t>Abweichung</a:t>
-            </a:r>
-            <a:r>
-              <a:rPr lang="en-US" dirty="0"/>
-              <a:t> </a:t>
-            </a:r>
-            <a:r>
-              <a:rPr lang="en-US" dirty="0" err="1"/>
-              <a:t>zu</a:t>
-            </a:r>
-            <a:r>
-              <a:rPr lang="en-US" dirty="0"/>
-              <a:t> </a:t>
-            </a:r>
-            <a:r>
-              <a:rPr lang="en-US" dirty="0" err="1"/>
-              <a:t>sehen</a:t>
+              <a:rPr lang="de-DE" dirty="0"/>
+              <a:t>Hier ist eine deutlichere Abweichung zu sehen</a:t>
             </a:r>
             <a:r>
               <a:rPr lang="en-US" dirty="0"/>
@@ -30996,7 +34533,7 @@
           <p:nvPr/>
         </p:nvPicPr>
         <p:blipFill rotWithShape="1">
-          <a:blip r:embed="rId6"/>
+          <a:blip r:embed="rId7"/>
           <a:srcRect t="1893" r="2222" b="1733"/>
           <a:stretch/>
         </p:blipFill>
@@ -33391,7 +36928,7 @@
             </a:r>
             <a:r>
               <a:rPr lang="de-DE" dirty="0">
-                <a:hlinkClick r:id="rId2"/>
+                <a:hlinkClick r:id="rId3"/>
               </a:rPr>
               <a:t>GW2Efficiency</a:t>
             </a:r>
@@ -33401,7 +36938,7 @@
             </a:r>
             <a:r>
               <a:rPr lang="de-DE" dirty="0">
-                <a:hlinkClick r:id="rId3"/>
+                <a:hlinkClick r:id="rId4"/>
               </a:rPr>
               <a:t>GW2TP</a:t>
             </a:r>
@@ -34549,7 +38086,7 @@
                 <a:solidFill>
                   <a:schemeClr val="tx2"/>
                 </a:solidFill>
-                <a:hlinkClick r:id="rId2">
+                <a:hlinkClick r:id="rId3">
                   <a:extLst>
                     <a:ext uri="{A12FA001-AC4F-418D-AE19-62706E023703}">
                       <ahyp:hlinkClr xmlns:ahyp="http://schemas.microsoft.com/office/drawing/2018/hyperlinkcolor" val="tx"/>
@@ -34571,7 +38108,7 @@
                 <a:solidFill>
                   <a:schemeClr val="tx2"/>
                 </a:solidFill>
-                <a:hlinkClick r:id="rId3">
+                <a:hlinkClick r:id="rId4">
                   <a:extLst>
                     <a:ext uri="{A12FA001-AC4F-418D-AE19-62706E023703}">
                       <ahyp:hlinkClr xmlns:ahyp="http://schemas.microsoft.com/office/drawing/2018/hyperlinkcolor" val="tx"/>
@@ -42418,7 +45955,7 @@
           <p:nvPr/>
         </p:nvPicPr>
         <p:blipFill>
-          <a:blip r:embed="rId2"/>
+          <a:blip r:embed="rId3"/>
           <a:stretch>
             <a:fillRect/>
           </a:stretch>
@@ -42499,7 +46036,7 @@
           <p:nvPr/>
         </p:nvPicPr>
         <p:blipFill>
-          <a:blip r:embed="rId3"/>
+          <a:blip r:embed="rId4"/>
           <a:stretch>
             <a:fillRect/>
           </a:stretch>
@@ -45500,4 +49037,299 @@
     </a:ext>
   </a:extLst>
 </a:theme>
+</file>
+
+<file path=ppt/theme/theme2.xml><?xml version="1.0" encoding="utf-8"?>
+<a:theme xmlns:a="http://schemas.openxmlformats.org/drawingml/2006/main" name="Office">
+  <a:themeElements>
+    <a:clrScheme name="Office">
+      <a:dk1>
+        <a:sysClr val="windowText" lastClr="000000"/>
+      </a:dk1>
+      <a:lt1>
+        <a:sysClr val="window" lastClr="FFFFFF"/>
+      </a:lt1>
+      <a:dk2>
+        <a:srgbClr val="44546A"/>
+      </a:dk2>
+      <a:lt2>
+        <a:srgbClr val="E7E6E6"/>
+      </a:lt2>
+      <a:accent1>
+        <a:srgbClr val="4472C4"/>
+      </a:accent1>
+      <a:accent2>
+        <a:srgbClr val="ED7D31"/>
+      </a:accent2>
+      <a:accent3>
+        <a:srgbClr val="A5A5A5"/>
+      </a:accent3>
+      <a:accent4>
+        <a:srgbClr val="FFC000"/>
+      </a:accent4>
+      <a:accent5>
+        <a:srgbClr val="5B9BD5"/>
+      </a:accent5>
+      <a:accent6>
+        <a:srgbClr val="70AD47"/>
+      </a:accent6>
+      <a:hlink>
+        <a:srgbClr val="0563C1"/>
+      </a:hlink>
+      <a:folHlink>
+        <a:srgbClr val="954F72"/>
+      </a:folHlink>
+    </a:clrScheme>
+    <a:fontScheme name="Office">
+      <a:majorFont>
+        <a:latin typeface="Calibri Light" panose="020F0302020204030204"/>
+        <a:ea typeface=""/>
+        <a:cs typeface=""/>
+        <a:font script="Jpan" typeface="游ゴシック Light"/>
+        <a:font script="Hang" typeface="맑은 고딕"/>
+        <a:font script="Hans" typeface="等线 Light"/>
+        <a:font script="Hant" typeface="新細明體"/>
+        <a:font script="Arab" typeface="Times New Roman"/>
+        <a:font script="Hebr" typeface="Times New Roman"/>
+        <a:font script="Thai" typeface="Angsana New"/>
+        <a:font script="Ethi" typeface="Nyala"/>
+        <a:font script="Beng" typeface="Vrinda"/>
+        <a:font script="Gujr" typeface="Shruti"/>
+        <a:font script="Khmr" typeface="MoolBoran"/>
+        <a:font script="Knda" typeface="Tunga"/>
+        <a:font script="Guru" typeface="Raavi"/>
+        <a:font script="Cans" typeface="Euphemia"/>
+        <a:font script="Cher" typeface="Plantagenet Cherokee"/>
+        <a:font script="Yiii" typeface="Microsoft Yi Baiti"/>
+        <a:font script="Tibt" typeface="Microsoft Himalaya"/>
+        <a:font script="Thaa" typeface="MV Boli"/>
+        <a:font script="Deva" typeface="Mangal"/>
+        <a:font script="Telu" typeface="Gautami"/>
+        <a:font script="Taml" typeface="Latha"/>
+        <a:font script="Syrc" typeface="Estrangelo Edessa"/>
+        <a:font script="Orya" typeface="Kalinga"/>
+        <a:font script="Mlym" typeface="Kartika"/>
+        <a:font script="Laoo" typeface="DokChampa"/>
+        <a:font script="Sinh" typeface="Iskoola Pota"/>
+        <a:font script="Mong" typeface="Mongolian Baiti"/>
+        <a:font script="Viet" typeface="Times New Roman"/>
+        <a:font script="Uigh" typeface="Microsoft Uighur"/>
+        <a:font script="Geor" typeface="Sylfaen"/>
+        <a:font script="Armn" typeface="Arial"/>
+        <a:font script="Bugi" typeface="Leelawadee UI"/>
+        <a:font script="Bopo" typeface="Microsoft JhengHei"/>
+        <a:font script="Java" typeface="Javanese Text"/>
+        <a:font script="Lisu" typeface="Segoe UI"/>
+        <a:font script="Mymr" typeface="Myanmar Text"/>
+        <a:font script="Nkoo" typeface="Ebrima"/>
+        <a:font script="Olck" typeface="Nirmala UI"/>
+        <a:font script="Osma" typeface="Ebrima"/>
+        <a:font script="Phag" typeface="Phagspa"/>
+        <a:font script="Syrn" typeface="Estrangelo Edessa"/>
+        <a:font script="Syrj" typeface="Estrangelo Edessa"/>
+        <a:font script="Syre" typeface="Estrangelo Edessa"/>
+        <a:font script="Sora" typeface="Nirmala UI"/>
+        <a:font script="Tale" typeface="Microsoft Tai Le"/>
+        <a:font script="Talu" typeface="Microsoft New Tai Lue"/>
+        <a:font script="Tfng" typeface="Ebrima"/>
+      </a:majorFont>
+      <a:minorFont>
+        <a:latin typeface="Calibri" panose="020F0502020204030204"/>
+        <a:ea typeface=""/>
+        <a:cs typeface=""/>
+        <a:font script="Jpan" typeface="游ゴシック"/>
+        <a:font script="Hang" typeface="맑은 고딕"/>
+        <a:font script="Hans" typeface="等线"/>
+        <a:font script="Hant" typeface="新細明體"/>
+        <a:font script="Arab" typeface="Arial"/>
+        <a:font script="Hebr" typeface="Arial"/>
+        <a:font script="Thai" typeface="Cordia New"/>
+        <a:font script="Ethi" typeface="Nyala"/>
+        <a:font script="Beng" typeface="Vrinda"/>
+        <a:font script="Gujr" typeface="Shruti"/>
+        <a:font script="Khmr" typeface="DaunPenh"/>
+        <a:font script="Knda" typeface="Tunga"/>
+        <a:font script="Guru" typeface="Raavi"/>
+        <a:font script="Cans" typeface="Euphemia"/>
+        <a:font script="Cher" typeface="Plantagenet Cherokee"/>
+        <a:font script="Yiii" typeface="Microsoft Yi Baiti"/>
+        <a:font script="Tibt" typeface="Microsoft Himalaya"/>
+        <a:font script="Thaa" typeface="MV Boli"/>
+        <a:font script="Deva" typeface="Mangal"/>
+        <a:font script="Telu" typeface="Gautami"/>
+        <a:font script="Taml" typeface="Latha"/>
+        <a:font script="Syrc" typeface="Estrangelo Edessa"/>
+        <a:font script="Orya" typeface="Kalinga"/>
+        <a:font script="Mlym" typeface="Kartika"/>
+        <a:font script="Laoo" typeface="DokChampa"/>
+        <a:font script="Sinh" typeface="Iskoola Pota"/>
+        <a:font script="Mong" typeface="Mongolian Baiti"/>
+        <a:font script="Viet" typeface="Arial"/>
+        <a:font script="Uigh" typeface="Microsoft Uighur"/>
+        <a:font script="Geor" typeface="Sylfaen"/>
+        <a:font script="Armn" typeface="Arial"/>
+        <a:font script="Bugi" typeface="Leelawadee UI"/>
+        <a:font script="Bopo" typeface="Microsoft JhengHei"/>
+        <a:font script="Java" typeface="Javanese Text"/>
+        <a:font script="Lisu" typeface="Segoe UI"/>
+        <a:font script="Mymr" typeface="Myanmar Text"/>
+        <a:font script="Nkoo" typeface="Ebrima"/>
+        <a:font script="Olck" typeface="Nirmala UI"/>
+        <a:font script="Osma" typeface="Ebrima"/>
+        <a:font script="Phag" typeface="Phagspa"/>
+        <a:font script="Syrn" typeface="Estrangelo Edessa"/>
+        <a:font script="Syrj" typeface="Estrangelo Edessa"/>
+        <a:font script="Syre" typeface="Estrangelo Edessa"/>
+        <a:font script="Sora" typeface="Nirmala UI"/>
+        <a:font script="Tale" typeface="Microsoft Tai Le"/>
+        <a:font script="Talu" typeface="Microsoft New Tai Lue"/>
+        <a:font script="Tfng" typeface="Ebrima"/>
+      </a:minorFont>
+    </a:fontScheme>
+    <a:fmtScheme name="Office">
+      <a:fillStyleLst>
+        <a:solidFill>
+          <a:schemeClr val="phClr"/>
+        </a:solidFill>
+        <a:gradFill rotWithShape="1">
+          <a:gsLst>
+            <a:gs pos="0">
+              <a:schemeClr val="phClr">
+                <a:lumMod val="110000"/>
+                <a:satMod val="105000"/>
+                <a:tint val="67000"/>
+              </a:schemeClr>
+            </a:gs>
+            <a:gs pos="50000">
+              <a:schemeClr val="phClr">
+                <a:lumMod val="105000"/>
+                <a:satMod val="103000"/>
+                <a:tint val="73000"/>
+              </a:schemeClr>
+            </a:gs>
+            <a:gs pos="100000">
+              <a:schemeClr val="phClr">
+                <a:lumMod val="105000"/>
+                <a:satMod val="109000"/>
+                <a:tint val="81000"/>
+              </a:schemeClr>
+            </a:gs>
+          </a:gsLst>
+          <a:lin ang="5400000" scaled="0"/>
+        </a:gradFill>
+        <a:gradFill rotWithShape="1">
+          <a:gsLst>
+            <a:gs pos="0">
+              <a:schemeClr val="phClr">
+                <a:satMod val="103000"/>
+                <a:lumMod val="102000"/>
+                <a:tint val="94000"/>
+              </a:schemeClr>
+            </a:gs>
+            <a:gs pos="50000">
+              <a:schemeClr val="phClr">
+                <a:satMod val="110000"/>
+                <a:lumMod val="100000"/>
+                <a:shade val="100000"/>
+              </a:schemeClr>
+            </a:gs>
+            <a:gs pos="100000">
+              <a:schemeClr val="phClr">
+                <a:lumMod val="99000"/>
+                <a:satMod val="120000"/>
+                <a:shade val="78000"/>
+              </a:schemeClr>
+            </a:gs>
+          </a:gsLst>
+          <a:lin ang="5400000" scaled="0"/>
+        </a:gradFill>
+      </a:fillStyleLst>
+      <a:lnStyleLst>
+        <a:ln w="6350" cap="flat" cmpd="sng" algn="ctr">
+          <a:solidFill>
+            <a:schemeClr val="phClr"/>
+          </a:solidFill>
+          <a:prstDash val="solid"/>
+          <a:miter lim="800000"/>
+        </a:ln>
+        <a:ln w="12700" cap="flat" cmpd="sng" algn="ctr">
+          <a:solidFill>
+            <a:schemeClr val="phClr"/>
+          </a:solidFill>
+          <a:prstDash val="solid"/>
+          <a:miter lim="800000"/>
+        </a:ln>
+        <a:ln w="19050" cap="flat" cmpd="sng" algn="ctr">
+          <a:solidFill>
+            <a:schemeClr val="phClr"/>
+          </a:solidFill>
+          <a:prstDash val="solid"/>
+          <a:miter lim="800000"/>
+        </a:ln>
+      </a:lnStyleLst>
+      <a:effectStyleLst>
+        <a:effectStyle>
+          <a:effectLst/>
+        </a:effectStyle>
+        <a:effectStyle>
+          <a:effectLst/>
+        </a:effectStyle>
+        <a:effectStyle>
+          <a:effectLst>
+            <a:outerShdw blurRad="57150" dist="19050" dir="5400000" algn="ctr" rotWithShape="0">
+              <a:srgbClr val="000000">
+                <a:alpha val="63000"/>
+              </a:srgbClr>
+            </a:outerShdw>
+          </a:effectLst>
+        </a:effectStyle>
+      </a:effectStyleLst>
+      <a:bgFillStyleLst>
+        <a:solidFill>
+          <a:schemeClr val="phClr"/>
+        </a:solidFill>
+        <a:solidFill>
+          <a:schemeClr val="phClr">
+            <a:tint val="95000"/>
+            <a:satMod val="170000"/>
+          </a:schemeClr>
+        </a:solidFill>
+        <a:gradFill rotWithShape="1">
+          <a:gsLst>
+            <a:gs pos="0">
+              <a:schemeClr val="phClr">
+                <a:tint val="93000"/>
+                <a:satMod val="150000"/>
+                <a:shade val="98000"/>
+                <a:lumMod val="102000"/>
+              </a:schemeClr>
+            </a:gs>
+            <a:gs pos="50000">
+              <a:schemeClr val="phClr">
+                <a:tint val="98000"/>
+                <a:satMod val="130000"/>
+                <a:shade val="90000"/>
+                <a:lumMod val="103000"/>
+              </a:schemeClr>
+            </a:gs>
+            <a:gs pos="100000">
+              <a:schemeClr val="phClr">
+                <a:shade val="63000"/>
+                <a:satMod val="120000"/>
+              </a:schemeClr>
+            </a:gs>
+          </a:gsLst>
+          <a:lin ang="5400000" scaled="0"/>
+        </a:gradFill>
+      </a:bgFillStyleLst>
+    </a:fmtScheme>
+  </a:themeElements>
+  <a:objectDefaults/>
+  <a:extraClrSchemeLst/>
+  <a:extLst>
+    <a:ext uri="{05A4C25C-085E-4340-85A3-A5531E510DB2}">
+      <thm15:themeFamily xmlns:thm15="http://schemas.microsoft.com/office/thememl/2012/main" name="Office Theme" id="{62F939B6-93AF-4DB8-9C6B-D6C7DFDC589F}" vid="{4A3C46E8-61CC-4603-A589-7422A47A8E4A}"/>
+    </a:ext>
+  </a:extLst>
+</a:theme>
 </file>
</xml_diff>

<commit_message>
fixed typos, added some todos
</commit_message>
<xml_diff>
--- a/reports/presentation_custom_design.pptx
+++ b/reports/presentation_custom_design.pptx
@@ -1895,17 +1895,7 @@
             </a:pPr>
             <a:r>
               <a:rPr lang="de-DE" dirty="0"/>
-              <a:t>Beispiel Guild Wars:  </a:t>
-            </a:r>
-          </a:p>
-          <a:p>
-            <a:pPr marL="171450" indent="-171450">
-              <a:buFontTx/>
-              <a:buChar char="-"/>
-            </a:pPr>
-            <a:r>
-              <a:rPr lang="de-DE" dirty="0"/>
-              <a:t>GW war bis 2012 kostenpflichtig, daher keine Spielrelevanten Gegenstände im Echtgeld-Shop, dafür umso mehr im Auktionshaus</a:t>
+              <a:t>Beispiel Guild Wars</a:t>
             </a:r>
           </a:p>
         </p:txBody>
@@ -2156,9 +2146,13 @@
           <a:bodyPr/>
           <a:lstStyle/>
           <a:p>
+            <a:pPr marL="171450" indent="-171450">
+              <a:buFontTx/>
+              <a:buChar char="-"/>
+            </a:pPr>
             <a:r>
               <a:rPr lang="de-DE" dirty="0"/>
-              <a:t>- Extrem gute </a:t>
+              <a:t>Extrem gute </a:t>
             </a:r>
             <a:r>
               <a:rPr lang="de-DE" dirty="0" err="1"/>
@@ -2168,6 +2162,33 @@
               <a:rPr lang="de-DE" dirty="0"/>
               <a:t>, v.a. bei Lasso</a:t>
             </a:r>
+          </a:p>
+          <a:p>
+            <a:pPr marL="171450" indent="-171450">
+              <a:buFontTx/>
+              <a:buChar char="-"/>
+            </a:pPr>
+            <a:endParaRPr lang="de-DE" dirty="0"/>
+          </a:p>
+          <a:p>
+            <a:pPr marL="171450" indent="-171450">
+              <a:buFontTx/>
+              <a:buChar char="-"/>
+            </a:pPr>
+            <a:endParaRPr lang="de-DE" dirty="0"/>
+          </a:p>
+          <a:p>
+            <a:pPr marL="171450" indent="-171450">
+              <a:buFontTx/>
+              <a:buChar char="-"/>
+            </a:pPr>
+            <a:r>
+              <a:rPr lang="de-DE" dirty="0">
+                <a:sym typeface="Wingdings" panose="05000000000000000000" pitchFamily="2" charset="2"/>
+              </a:rPr>
+              <a:t> Andere Farben</a:t>
+            </a:r>
+            <a:endParaRPr lang="de-DE" dirty="0"/>
           </a:p>
         </p:txBody>
       </p:sp>
@@ -2484,6 +2505,41 @@
             <a:r>
               <a:rPr lang="de-DE" dirty="0"/>
               <a:t> eher zu hoch eingeschätzt</a:t>
+            </a:r>
+          </a:p>
+          <a:p>
+            <a:pPr marL="171450" indent="-171450">
+              <a:buFontTx/>
+              <a:buChar char="-"/>
+            </a:pPr>
+            <a:endParaRPr lang="de-DE" dirty="0"/>
+          </a:p>
+          <a:p>
+            <a:pPr marL="171450" indent="-171450">
+              <a:buFontTx/>
+              <a:buChar char="-"/>
+            </a:pPr>
+            <a:r>
+              <a:rPr lang="de-DE" dirty="0"/>
+              <a:t>-&gt; </a:t>
+            </a:r>
+            <a:r>
+              <a:rPr lang="de-DE" dirty="0" err="1"/>
+              <a:t>Consumables</a:t>
+            </a:r>
+            <a:r>
+              <a:rPr lang="de-DE" dirty="0"/>
+              <a:t> sind überbewertet, werden teurer gekauft (nötig für das Spiel, evtl. auch zu gewissen Zeiten)</a:t>
+            </a:r>
+          </a:p>
+          <a:p>
+            <a:pPr marL="171450" indent="-171450">
+              <a:buFontTx/>
+              <a:buChar char="-"/>
+            </a:pPr>
+            <a:r>
+              <a:rPr lang="de-DE" dirty="0"/>
+              <a:t>-&gt; das meiste andere wird günstiger gekauft</a:t>
             </a:r>
           </a:p>
         </p:txBody>
@@ -3331,9 +3387,12 @@
             </a:r>
           </a:p>
           <a:p>
+            <a:endParaRPr lang="de-DE" dirty="0"/>
+          </a:p>
+          <a:p>
             <a:r>
               <a:rPr lang="de-DE" dirty="0"/>
-              <a:t>10.000 Kupfer = 100 Silber = 1 Gold</a:t>
+              <a:t>=&gt; Auf Folie packen: 10.000 Kupfer = 100 Silber = 1 Gold</a:t>
             </a:r>
           </a:p>
         </p:txBody>
@@ -3420,11 +3479,23 @@
           <a:p>
             <a:r>
               <a:rPr lang="de-DE" dirty="0"/>
-              <a:t>Jetzt wird es interessant, wie funktioniert der Kauf/Verkauf?</a:t>
+              <a:t>-&gt; Wir kaufen und verkaufen Gegenstände.</a:t>
             </a:r>
           </a:p>
           <a:p>
             <a:endParaRPr lang="de-DE" dirty="0"/>
+          </a:p>
+          <a:p>
+            <a:r>
+              <a:rPr lang="de-DE" dirty="0"/>
+              <a:t>Linke Seite: Ich möchte den Gegenstand für 1,22 kaufen</a:t>
+            </a:r>
+          </a:p>
+          <a:p>
+            <a:r>
+              <a:rPr lang="de-DE" dirty="0"/>
+              <a:t>Rechte Seite: Ich möchte den Gegenstand für 26,15 verkaufen</a:t>
+            </a:r>
           </a:p>
           <a:p>
             <a:r>
@@ -13945,7 +14016,7 @@
         </p:spPr>
         <p:txBody>
           <a:bodyPr vert="horz" lIns="91440" tIns="45720" rIns="91440" bIns="45720" rtlCol="0">
-            <a:normAutofit/>
+            <a:normAutofit lnSpcReduction="10000"/>
           </a:bodyPr>
           <a:lstStyle/>
           <a:p>
@@ -13958,7 +14029,31 @@
             </a:pPr>
             <a:r>
               <a:rPr lang="en-US" sz="1200" dirty="0"/>
-              <a:t>Bei Verkäufen Ausreißer nach oben mit 3.000 bis zu 10.000 Gold</a:t>
+              <a:t>Bei </a:t>
+            </a:r>
+            <a:r>
+              <a:rPr lang="en-US" sz="1200" dirty="0" err="1"/>
+              <a:t>Verkäufen</a:t>
+            </a:r>
+            <a:r>
+              <a:rPr lang="en-US" sz="1200" dirty="0"/>
+              <a:t> </a:t>
+            </a:r>
+            <a:r>
+              <a:rPr lang="en-US" sz="1200" dirty="0" err="1"/>
+              <a:t>gibt</a:t>
+            </a:r>
+            <a:r>
+              <a:rPr lang="en-US" sz="1200" dirty="0"/>
+              <a:t> es </a:t>
+            </a:r>
+            <a:r>
+              <a:rPr lang="en-US" sz="1200" dirty="0" err="1"/>
+              <a:t>Ausreißer</a:t>
+            </a:r>
+            <a:r>
+              <a:rPr lang="en-US" sz="1200" dirty="0"/>
+              <a:t> nach oben mit 3.000 bis zu 10.000 Gold</a:t>
             </a:r>
           </a:p>
           <a:p>
@@ -14007,7 +14102,7 @@
             </a:pPr>
             <a:r>
               <a:rPr lang="en-US" sz="1200" dirty="0"/>
-              <a:t>- Median Profit von 8.15 Silber.</a:t>
+              <a:t>- Median Profit von 8,15 Silber</a:t>
             </a:r>
           </a:p>
           <a:p>
@@ -14020,8 +14115,67 @@
             </a:pPr>
             <a:r>
               <a:rPr lang="en-US" sz="1200" dirty="0"/>
-              <a:t>- 239 Gegenstände sind noch übrig</a:t>
-            </a:r>
+              <a:t>- 239 Gegenstände sind </a:t>
+            </a:r>
+            <a:r>
+              <a:rPr lang="en-US" sz="1200" dirty="0" err="1"/>
+              <a:t>noch</a:t>
+            </a:r>
+            <a:r>
+              <a:rPr lang="en-US" sz="1200" dirty="0"/>
+              <a:t> </a:t>
+            </a:r>
+            <a:r>
+              <a:rPr lang="en-US" sz="1200" dirty="0" err="1"/>
+              <a:t>übrig</a:t>
+            </a:r>
+            <a:endParaRPr lang="en-US" sz="1200" dirty="0"/>
+          </a:p>
+          <a:p>
+            <a:pPr marL="171450" lvl="0" indent="-171450" defTabSz="457200">
+              <a:spcBef>
+                <a:spcPts val="1000"/>
+              </a:spcBef>
+              <a:buFont typeface="Wingdings 3" charset="2"/>
+              <a:buChar char=""/>
+            </a:pPr>
+            <a:endParaRPr lang="en-US" sz="1200" dirty="0"/>
+          </a:p>
+          <a:p>
+            <a:pPr lvl="0" defTabSz="457200">
+              <a:spcBef>
+                <a:spcPts val="1000"/>
+              </a:spcBef>
+            </a:pPr>
+            <a:r>
+              <a:rPr lang="en-US" sz="1200" dirty="0" err="1"/>
+              <a:t>Darauf</a:t>
+            </a:r>
+            <a:r>
+              <a:rPr lang="en-US" sz="1200" dirty="0"/>
+              <a:t> </a:t>
+            </a:r>
+            <a:r>
+              <a:rPr lang="en-US" sz="1200" dirty="0" err="1"/>
+              <a:t>wird</a:t>
+            </a:r>
+            <a:r>
+              <a:rPr lang="en-US" sz="1200" dirty="0"/>
+              <a:t> </a:t>
+            </a:r>
+            <a:r>
+              <a:rPr lang="en-US" sz="1200" dirty="0" err="1"/>
+              <a:t>später</a:t>
+            </a:r>
+            <a:r>
+              <a:rPr lang="en-US" sz="1200" dirty="0"/>
+              <a:t> das Modell </a:t>
+            </a:r>
+            <a:r>
+              <a:rPr lang="en-US" sz="1200" dirty="0" err="1"/>
+              <a:t>trainiert</a:t>
+            </a:r>
+            <a:endParaRPr lang="en-US" sz="1200" dirty="0"/>
           </a:p>
           <a:p>
             <a:pPr marL="0" lvl="0" indent="0" defTabSz="457200">
@@ -16434,7 +16588,7 @@
           <a:p>
             <a:pPr marL="0" lvl="0" indent="0" defTabSz="457200"/>
             <a:r>
-              <a:rPr lang="en-US" sz="4200" b="0" i="0" kern="1200">
+              <a:rPr lang="en-US" sz="4200" b="0" i="0" kern="1200" dirty="0" err="1">
                 <a:solidFill>
                   <a:srgbClr val="EBEBEB"/>
                 </a:solidFill>
@@ -16442,8 +16596,16 @@
                 <a:ea typeface="+mj-ea"/>
                 <a:cs typeface="+mj-cs"/>
               </a:rPr>
-              <a:t>Abhänigkeiten</a:t>
-            </a:r>
+              <a:t>Abhängigkeiten</a:t>
+            </a:r>
+            <a:endParaRPr lang="en-US" sz="4200" b="0" i="0" kern="1200" dirty="0">
+              <a:solidFill>
+                <a:srgbClr val="EBEBEB"/>
+              </a:solidFill>
+              <a:latin typeface="+mj-lt"/>
+              <a:ea typeface="+mj-ea"/>
+              <a:cs typeface="+mj-cs"/>
+            </a:endParaRPr>
           </a:p>
         </p:txBody>
       </p:sp>
@@ -16943,7 +17105,7 @@
             </a:r>
             <a:r>
               <a:rPr lang="de-DE" sz="1200" dirty="0"/>
-              <a:t>zu sehen welche Input-Variablen</a:t>
+              <a:t>zu sehen, welche Input-Variablen</a:t>
             </a:r>
             <a:r>
               <a:rPr lang="en-US" sz="1200" dirty="0"/>
@@ -16982,7 +17144,7 @@
             </a:pPr>
             <a:r>
               <a:rPr lang="de-DE" sz="1200" dirty="0"/>
-              <a:t>Daten sind untereinander kaum Abhängig, bis auf Kauf- und Verkaufspreis</a:t>
+              <a:t>Daten sind untereinander kaum abhängig, bis auf Kauf- und Verkaufspreis</a:t>
             </a:r>
             <a:r>
               <a:rPr lang="en-US" sz="1200" dirty="0"/>
@@ -23651,7 +23813,7 @@
             </a:r>
             <a:r>
               <a:rPr lang="de-DE" sz="1200" dirty="0"/>
-              <a:t>identifizier,</a:t>
+              <a:t>identifiziert,</a:t>
             </a:r>
             <a:r>
               <a:rPr sz="1200" dirty="0"/>
@@ -23664,6 +23826,13 @@
             <a:r>
               <a:rPr sz="1200" dirty="0"/>
               <a:t>.</a:t>
+            </a:r>
+            <a:br>
+              <a:rPr lang="de-DE" sz="1200" dirty="0"/>
+            </a:br>
+            <a:r>
+              <a:rPr lang="de-DE" sz="1200" dirty="0"/>
+              <a:t>Damit kann das Ziel, Geld zu verdienen, bereits angegangen und erreicht werden.</a:t>
             </a:r>
             <a:br>
               <a:rPr lang="de-DE" sz="1200" dirty="0"/>
@@ -23719,7 +23888,7 @@
             </a:r>
             <a:r>
               <a:rPr lang="de-DE" sz="1200" dirty="0"/>
-              <a:t>gibt, könnte dies für ein Gegenstand stehen</a:t>
+              <a:t>gibt, könnte dies für einen Gegenstand stehen</a:t>
             </a:r>
             <a:r>
               <a:rPr sz="1200" dirty="0"/>
@@ -26592,7 +26761,23 @@
             </a:pPr>
             <a:r>
               <a:rPr lang="en-US" sz="1200" dirty="0"/>
-              <a:t>- Ein Weg Geld zu verdienen ist das Auktionshaus</a:t>
+              <a:t>- Ein Weg Geld </a:t>
+            </a:r>
+            <a:r>
+              <a:rPr lang="en-US" sz="1200" dirty="0" err="1"/>
+              <a:t>zu</a:t>
+            </a:r>
+            <a:r>
+              <a:rPr lang="en-US" sz="1200" dirty="0"/>
+              <a:t> </a:t>
+            </a:r>
+            <a:r>
+              <a:rPr lang="en-US" sz="1200" dirty="0" err="1"/>
+              <a:t>verdienen</a:t>
+            </a:r>
+            <a:r>
+              <a:rPr lang="en-US" sz="1200" dirty="0"/>
+              <a:t>, ist das Auktionshaus</a:t>
             </a:r>
           </a:p>
           <a:p>
@@ -26653,7 +26838,15 @@
             </a:pPr>
             <a:r>
               <a:rPr lang="en-US" sz="1200" dirty="0"/>
-              <a:t>- Es gibt über 20.000 Gegenstände die gesammelt und im Auktionshaus gehandelt werden können</a:t>
+              <a:t>- Es gibt über 20.000 </a:t>
+            </a:r>
+            <a:r>
+              <a:rPr lang="en-US" sz="1200" dirty="0" err="1"/>
+              <a:t>Gegenstände</a:t>
+            </a:r>
+            <a:r>
+              <a:rPr lang="en-US" sz="1200" dirty="0"/>
+              <a:t>, die gesammelt und im Auktionshaus gehandelt werden können</a:t>
             </a:r>
           </a:p>
         </p:txBody>
@@ -29295,7 +29488,7 @@
         </p:spPr>
         <p:txBody>
           <a:bodyPr vert="horz" lIns="91440" tIns="45720" rIns="91440" bIns="45720" rtlCol="0" anchor="b">
-            <a:normAutofit/>
+            <a:normAutofit fontScale="90000"/>
           </a:bodyPr>
           <a:lstStyle/>
           <a:p>
@@ -29310,6 +29503,37 @@
                 <a:cs typeface="+mj-cs"/>
               </a:rPr>
               <a:t>Ergebnis des Modells</a:t>
+            </a:r>
+            <a:br>
+              <a:rPr lang="de-DE" sz="4100" b="0" i="0" kern="1200" dirty="0">
+                <a:solidFill>
+                  <a:srgbClr val="EBEBEB"/>
+                </a:solidFill>
+                <a:latin typeface="+mj-lt"/>
+                <a:ea typeface="+mj-ea"/>
+                <a:cs typeface="+mj-cs"/>
+              </a:rPr>
+            </a:br>
+            <a:br>
+              <a:rPr lang="de-DE" sz="4100" b="0" i="0" kern="1200" dirty="0">
+                <a:solidFill>
+                  <a:srgbClr val="EBEBEB"/>
+                </a:solidFill>
+                <a:latin typeface="+mj-lt"/>
+                <a:ea typeface="+mj-ea"/>
+                <a:cs typeface="+mj-cs"/>
+              </a:rPr>
+            </a:br>
+            <a:r>
+              <a:rPr lang="de-DE" sz="4100" b="0" i="0" kern="1200" dirty="0">
+                <a:solidFill>
+                  <a:srgbClr val="EBEBEB"/>
+                </a:solidFill>
+                <a:latin typeface="+mj-lt"/>
+                <a:ea typeface="+mj-ea"/>
+                <a:cs typeface="+mj-cs"/>
+              </a:rPr>
+              <a:t>TODO</a:t>
             </a:r>
           </a:p>
         </p:txBody>
@@ -36872,35 +37096,35 @@
             <a:pPr lvl="0"/>
             <a:r>
               <a:rPr lang="de-DE" dirty="0"/>
-              <a:t>- Datenset hat sich ganz anders verhalten als gedacht</a:t>
+              <a:t>Datenset hat sich ganz anders verhalten als gedacht</a:t>
             </a:r>
           </a:p>
           <a:p>
             <a:pPr lvl="0"/>
             <a:r>
               <a:rPr lang="de-DE" dirty="0"/>
-              <a:t>- Auktionen ändern sich extrem schnell, sodass eine statische Analyse wenig sinnvoll ist</a:t>
+              <a:t>Auktionen ändern sich extrem schnell, sodass eine statische Analyse wenig sinnvoll ist</a:t>
             </a:r>
           </a:p>
           <a:p>
             <a:pPr lvl="0"/>
             <a:r>
               <a:rPr lang="de-DE" dirty="0"/>
-              <a:t>- Andere unterbieten die eingestellten Preise sehr schnell</a:t>
+              <a:t>Andere unterbieten die eingestellten Preise sehr schnell</a:t>
             </a:r>
           </a:p>
           <a:p>
             <a:pPr lvl="0"/>
             <a:r>
               <a:rPr lang="de-DE" dirty="0"/>
-              <a:t>- Die Methode benötigt viel Zeit und macht wenig Spaß</a:t>
+              <a:t>Die Methode benötigt viel Zeit und macht wenig Spaß</a:t>
             </a:r>
           </a:p>
           <a:p>
             <a:pPr lvl="0"/>
             <a:r>
               <a:rPr lang="de-DE" dirty="0"/>
-              <a:t>- Das war nicht der erste Versuch auf diese Art Auktionen</a:t>
+              <a:t>Das war nicht der erste Versuch auf diese Art Auktionen</a:t>
             </a:r>
             <a:r>
               <a:rPr dirty="0"/>
@@ -39356,15 +39580,7 @@
             </a:pPr>
             <a:r>
               <a:rPr lang="de-DE" sz="1200" b="1" dirty="0"/>
-              <a:t>Daten</a:t>
-            </a:r>
-            <a:r>
-              <a:rPr sz="1200" b="1" dirty="0"/>
-              <a:t> </a:t>
-            </a:r>
-            <a:r>
-              <a:rPr lang="de-DE" sz="1200" b="1" dirty="0"/>
-              <a:t>abrufen</a:t>
+              <a:t>3 APIs wurden genutzt</a:t>
             </a:r>
             <a:endParaRPr lang="de-DE" sz="1200" dirty="0"/>
           </a:p>
@@ -39481,7 +39697,7 @@
             </a:r>
             <a:r>
               <a:rPr lang="de-DE" sz="1200" dirty="0"/>
-              <a:t>Gegenstand</a:t>
+              <a:t>Gegenstand,</a:t>
             </a:r>
             <a:r>
               <a:rPr sz="1200" dirty="0"/>
@@ -39496,33 +39712,6 @@
               <a:t> Name, Icon etc.</a:t>
             </a:r>
             <a:endParaRPr lang="de-DE" sz="1200" dirty="0"/>
-          </a:p>
-          <a:p>
-            <a:pPr lvl="0">
-              <a:lnSpc>
-                <a:spcPct val="90000"/>
-              </a:lnSpc>
-            </a:pPr>
-            <a:r>
-              <a:rPr lang="de-DE" sz="1200" dirty="0"/>
-              <a:t>- </a:t>
-            </a:r>
-            <a:r>
-              <a:rPr sz="1200" dirty="0"/>
-              <a:t>Alle </a:t>
-            </a:r>
-            <a:r>
-              <a:rPr lang="de-DE" sz="1200" dirty="0"/>
-              <a:t>Daten</a:t>
-            </a:r>
-            <a:r>
-              <a:rPr sz="1200" dirty="0"/>
-              <a:t> in CSVs </a:t>
-            </a:r>
-            <a:r>
-              <a:rPr lang="de-DE" sz="1200" dirty="0"/>
-              <a:t>schreiben</a:t>
-            </a:r>
           </a:p>
         </p:txBody>
       </p:sp>
@@ -44084,6 +44273,20 @@
               <a:buNone/>
             </a:pPr>
             <a:r>
+              <a:rPr lang="de-DE" sz="1400" dirty="0">
+                <a:latin typeface="Courier"/>
+              </a:rPr>
+              <a:t>TODO -&gt;</a:t>
+            </a:r>
+          </a:p>
+          <a:p>
+            <a:pPr marL="0" lvl="0" indent="0">
+              <a:lnSpc>
+                <a:spcPct val="90000"/>
+              </a:lnSpc>
+              <a:buNone/>
+            </a:pPr>
+            <a:r>
               <a:rPr lang="de-DE" sz="1200" dirty="0" err="1">
                 <a:latin typeface="Courier"/>
               </a:rPr>
@@ -45962,8 +46165,8 @@
         </p:blipFill>
         <p:spPr bwMode="auto">
           <a:xfrm>
-            <a:off x="1001762" y="2076297"/>
-            <a:ext cx="2956019" cy="2769474"/>
+            <a:off x="3278078" y="1943680"/>
+            <a:ext cx="3394571" cy="3180350"/>
           </a:xfrm>
           <a:prstGeom prst="rect">
             <a:avLst/>
@@ -45990,7 +46193,7 @@
         </p:nvSpPr>
         <p:spPr>
           <a:xfrm>
-            <a:off x="630381" y="4819875"/>
+            <a:off x="533400" y="3942545"/>
             <a:ext cx="4038600" cy="508000"/>
           </a:xfrm>
           <a:prstGeom prst="rect">
@@ -46021,42 +46224,6 @@
           </a:p>
         </p:txBody>
       </p:sp>
-      <p:pic>
-        <p:nvPicPr>
-          <p:cNvPr id="16" name="Picture 1" descr="fig:  images/sells.png">
-            <a:extLst>
-              <a:ext uri="{FF2B5EF4-FFF2-40B4-BE49-F238E27FC236}">
-                <a16:creationId xmlns:a16="http://schemas.microsoft.com/office/drawing/2014/main" id="{C1ED4255-5867-371D-5D36-1A98979E399F}"/>
-              </a:ext>
-            </a:extLst>
-          </p:cNvPr>
-          <p:cNvPicPr>
-            <a:picLocks noGrp="1" noChangeAspect="1"/>
-          </p:cNvPicPr>
-          <p:nvPr/>
-        </p:nvPicPr>
-        <p:blipFill>
-          <a:blip r:embed="rId4"/>
-          <a:stretch>
-            <a:fillRect/>
-          </a:stretch>
-        </p:blipFill>
-        <p:spPr bwMode="auto">
-          <a:xfrm>
-            <a:off x="5299362" y="2049145"/>
-            <a:ext cx="2956019" cy="2796626"/>
-          </a:xfrm>
-          <a:prstGeom prst="rect">
-            <a:avLst/>
-          </a:prstGeom>
-          <a:noFill/>
-          <a:ln w="9525">
-            <a:noFill/>
-            <a:headEnd/>
-            <a:tailEnd/>
-          </a:ln>
-        </p:spPr>
-      </p:pic>
       <p:sp>
         <p:nvSpPr>
           <p:cNvPr id="17" name="TextBox 3">
@@ -46071,7 +46238,7 @@
         </p:nvSpPr>
         <p:spPr>
           <a:xfrm>
-            <a:off x="4808681" y="4819875"/>
+            <a:off x="5627825" y="3976237"/>
             <a:ext cx="4038600" cy="508000"/>
           </a:xfrm>
           <a:prstGeom prst="rect">
@@ -48723,7 +48890,7 @@
             </a:pPr>
             <a:r>
               <a:rPr lang="de-DE" sz="1400" dirty="0"/>
-              <a:t>Abzüglich des Kaufpreises von 1,22 Silber ergibt das ein Gewinn von 21 Silber.</a:t>
+              <a:t>Abzüglich des Kaufpreises von 1,22 Silber ergibt das einen Gewinn von 21 Silber.</a:t>
             </a:r>
           </a:p>
         </p:txBody>

</xml_diff>

<commit_message>
apply changes to presentation
</commit_message>
<xml_diff>
--- a/reports/presentation_custom_design.pptx
+++ b/reports/presentation_custom_design.pptx
@@ -20168,7 +20168,7 @@
         <p:spPr>
           <a:xfrm>
             <a:off x="486698" y="1911210"/>
-            <a:ext cx="3841954" cy="3014081"/>
+            <a:ext cx="3603487" cy="3014081"/>
           </a:xfrm>
         </p:spPr>
         <p:txBody>
@@ -20184,7 +20184,7 @@
             </a:pPr>
             <a:r>
               <a:rPr lang="de-DE" sz="1200" dirty="0"/>
-              <a:t>Es wurden vier Cluster gebildet: </a:t>
+              <a:t>Es wurden fünf Cluster gebildet: </a:t>
             </a:r>
           </a:p>
           <a:p>
@@ -20198,7 +20198,7 @@
             </a:pPr>
             <a:r>
               <a:rPr lang="de-DE" sz="1200" dirty="0"/>
-              <a:t>(1) Rote Cluster: Günstige Gegenstände mit Verlust (nicht kaufen) </a:t>
+              <a:t>(1) Rotes Cluster: Günstige Gegenstände mit Verlust (nicht kaufen) </a:t>
             </a:r>
           </a:p>
           <a:p>
@@ -20212,7 +20212,7 @@
             </a:pPr>
             <a:r>
               <a:rPr lang="de-DE" sz="1200" dirty="0"/>
-              <a:t>(2) Grüne Cluster: Mittelpreisige Gegenstände mit unterschiedlichem Gewinn (nicht kaufen) </a:t>
+              <a:t>(2) Gelbes Cluster: Mittelpreisige Gegenstände mit Verlust (nicht kaufen)</a:t>
             </a:r>
           </a:p>
           <a:p>
@@ -20226,7 +20226,7 @@
             </a:pPr>
             <a:r>
               <a:rPr lang="de-DE" sz="1200" dirty="0"/>
-              <a:t>(3) Hellblaue Cluster: Günstige Gegenstände mit überwiegend hohem Gewinn (sollte man kaufen) </a:t>
+              <a:t>(3) Grünes Cluster: Mittelpreisige Gegenstände mit unterschiedlichem Gewinn (nicht kaufen) </a:t>
             </a:r>
           </a:p>
           <a:p>
@@ -20240,48 +20240,25 @@
             </a:pPr>
             <a:r>
               <a:rPr lang="de-DE" sz="1200" dirty="0"/>
-              <a:t>(4) Lila Cluster: Hochpreisige Gegenstände mit hohem Gewinn (könnte man kaufen)</a:t>
-            </a:r>
-          </a:p>
-          <a:p>
-            <a:pPr marL="0" lvl="0" indent="0" defTabSz="457200">
+              <a:t>(4) Hellblaues Cluster: Teure Gegenstände mit Gewinn (kann man kaufen) </a:t>
+            </a:r>
+          </a:p>
+          <a:p>
+            <a:pPr marL="171450" lvl="0" indent="-171450" defTabSz="457200">
               <a:spcBef>
                 <a:spcPts val="1000"/>
               </a:spcBef>
+              <a:buClrTx/>
+              <a:buFont typeface="Wingdings 3" charset="2"/>
+              <a:buChar char=""/>
             </a:pPr>
             <a:r>
               <a:rPr lang="de-DE" sz="1200" dirty="0"/>
-              <a:t>Es gibt also einige Gegenstände, die für uns interessant sind.</a:t>
+              <a:t>(5) Lila Cluster: Günstige Gegenstände mit hohem Gewinn (unbedingt kaufen)</a:t>
             </a:r>
           </a:p>
         </p:txBody>
       </p:sp>
-      <p:pic>
-        <p:nvPicPr>
-          <p:cNvPr id="3" name="Picture 1" descr="presentation_files/figure-pptx/plot_items_clustered_4-1.png"/>
-          <p:cNvPicPr>
-            <a:picLocks noGrp="1" noChangeAspect="1"/>
-          </p:cNvPicPr>
-          <p:nvPr/>
-        </p:nvPicPr>
-        <p:blipFill>
-          <a:blip r:embed="rId7"/>
-          <a:stretch>
-            <a:fillRect/>
-          </a:stretch>
-        </p:blipFill>
-        <p:spPr bwMode="auto">
-          <a:xfrm>
-            <a:off x="4732744" y="1714621"/>
-            <a:ext cx="4286097" cy="3428879"/>
-          </a:xfrm>
-          <a:prstGeom prst="rect">
-            <a:avLst/>
-          </a:prstGeom>
-          <a:noFill/>
-          <a:effectLst/>
-        </p:spPr>
-      </p:pic>
       <p:sp>
         <p:nvSpPr>
           <p:cNvPr id="16" name="Textfeld 15">
@@ -20319,6 +20296,35 @@
           </a:p>
         </p:txBody>
       </p:sp>
+      <p:pic>
+        <p:nvPicPr>
+          <p:cNvPr id="19" name="Grafik 18">
+            <a:extLst>
+              <a:ext uri="{FF2B5EF4-FFF2-40B4-BE49-F238E27FC236}">
+                <a16:creationId xmlns:a16="http://schemas.microsoft.com/office/drawing/2014/main" id="{C2570D1B-9189-0265-54B7-3C91C53B86D2}"/>
+              </a:ext>
+            </a:extLst>
+          </p:cNvPr>
+          <p:cNvPicPr>
+            <a:picLocks noChangeAspect="1"/>
+          </p:cNvPicPr>
+          <p:nvPr/>
+        </p:nvPicPr>
+        <p:blipFill rotWithShape="1">
+          <a:blip r:embed="rId7"/>
+          <a:srcRect l="1195"/>
+          <a:stretch/>
+        </p:blipFill>
+        <p:spPr>
+          <a:xfrm>
+            <a:off x="3899948" y="2090552"/>
+            <a:ext cx="5221117" cy="2693795"/>
+          </a:xfrm>
+          <a:prstGeom prst="rect">
+            <a:avLst/>
+          </a:prstGeom>
+        </p:spPr>
+      </p:pic>
     </p:spTree>
   </p:cSld>
   <p:clrMapOvr>
@@ -29285,100 +29291,12 @@
           <a:chExt cx="0" cy="0"/>
         </a:xfrm>
       </p:grpSpPr>
-      <p:pic>
-        <p:nvPicPr>
-          <p:cNvPr id="8" name="Picture 7">
+      <p:sp>
+        <p:nvSpPr>
+          <p:cNvPr id="31" name="Rectangle 30">
             <a:extLst>
               <a:ext uri="{FF2B5EF4-FFF2-40B4-BE49-F238E27FC236}">
-                <a16:creationId xmlns:a16="http://schemas.microsoft.com/office/drawing/2014/main" id="{41B68C77-138E-4BF7-A276-BD0C78A4219F}"/>
-              </a:ext>
-              <a:ext uri="{C183D7F6-B498-43B3-948B-1728B52AA6E4}">
-                <adec:decorative xmlns:adec="http://schemas.microsoft.com/office/drawing/2017/decorative" val="1"/>
-              </a:ext>
-            </a:extLst>
-          </p:cNvPr>
-          <p:cNvPicPr>
-            <a:picLocks noGrp="1" noRot="1" noChangeAspect="1" noMove="1" noResize="1" noEditPoints="1" noAdjustHandles="1" noChangeArrowheads="1" noChangeShapeType="1" noCrop="1"/>
-          </p:cNvPicPr>
-          <p:nvPr>
-            <p:extLst>
-              <p:ext uri="{386F3935-93C4-4BCD-93E2-E3B085C9AB24}">
-                <p16:designElem xmlns:p16="http://schemas.microsoft.com/office/powerpoint/2015/main" val="1"/>
-              </p:ext>
-            </p:extLst>
-          </p:nvPr>
-        </p:nvPicPr>
-        <p:blipFill rotWithShape="1">
-          <a:blip r:embed="rId3">
-            <a:extLst>
-              <a:ext uri="{28A0092B-C50C-407E-A947-70E740481C1C}">
-                <a14:useLocalDpi xmlns:a14="http://schemas.microsoft.com/office/drawing/2010/main" val="0"/>
-              </a:ext>
-            </a:extLst>
-          </a:blip>
-          <a:srcRect l="3613"/>
-          <a:stretch/>
-        </p:blipFill>
-        <p:spPr>
-          <a:xfrm>
-            <a:off x="0" y="2002263"/>
-            <a:ext cx="3027759" cy="3141237"/>
-          </a:xfrm>
-          <a:prstGeom prst="rect">
-            <a:avLst/>
-          </a:prstGeom>
-        </p:spPr>
-      </p:pic>
-      <p:pic>
-        <p:nvPicPr>
-          <p:cNvPr id="10" name="Picture 9">
-            <a:extLst>
-              <a:ext uri="{FF2B5EF4-FFF2-40B4-BE49-F238E27FC236}">
-                <a16:creationId xmlns:a16="http://schemas.microsoft.com/office/drawing/2014/main" id="{7C268552-D473-46ED-B1B8-422042C4DEF1}"/>
-              </a:ext>
-              <a:ext uri="{C183D7F6-B498-43B3-948B-1728B52AA6E4}">
-                <adec:decorative xmlns:adec="http://schemas.microsoft.com/office/drawing/2017/decorative" val="1"/>
-              </a:ext>
-            </a:extLst>
-          </p:cNvPr>
-          <p:cNvPicPr>
-            <a:picLocks noGrp="1" noRot="1" noChangeAspect="1" noMove="1" noResize="1" noEditPoints="1" noAdjustHandles="1" noChangeArrowheads="1" noChangeShapeType="1" noCrop="1"/>
-          </p:cNvPicPr>
-          <p:nvPr>
-            <p:extLst>
-              <p:ext uri="{386F3935-93C4-4BCD-93E2-E3B085C9AB24}">
-                <p16:designElem xmlns:p16="http://schemas.microsoft.com/office/powerpoint/2015/main" val="1"/>
-              </p:ext>
-            </p:extLst>
-          </p:nvPr>
-        </p:nvPicPr>
-        <p:blipFill rotWithShape="1">
-          <a:blip r:embed="rId4">
-            <a:extLst>
-              <a:ext uri="{28A0092B-C50C-407E-A947-70E740481C1C}">
-                <a14:useLocalDpi xmlns:a14="http://schemas.microsoft.com/office/drawing/2010/main" val="0"/>
-              </a:ext>
-            </a:extLst>
-          </a:blip>
-          <a:srcRect l="35640"/>
-          <a:stretch/>
-        </p:blipFill>
-        <p:spPr>
-          <a:xfrm>
-            <a:off x="0" y="2169260"/>
-            <a:ext cx="1141809" cy="1774090"/>
-          </a:xfrm>
-          <a:prstGeom prst="rect">
-            <a:avLst/>
-          </a:prstGeom>
-        </p:spPr>
-      </p:pic>
-      <p:sp>
-        <p:nvSpPr>
-          <p:cNvPr id="12" name="Oval 11">
-            <a:extLst>
-              <a:ext uri="{FF2B5EF4-FFF2-40B4-BE49-F238E27FC236}">
-                <a16:creationId xmlns:a16="http://schemas.microsoft.com/office/drawing/2014/main" id="{4AC0CD9D-7610-4620-93B4-798CCD9AB581}"/>
+                <a16:creationId xmlns:a16="http://schemas.microsoft.com/office/drawing/2014/main" id="{9362849A-570D-49DB-954C-63F144E88A4A}"/>
               </a:ext>
               <a:ext uri="{C183D7F6-B498-43B3-948B-1728B52AA6E4}">
                 <adec:decorative xmlns:adec="http://schemas.microsoft.com/office/drawing/2017/decorative" val="1"/>
@@ -29398,155 +29316,47 @@
         </p:nvSpPr>
         <p:spPr>
           <a:xfrm>
-            <a:off x="6456759" y="1257300"/>
-            <a:ext cx="2114550" cy="2114550"/>
+            <a:off x="0" y="0"/>
+            <a:ext cx="9144000" cy="5143500"/>
           </a:xfrm>
-          <a:prstGeom prst="ellipse">
+          <a:prstGeom prst="rect">
             <a:avLst/>
           </a:prstGeom>
-          <a:gradFill flip="none" rotWithShape="1">
-            <a:gsLst>
-              <a:gs pos="0">
-                <a:schemeClr val="bg2">
-                  <a:lumMod val="60000"/>
-                  <a:lumOff val="40000"/>
-                  <a:alpha val="7000"/>
-                </a:schemeClr>
-              </a:gs>
-              <a:gs pos="69000">
-                <a:schemeClr val="bg2">
-                  <a:lumMod val="60000"/>
-                  <a:lumOff val="40000"/>
-                  <a:alpha val="0"/>
-                </a:schemeClr>
-              </a:gs>
-              <a:gs pos="36000">
-                <a:schemeClr val="bg2">
-                  <a:lumMod val="60000"/>
-                  <a:lumOff val="40000"/>
-                  <a:alpha val="6000"/>
-                </a:schemeClr>
-              </a:gs>
-            </a:gsLst>
-            <a:path path="circle">
-              <a:fillToRect l="50000" t="50000" r="50000" b="50000"/>
-            </a:path>
-            <a:tileRect/>
-          </a:gradFill>
           <a:ln>
             <a:noFill/>
           </a:ln>
-          <a:effectLst/>
         </p:spPr>
         <p:style>
-          <a:lnRef idx="1">
-            <a:schemeClr val="accent1"/>
+          <a:lnRef idx="2">
+            <a:schemeClr val="accent1">
+              <a:shade val="50000"/>
+            </a:schemeClr>
           </a:lnRef>
-          <a:fillRef idx="3">
-            <a:schemeClr val="accent1"/>
+          <a:fillRef idx="1003">
+            <a:schemeClr val="dk2"/>
           </a:fillRef>
-          <a:effectRef idx="2">
+          <a:effectRef idx="0">
             <a:schemeClr val="accent1"/>
           </a:effectRef>
           <a:fontRef idx="minor">
             <a:schemeClr val="lt1"/>
           </a:fontRef>
         </p:style>
+        <p:txBody>
+          <a:bodyPr rtlCol="0" anchor="ctr"/>
+          <a:lstStyle/>
+          <a:p>
+            <a:pPr algn="ctr"/>
+            <a:endParaRPr lang="en-US"/>
+          </a:p>
+        </p:txBody>
       </p:sp>
-      <p:pic>
-        <p:nvPicPr>
-          <p:cNvPr id="14" name="Picture 13">
+      <p:sp>
+        <p:nvSpPr>
+          <p:cNvPr id="33" name="Rectangle 32">
             <a:extLst>
               <a:ext uri="{FF2B5EF4-FFF2-40B4-BE49-F238E27FC236}">
-                <a16:creationId xmlns:a16="http://schemas.microsoft.com/office/drawing/2014/main" id="{B9238B3E-24AA-439A-B527-6C5DF6D72145}"/>
-              </a:ext>
-              <a:ext uri="{C183D7F6-B498-43B3-948B-1728B52AA6E4}">
-                <adec:decorative xmlns:adec="http://schemas.microsoft.com/office/drawing/2017/decorative" val="1"/>
-              </a:ext>
-            </a:extLst>
-          </p:cNvPr>
-          <p:cNvPicPr>
-            <a:picLocks noGrp="1" noRot="1" noChangeAspect="1" noMove="1" noResize="1" noEditPoints="1" noAdjustHandles="1" noChangeArrowheads="1" noChangeShapeType="1" noCrop="1"/>
-          </p:cNvPicPr>
-          <p:nvPr>
-            <p:extLst>
-              <p:ext uri="{386F3935-93C4-4BCD-93E2-E3B085C9AB24}">
-                <p16:designElem xmlns:p16="http://schemas.microsoft.com/office/powerpoint/2015/main" val="1"/>
-              </p:ext>
-            </p:extLst>
-          </p:nvPr>
-        </p:nvPicPr>
-        <p:blipFill rotWithShape="1">
-          <a:blip r:embed="rId5">
-            <a:extLst>
-              <a:ext uri="{28A0092B-C50C-407E-A947-70E740481C1C}">
-                <a14:useLocalDpi xmlns:a14="http://schemas.microsoft.com/office/drawing/2010/main" val="0"/>
-              </a:ext>
-            </a:extLst>
-          </a:blip>
-          <a:srcRect t="28813"/>
-          <a:stretch/>
-        </p:blipFill>
-        <p:spPr>
-          <a:xfrm>
-            <a:off x="5999559" y="0"/>
-            <a:ext cx="1202540" cy="856055"/>
-          </a:xfrm>
-          <a:prstGeom prst="rect">
-            <a:avLst/>
-          </a:prstGeom>
-        </p:spPr>
-      </p:pic>
-      <p:pic>
-        <p:nvPicPr>
-          <p:cNvPr id="16" name="Picture 15">
-            <a:extLst>
-              <a:ext uri="{FF2B5EF4-FFF2-40B4-BE49-F238E27FC236}">
-                <a16:creationId xmlns:a16="http://schemas.microsoft.com/office/drawing/2014/main" id="{69F01145-BEA3-4CBF-AA21-10077B948CA8}"/>
-              </a:ext>
-              <a:ext uri="{C183D7F6-B498-43B3-948B-1728B52AA6E4}">
-                <adec:decorative xmlns:adec="http://schemas.microsoft.com/office/drawing/2017/decorative" val="1"/>
-              </a:ext>
-            </a:extLst>
-          </p:cNvPr>
-          <p:cNvPicPr>
-            <a:picLocks noGrp="1" noRot="1" noChangeAspect="1" noMove="1" noResize="1" noEditPoints="1" noAdjustHandles="1" noChangeArrowheads="1" noChangeShapeType="1" noCrop="1"/>
-          </p:cNvPicPr>
-          <p:nvPr>
-            <p:extLst>
-              <p:ext uri="{386F3935-93C4-4BCD-93E2-E3B085C9AB24}">
-                <p16:designElem xmlns:p16="http://schemas.microsoft.com/office/powerpoint/2015/main" val="1"/>
-              </p:ext>
-            </p:extLst>
-          </p:nvPr>
-        </p:nvPicPr>
-        <p:blipFill rotWithShape="1">
-          <a:blip r:embed="rId6">
-            <a:extLst>
-              <a:ext uri="{28A0092B-C50C-407E-A947-70E740481C1C}">
-                <a14:useLocalDpi xmlns:a14="http://schemas.microsoft.com/office/drawing/2010/main" val="0"/>
-              </a:ext>
-            </a:extLst>
-          </a:blip>
-          <a:srcRect b="23320"/>
-          <a:stretch/>
-        </p:blipFill>
-        <p:spPr>
-          <a:xfrm>
-            <a:off x="6454408" y="4572000"/>
-            <a:ext cx="745301" cy="571500"/>
-          </a:xfrm>
-          <a:prstGeom prst="rect">
-            <a:avLst/>
-          </a:prstGeom>
-        </p:spPr>
-      </p:pic>
-      <p:sp>
-        <p:nvSpPr>
-          <p:cNvPr id="18" name="Rectangle 17">
-            <a:extLst>
-              <a:ext uri="{FF2B5EF4-FFF2-40B4-BE49-F238E27FC236}">
-                <a16:creationId xmlns:a16="http://schemas.microsoft.com/office/drawing/2014/main" id="{DE4D62F9-188E-4530-84C2-24BDEE4BEB82}"/>
+                <a16:creationId xmlns:a16="http://schemas.microsoft.com/office/drawing/2014/main" id="{1CA42011-E478-428B-9D15-A98E338BF8C1}"/>
               </a:ext>
               <a:ext uri="{C183D7F6-B498-43B3-948B-1728B52AA6E4}">
                 <adec:decorative xmlns:adec="http://schemas.microsoft.com/office/drawing/2017/decorative" val="1"/>
@@ -29596,10 +29406,10 @@
       </p:sp>
       <p:sp>
         <p:nvSpPr>
-          <p:cNvPr id="20" name="Rectangle 19">
+          <p:cNvPr id="35" name="Freeform 7">
             <a:extLst>
               <a:ext uri="{FF2B5EF4-FFF2-40B4-BE49-F238E27FC236}">
-                <a16:creationId xmlns:a16="http://schemas.microsoft.com/office/drawing/2014/main" id="{757B325C-3E35-45CF-9D07-3BCB281F3B9C}"/>
+                <a16:creationId xmlns:a16="http://schemas.microsoft.com/office/drawing/2014/main" id="{9ED2773C-FE51-4632-BA46-036BDCDA6E5C}"/>
               </a:ext>
               <a:ext uri="{C183D7F6-B498-43B3-948B-1728B52AA6E4}">
                 <adec:decorative xmlns:adec="http://schemas.microsoft.com/office/drawing/2017/decorative" val="1"/>
@@ -29619,38 +29429,342 @@
         </p:nvSpPr>
         <p:spPr>
           <a:xfrm>
-            <a:off x="0" y="0"/>
-            <a:ext cx="9144000" cy="5143500"/>
+            <a:off x="6539954" y="1095172"/>
+            <a:ext cx="2604045" cy="619449"/>
           </a:xfrm>
-          <a:prstGeom prst="rect">
+          <a:custGeom>
             <a:avLst/>
-          </a:prstGeom>
+            <a:gdLst>
+              <a:gd name="connsiteX0" fmla="*/ 3470310 w 3472060"/>
+              <a:gd name="connsiteY0" fmla="*/ 0 h 825932"/>
+              <a:gd name="connsiteX1" fmla="*/ 3472060 w 3472060"/>
+              <a:gd name="connsiteY1" fmla="*/ 12850 h 825932"/>
+              <a:gd name="connsiteX2" fmla="*/ 3472060 w 3472060"/>
+              <a:gd name="connsiteY2" fmla="*/ 480529 h 825932"/>
+              <a:gd name="connsiteX3" fmla="*/ 3363699 w 3472060"/>
+              <a:gd name="connsiteY3" fmla="*/ 498471 h 825932"/>
+              <a:gd name="connsiteX4" fmla="*/ 42060 w 3472060"/>
+              <a:gd name="connsiteY4" fmla="*/ 824486 h 825932"/>
+              <a:gd name="connsiteX5" fmla="*/ 0 w 3472060"/>
+              <a:gd name="connsiteY5" fmla="*/ 758452 h 825932"/>
+              <a:gd name="connsiteX6" fmla="*/ 188014 w 3472060"/>
+              <a:gd name="connsiteY6" fmla="*/ 735602 h 825932"/>
+              <a:gd name="connsiteX7" fmla="*/ 284087 w 3472060"/>
+              <a:gd name="connsiteY7" fmla="*/ 722590 h 825932"/>
+              <a:gd name="connsiteX8" fmla="*/ 382288 w 3472060"/>
+              <a:gd name="connsiteY8" fmla="*/ 709392 h 825932"/>
+              <a:gd name="connsiteX9" fmla="*/ 481858 w 3472060"/>
+              <a:gd name="connsiteY9" fmla="*/ 695774 h 825932"/>
+              <a:gd name="connsiteX10" fmla="*/ 581897 w 3472060"/>
+              <a:gd name="connsiteY10" fmla="*/ 680711 h 825932"/>
+              <a:gd name="connsiteX11" fmla="*/ 683670 w 3472060"/>
+              <a:gd name="connsiteY11" fmla="*/ 665256 h 825932"/>
+              <a:gd name="connsiteX12" fmla="*/ 787206 w 3472060"/>
+              <a:gd name="connsiteY12" fmla="*/ 649587 h 825932"/>
+              <a:gd name="connsiteX13" fmla="*/ 892019 w 3472060"/>
+              <a:gd name="connsiteY13" fmla="*/ 632968 h 825932"/>
+              <a:gd name="connsiteX14" fmla="*/ 997620 w 3472060"/>
+              <a:gd name="connsiteY14" fmla="*/ 614667 h 825932"/>
+              <a:gd name="connsiteX15" fmla="*/ 1104727 w 3472060"/>
+              <a:gd name="connsiteY15" fmla="*/ 596741 h 825932"/>
+              <a:gd name="connsiteX16" fmla="*/ 1212669 w 3472060"/>
+              <a:gd name="connsiteY16" fmla="*/ 577397 h 825932"/>
+              <a:gd name="connsiteX17" fmla="*/ 1321506 w 3472060"/>
+              <a:gd name="connsiteY17" fmla="*/ 556988 h 825932"/>
+              <a:gd name="connsiteX18" fmla="*/ 1430709 w 3472060"/>
+              <a:gd name="connsiteY18" fmla="*/ 536607 h 825932"/>
+              <a:gd name="connsiteX19" fmla="*/ 1541050 w 3472060"/>
+              <a:gd name="connsiteY19" fmla="*/ 514481 h 825932"/>
+              <a:gd name="connsiteX20" fmla="*/ 1652805 w 3472060"/>
+              <a:gd name="connsiteY20" fmla="*/ 492202 h 825932"/>
+              <a:gd name="connsiteX21" fmla="*/ 1763708 w 3472060"/>
+              <a:gd name="connsiteY21" fmla="*/ 469161 h 825932"/>
+              <a:gd name="connsiteX22" fmla="*/ 1875795 w 3472060"/>
+              <a:gd name="connsiteY22" fmla="*/ 444641 h 825932"/>
+              <a:gd name="connsiteX23" fmla="*/ 1989128 w 3472060"/>
+              <a:gd name="connsiteY23" fmla="*/ 418995 h 825932"/>
+              <a:gd name="connsiteX24" fmla="*/ 2102476 w 3472060"/>
+              <a:gd name="connsiteY24" fmla="*/ 393438 h 825932"/>
+              <a:gd name="connsiteX25" fmla="*/ 2215549 w 3472060"/>
+              <a:gd name="connsiteY25" fmla="*/ 366291 h 825932"/>
+              <a:gd name="connsiteX26" fmla="*/ 2330490 w 3472060"/>
+              <a:gd name="connsiteY26" fmla="*/ 337455 h 825932"/>
+              <a:gd name="connsiteX27" fmla="*/ 2443333 w 3472060"/>
+              <a:gd name="connsiteY27" fmla="*/ 308983 h 825932"/>
+              <a:gd name="connsiteX28" fmla="*/ 2558014 w 3472060"/>
+              <a:gd name="connsiteY28" fmla="*/ 278646 h 825932"/>
+              <a:gd name="connsiteX29" fmla="*/ 2673621 w 3472060"/>
+              <a:gd name="connsiteY29" fmla="*/ 247421 h 825932"/>
+              <a:gd name="connsiteX30" fmla="*/ 2787008 w 3472060"/>
+              <a:gd name="connsiteY30" fmla="*/ 215853 h 825932"/>
+              <a:gd name="connsiteX31" fmla="*/ 2901442 w 3472060"/>
+              <a:gd name="connsiteY31" fmla="*/ 182011 h 825932"/>
+              <a:gd name="connsiteX32" fmla="*/ 3015722 w 3472060"/>
+              <a:gd name="connsiteY32" fmla="*/ 147286 h 825932"/>
+              <a:gd name="connsiteX33" fmla="*/ 3130018 w 3472060"/>
+              <a:gd name="connsiteY33" fmla="*/ 112649 h 825932"/>
+              <a:gd name="connsiteX34" fmla="*/ 3243551 w 3472060"/>
+              <a:gd name="connsiteY34" fmla="*/ 75688 h 825932"/>
+              <a:gd name="connsiteX35" fmla="*/ 3356992 w 3472060"/>
+              <a:gd name="connsiteY35" fmla="*/ 38197 h 825932"/>
+              <a:gd name="connsiteX36" fmla="*/ 3470310 w 3472060"/>
+              <a:gd name="connsiteY36" fmla="*/ 0 h 825932"/>
+            </a:gdLst>
+            <a:ahLst/>
+            <a:cxnLst>
+              <a:cxn ang="0">
+                <a:pos x="connsiteX0" y="connsiteY0"/>
+              </a:cxn>
+              <a:cxn ang="0">
+                <a:pos x="connsiteX1" y="connsiteY1"/>
+              </a:cxn>
+              <a:cxn ang="0">
+                <a:pos x="connsiteX2" y="connsiteY2"/>
+              </a:cxn>
+              <a:cxn ang="0">
+                <a:pos x="connsiteX3" y="connsiteY3"/>
+              </a:cxn>
+              <a:cxn ang="0">
+                <a:pos x="connsiteX4" y="connsiteY4"/>
+              </a:cxn>
+              <a:cxn ang="0">
+                <a:pos x="connsiteX5" y="connsiteY5"/>
+              </a:cxn>
+              <a:cxn ang="0">
+                <a:pos x="connsiteX6" y="connsiteY6"/>
+              </a:cxn>
+              <a:cxn ang="0">
+                <a:pos x="connsiteX7" y="connsiteY7"/>
+              </a:cxn>
+              <a:cxn ang="0">
+                <a:pos x="connsiteX8" y="connsiteY8"/>
+              </a:cxn>
+              <a:cxn ang="0">
+                <a:pos x="connsiteX9" y="connsiteY9"/>
+              </a:cxn>
+              <a:cxn ang="0">
+                <a:pos x="connsiteX10" y="connsiteY10"/>
+              </a:cxn>
+              <a:cxn ang="0">
+                <a:pos x="connsiteX11" y="connsiteY11"/>
+              </a:cxn>
+              <a:cxn ang="0">
+                <a:pos x="connsiteX12" y="connsiteY12"/>
+              </a:cxn>
+              <a:cxn ang="0">
+                <a:pos x="connsiteX13" y="connsiteY13"/>
+              </a:cxn>
+              <a:cxn ang="0">
+                <a:pos x="connsiteX14" y="connsiteY14"/>
+              </a:cxn>
+              <a:cxn ang="0">
+                <a:pos x="connsiteX15" y="connsiteY15"/>
+              </a:cxn>
+              <a:cxn ang="0">
+                <a:pos x="connsiteX16" y="connsiteY16"/>
+              </a:cxn>
+              <a:cxn ang="0">
+                <a:pos x="connsiteX17" y="connsiteY17"/>
+              </a:cxn>
+              <a:cxn ang="0">
+                <a:pos x="connsiteX18" y="connsiteY18"/>
+              </a:cxn>
+              <a:cxn ang="0">
+                <a:pos x="connsiteX19" y="connsiteY19"/>
+              </a:cxn>
+              <a:cxn ang="0">
+                <a:pos x="connsiteX20" y="connsiteY20"/>
+              </a:cxn>
+              <a:cxn ang="0">
+                <a:pos x="connsiteX21" y="connsiteY21"/>
+              </a:cxn>
+              <a:cxn ang="0">
+                <a:pos x="connsiteX22" y="connsiteY22"/>
+              </a:cxn>
+              <a:cxn ang="0">
+                <a:pos x="connsiteX23" y="connsiteY23"/>
+              </a:cxn>
+              <a:cxn ang="0">
+                <a:pos x="connsiteX24" y="connsiteY24"/>
+              </a:cxn>
+              <a:cxn ang="0">
+                <a:pos x="connsiteX25" y="connsiteY25"/>
+              </a:cxn>
+              <a:cxn ang="0">
+                <a:pos x="connsiteX26" y="connsiteY26"/>
+              </a:cxn>
+              <a:cxn ang="0">
+                <a:pos x="connsiteX27" y="connsiteY27"/>
+              </a:cxn>
+              <a:cxn ang="0">
+                <a:pos x="connsiteX28" y="connsiteY28"/>
+              </a:cxn>
+              <a:cxn ang="0">
+                <a:pos x="connsiteX29" y="connsiteY29"/>
+              </a:cxn>
+              <a:cxn ang="0">
+                <a:pos x="connsiteX30" y="connsiteY30"/>
+              </a:cxn>
+              <a:cxn ang="0">
+                <a:pos x="connsiteX31" y="connsiteY31"/>
+              </a:cxn>
+              <a:cxn ang="0">
+                <a:pos x="connsiteX32" y="connsiteY32"/>
+              </a:cxn>
+              <a:cxn ang="0">
+                <a:pos x="connsiteX33" y="connsiteY33"/>
+              </a:cxn>
+              <a:cxn ang="0">
+                <a:pos x="connsiteX34" y="connsiteY34"/>
+              </a:cxn>
+              <a:cxn ang="0">
+                <a:pos x="connsiteX35" y="connsiteY35"/>
+              </a:cxn>
+              <a:cxn ang="0">
+                <a:pos x="connsiteX36" y="connsiteY36"/>
+              </a:cxn>
+            </a:cxnLst>
+            <a:rect l="l" t="t" r="r" b="b"/>
+            <a:pathLst>
+              <a:path w="3472060" h="825932">
+                <a:moveTo>
+                  <a:pt x="3470310" y="0"/>
+                </a:moveTo>
+                <a:lnTo>
+                  <a:pt x="3472060" y="12850"/>
+                </a:lnTo>
+                <a:lnTo>
+                  <a:pt x="3472060" y="480529"/>
+                </a:lnTo>
+                <a:lnTo>
+                  <a:pt x="3363699" y="498471"/>
+                </a:lnTo>
+                <a:cubicBezTo>
+                  <a:pt x="2435623" y="645518"/>
+                  <a:pt x="603076" y="844866"/>
+                  <a:pt x="42060" y="824486"/>
+                </a:cubicBezTo>
+                <a:cubicBezTo>
+                  <a:pt x="28151" y="802425"/>
+                  <a:pt x="13909" y="780513"/>
+                  <a:pt x="0" y="758452"/>
+                </a:cubicBezTo>
+                <a:lnTo>
+                  <a:pt x="188014" y="735602"/>
+                </a:lnTo>
+                <a:lnTo>
+                  <a:pt x="284087" y="722590"/>
+                </a:lnTo>
+                <a:lnTo>
+                  <a:pt x="382288" y="709392"/>
+                </a:lnTo>
+                <a:lnTo>
+                  <a:pt x="481858" y="695774"/>
+                </a:lnTo>
+                <a:lnTo>
+                  <a:pt x="581897" y="680711"/>
+                </a:lnTo>
+                <a:lnTo>
+                  <a:pt x="683670" y="665256"/>
+                </a:lnTo>
+                <a:lnTo>
+                  <a:pt x="787206" y="649587"/>
+                </a:lnTo>
+                <a:lnTo>
+                  <a:pt x="892019" y="632968"/>
+                </a:lnTo>
+                <a:lnTo>
+                  <a:pt x="997620" y="614667"/>
+                </a:lnTo>
+                <a:lnTo>
+                  <a:pt x="1104727" y="596741"/>
+                </a:lnTo>
+                <a:lnTo>
+                  <a:pt x="1212669" y="577397"/>
+                </a:lnTo>
+                <a:lnTo>
+                  <a:pt x="1321506" y="556988"/>
+                </a:lnTo>
+                <a:lnTo>
+                  <a:pt x="1430709" y="536607"/>
+                </a:lnTo>
+                <a:lnTo>
+                  <a:pt x="1541050" y="514481"/>
+                </a:lnTo>
+                <a:lnTo>
+                  <a:pt x="1652805" y="492202"/>
+                </a:lnTo>
+                <a:lnTo>
+                  <a:pt x="1763708" y="469161"/>
+                </a:lnTo>
+                <a:lnTo>
+                  <a:pt x="1875795" y="444641"/>
+                </a:lnTo>
+                <a:lnTo>
+                  <a:pt x="1989128" y="418995"/>
+                </a:lnTo>
+                <a:lnTo>
+                  <a:pt x="2102476" y="393438"/>
+                </a:lnTo>
+                <a:lnTo>
+                  <a:pt x="2215549" y="366291"/>
+                </a:lnTo>
+                <a:lnTo>
+                  <a:pt x="2330490" y="337455"/>
+                </a:lnTo>
+                <a:lnTo>
+                  <a:pt x="2443333" y="308983"/>
+                </a:lnTo>
+                <a:lnTo>
+                  <a:pt x="2558014" y="278646"/>
+                </a:lnTo>
+                <a:lnTo>
+                  <a:pt x="2673621" y="247421"/>
+                </a:lnTo>
+                <a:lnTo>
+                  <a:pt x="2787008" y="215853"/>
+                </a:lnTo>
+                <a:lnTo>
+                  <a:pt x="2901442" y="182011"/>
+                </a:lnTo>
+                <a:lnTo>
+                  <a:pt x="3015722" y="147286"/>
+                </a:lnTo>
+                <a:lnTo>
+                  <a:pt x="3130018" y="112649"/>
+                </a:lnTo>
+                <a:lnTo>
+                  <a:pt x="3243551" y="75688"/>
+                </a:lnTo>
+                <a:lnTo>
+                  <a:pt x="3356992" y="38197"/>
+                </a:lnTo>
+                <a:lnTo>
+                  <a:pt x="3470310" y="0"/>
+                </a:lnTo>
+                <a:close/>
+              </a:path>
+            </a:pathLst>
+          </a:custGeom>
+          <a:solidFill>
+            <a:schemeClr val="bg1">
+              <a:alpha val="20000"/>
+            </a:schemeClr>
+          </a:solidFill>
           <a:ln>
             <a:noFill/>
           </a:ln>
         </p:spPr>
-        <p:style>
-          <a:lnRef idx="2">
-            <a:schemeClr val="accent1">
-              <a:shade val="50000"/>
-            </a:schemeClr>
-          </a:lnRef>
-          <a:fillRef idx="1003">
-            <a:schemeClr val="dk2"/>
-          </a:fillRef>
-          <a:effectRef idx="0">
-            <a:schemeClr val="accent1"/>
-          </a:effectRef>
-          <a:fontRef idx="minor">
-            <a:schemeClr val="lt1"/>
-          </a:fontRef>
-        </p:style>
         <p:txBody>
           <a:bodyPr rtlCol="0" anchor="ctr"/>
           <a:lstStyle/>
           <a:p>
             <a:pPr algn="ctr"/>
-            <a:endParaRPr lang="en-US"/>
+            <a:endParaRPr lang="en-US">
+              <a:solidFill>
+                <a:schemeClr val="tx1"/>
+              </a:solidFill>
+            </a:endParaRPr>
           </a:p>
         </p:txBody>
       </p:sp>
@@ -29666,19 +29780,19 @@
         </p:nvSpPr>
         <p:spPr>
           <a:xfrm>
-            <a:off x="6143943" y="994410"/>
-            <a:ext cx="2514282" cy="2299880"/>
+            <a:off x="486697" y="471950"/>
+            <a:ext cx="6939116" cy="762490"/>
           </a:xfrm>
         </p:spPr>
         <p:txBody>
-          <a:bodyPr vert="horz" lIns="91440" tIns="45720" rIns="91440" bIns="45720" rtlCol="0" anchor="b">
+          <a:bodyPr vert="horz" lIns="91440" tIns="45720" rIns="91440" bIns="45720" rtlCol="0" anchor="t">
             <a:normAutofit/>
           </a:bodyPr>
           <a:lstStyle/>
           <a:p>
             <a:pPr marL="0" lvl="0" indent="0" defTabSz="457200"/>
             <a:r>
-              <a:rPr lang="de-DE" sz="4100" b="0" i="0" kern="1200" dirty="0">
+              <a:rPr lang="en-US" sz="4200" b="0" i="0" kern="1200">
                 <a:solidFill>
                   <a:srgbClr val="EBEBEB"/>
                 </a:solidFill>
@@ -29691,12 +29805,12 @@
           </a:p>
         </p:txBody>
       </p:sp>
-      <p:sp>
+      <p:sp useBgFill="1">
         <p:nvSpPr>
-          <p:cNvPr id="22" name="Freeform 36">
+          <p:cNvPr id="37" name="Freeform: Shape 36">
             <a:extLst>
               <a:ext uri="{FF2B5EF4-FFF2-40B4-BE49-F238E27FC236}">
-                <a16:creationId xmlns:a16="http://schemas.microsoft.com/office/drawing/2014/main" id="{C24BEC42-AFF3-40D1-93A2-A27A42E1E23C}"/>
+                <a16:creationId xmlns:a16="http://schemas.microsoft.com/office/drawing/2014/main" id="{E02F9158-C4C2-46A8-BE73-A4F77E139FB6}"/>
               </a:ext>
               <a:ext uri="{C183D7F6-B498-43B3-948B-1728B52AA6E4}">
                 <adec:decorative xmlns:adec="http://schemas.microsoft.com/office/drawing/2017/decorative" val="1"/>
@@ -29714,86 +29828,118 @@
             </p:extLst>
           </p:nvPr>
         </p:nvSpPr>
-        <p:spPr>
-          <a:xfrm flipH="1">
-            <a:off x="5597760" y="0"/>
-            <a:ext cx="419604" cy="2782230"/>
+        <p:spPr bwMode="gray">
+          <a:xfrm>
+            <a:off x="0" y="1321550"/>
+            <a:ext cx="9144313" cy="3821950"/>
           </a:xfrm>
           <a:custGeom>
             <a:avLst/>
             <a:gdLst>
-              <a:gd name="connsiteX0" fmla="*/ 0 w 559472"/>
-              <a:gd name="connsiteY0" fmla="*/ 0 h 3709642"/>
-              <a:gd name="connsiteX1" fmla="*/ 473952 w 559472"/>
-              <a:gd name="connsiteY1" fmla="*/ 0 h 3709642"/>
-              <a:gd name="connsiteX2" fmla="*/ 485840 w 559472"/>
-              <a:gd name="connsiteY2" fmla="*/ 161194 h 3709642"/>
-              <a:gd name="connsiteX3" fmla="*/ 523949 w 559472"/>
-              <a:gd name="connsiteY3" fmla="*/ 3672197 h 3709642"/>
-              <a:gd name="connsiteX4" fmla="*/ 454748 w 559472"/>
-              <a:gd name="connsiteY4" fmla="*/ 3709642 h 3709642"/>
-              <a:gd name="connsiteX5" fmla="*/ 448224 w 559472"/>
-              <a:gd name="connsiteY5" fmla="*/ 3510471 h 3709642"/>
-              <a:gd name="connsiteX6" fmla="*/ 443564 w 559472"/>
-              <a:gd name="connsiteY6" fmla="*/ 3408563 h 3709642"/>
-              <a:gd name="connsiteX7" fmla="*/ 438902 w 559472"/>
-              <a:gd name="connsiteY7" fmla="*/ 3304407 h 3709642"/>
-              <a:gd name="connsiteX8" fmla="*/ 433941 w 559472"/>
-              <a:gd name="connsiteY8" fmla="*/ 3198777 h 3709642"/>
-              <a:gd name="connsiteX9" fmla="*/ 427584 w 559472"/>
-              <a:gd name="connsiteY9" fmla="*/ 3092510 h 3709642"/>
-              <a:gd name="connsiteX10" fmla="*/ 420988 w 559472"/>
-              <a:gd name="connsiteY10" fmla="*/ 2984390 h 3709642"/>
-              <a:gd name="connsiteX11" fmla="*/ 414330 w 559472"/>
-              <a:gd name="connsiteY11" fmla="*/ 2874401 h 3709642"/>
-              <a:gd name="connsiteX12" fmla="*/ 406840 w 559472"/>
-              <a:gd name="connsiteY12" fmla="*/ 2762980 h 3709642"/>
-              <a:gd name="connsiteX13" fmla="*/ 397745 w 559472"/>
-              <a:gd name="connsiteY13" fmla="*/ 2650566 h 3709642"/>
-              <a:gd name="connsiteX14" fmla="*/ 389154 w 559472"/>
-              <a:gd name="connsiteY14" fmla="*/ 2536612 h 3709642"/>
-              <a:gd name="connsiteX15" fmla="*/ 379225 w 559472"/>
-              <a:gd name="connsiteY15" fmla="*/ 2421642 h 3709642"/>
-              <a:gd name="connsiteX16" fmla="*/ 368316 w 559472"/>
-              <a:gd name="connsiteY16" fmla="*/ 2305627 h 3709642"/>
-              <a:gd name="connsiteX17" fmla="*/ 357466 w 559472"/>
-              <a:gd name="connsiteY17" fmla="*/ 2189233 h 3709642"/>
-              <a:gd name="connsiteX18" fmla="*/ 344982 w 559472"/>
-              <a:gd name="connsiteY18" fmla="*/ 2071473 h 3709642"/>
-              <a:gd name="connsiteX19" fmla="*/ 332466 w 559472"/>
-              <a:gd name="connsiteY19" fmla="*/ 1952216 h 3709642"/>
-              <a:gd name="connsiteX20" fmla="*/ 319121 w 559472"/>
-              <a:gd name="connsiteY20" fmla="*/ 1833776 h 3709642"/>
-              <a:gd name="connsiteX21" fmla="*/ 304408 w 559472"/>
-              <a:gd name="connsiteY21" fmla="*/ 1713948 h 3709642"/>
-              <a:gd name="connsiteX22" fmla="*/ 288685 w 559472"/>
-              <a:gd name="connsiteY22" fmla="*/ 1592703 h 3709642"/>
-              <a:gd name="connsiteX23" fmla="*/ 273050 w 559472"/>
-              <a:gd name="connsiteY23" fmla="*/ 1471451 h 3709642"/>
-              <a:gd name="connsiteX24" fmla="*/ 255813 w 559472"/>
-              <a:gd name="connsiteY24" fmla="*/ 1350328 h 3709642"/>
-              <a:gd name="connsiteX25" fmla="*/ 237060 w 559472"/>
-              <a:gd name="connsiteY25" fmla="*/ 1227080 h 3709642"/>
-              <a:gd name="connsiteX26" fmla="*/ 218488 w 559472"/>
-              <a:gd name="connsiteY26" fmla="*/ 1106065 h 3709642"/>
-              <a:gd name="connsiteX27" fmla="*/ 198221 w 559472"/>
-              <a:gd name="connsiteY27" fmla="*/ 982940 h 3709642"/>
-              <a:gd name="connsiteX28" fmla="*/ 177152 w 559472"/>
-              <a:gd name="connsiteY28" fmla="*/ 858755 h 3709642"/>
-              <a:gd name="connsiteX29" fmla="*/ 155551 w 559472"/>
-              <a:gd name="connsiteY29" fmla="*/ 736861 h 3709642"/>
-              <a:gd name="connsiteX30" fmla="*/ 131782 w 559472"/>
-              <a:gd name="connsiteY30" fmla="*/ 613645 h 3709642"/>
-              <a:gd name="connsiteX31" fmla="*/ 107123 w 559472"/>
-              <a:gd name="connsiteY31" fmla="*/ 490500 h 3709642"/>
-              <a:gd name="connsiteX32" fmla="*/ 82552 w 559472"/>
-              <a:gd name="connsiteY32" fmla="*/ 367348 h 3709642"/>
-              <a:gd name="connsiteX33" fmla="*/ 55608 w 559472"/>
-              <a:gd name="connsiteY33" fmla="*/ 244762 h 3709642"/>
-              <a:gd name="connsiteX34" fmla="*/ 28130 w 559472"/>
-              <a:gd name="connsiteY34" fmla="*/ 122220 h 3709642"/>
-              <a:gd name="connsiteX35" fmla="*/ 0 w 559472"/>
-              <a:gd name="connsiteY35" fmla="*/ 0 h 3709642"/>
+              <a:gd name="connsiteX0" fmla="*/ 0 w 12192417"/>
+              <a:gd name="connsiteY0" fmla="*/ 0 h 5095933"/>
+              <a:gd name="connsiteX1" fmla="*/ 71931 w 12192417"/>
+              <a:gd name="connsiteY1" fmla="*/ 12261 h 5095933"/>
+              <a:gd name="connsiteX2" fmla="*/ 282848 w 12192417"/>
+              <a:gd name="connsiteY2" fmla="*/ 48343 h 5095933"/>
+              <a:gd name="connsiteX3" fmla="*/ 436463 w 12192417"/>
+              <a:gd name="connsiteY3" fmla="*/ 73565 h 5095933"/>
+              <a:gd name="connsiteX4" fmla="*/ 619338 w 12192417"/>
+              <a:gd name="connsiteY4" fmla="*/ 100188 h 5095933"/>
+              <a:gd name="connsiteX5" fmla="*/ 836350 w 12192417"/>
+              <a:gd name="connsiteY5" fmla="*/ 132066 h 5095933"/>
+              <a:gd name="connsiteX6" fmla="*/ 1076527 w 12192417"/>
+              <a:gd name="connsiteY6" fmla="*/ 165696 h 5095933"/>
+              <a:gd name="connsiteX7" fmla="*/ 1347183 w 12192417"/>
+              <a:gd name="connsiteY7" fmla="*/ 201077 h 5095933"/>
+              <a:gd name="connsiteX8" fmla="*/ 1642222 w 12192417"/>
+              <a:gd name="connsiteY8" fmla="*/ 238560 h 5095933"/>
+              <a:gd name="connsiteX9" fmla="*/ 1962863 w 12192417"/>
+              <a:gd name="connsiteY9" fmla="*/ 276043 h 5095933"/>
+              <a:gd name="connsiteX10" fmla="*/ 2304231 w 12192417"/>
+              <a:gd name="connsiteY10" fmla="*/ 314227 h 5095933"/>
+              <a:gd name="connsiteX11" fmla="*/ 2672420 w 12192417"/>
+              <a:gd name="connsiteY11" fmla="*/ 349608 h 5095933"/>
+              <a:gd name="connsiteX12" fmla="*/ 3057677 w 12192417"/>
+              <a:gd name="connsiteY12" fmla="*/ 383588 h 5095933"/>
+              <a:gd name="connsiteX13" fmla="*/ 3464880 w 12192417"/>
+              <a:gd name="connsiteY13" fmla="*/ 414415 h 5095933"/>
+              <a:gd name="connsiteX14" fmla="*/ 3889151 w 12192417"/>
+              <a:gd name="connsiteY14" fmla="*/ 443841 h 5095933"/>
+              <a:gd name="connsiteX15" fmla="*/ 4331709 w 12192417"/>
+              <a:gd name="connsiteY15" fmla="*/ 471515 h 5095933"/>
+              <a:gd name="connsiteX16" fmla="*/ 4558475 w 12192417"/>
+              <a:gd name="connsiteY16" fmla="*/ 481324 h 5095933"/>
+              <a:gd name="connsiteX17" fmla="*/ 4790117 w 12192417"/>
+              <a:gd name="connsiteY17" fmla="*/ 492183 h 5095933"/>
+              <a:gd name="connsiteX18" fmla="*/ 5025417 w 12192417"/>
+              <a:gd name="connsiteY18" fmla="*/ 502342 h 5095933"/>
+              <a:gd name="connsiteX19" fmla="*/ 5261936 w 12192417"/>
+              <a:gd name="connsiteY19" fmla="*/ 508998 h 5095933"/>
+              <a:gd name="connsiteX20" fmla="*/ 5503331 w 12192417"/>
+              <a:gd name="connsiteY20" fmla="*/ 514953 h 5095933"/>
+              <a:gd name="connsiteX21" fmla="*/ 5747166 w 12192417"/>
+              <a:gd name="connsiteY21" fmla="*/ 521259 h 5095933"/>
+              <a:gd name="connsiteX22" fmla="*/ 5995876 w 12192417"/>
+              <a:gd name="connsiteY22" fmla="*/ 525463 h 5095933"/>
+              <a:gd name="connsiteX23" fmla="*/ 6247025 w 12192417"/>
+              <a:gd name="connsiteY23" fmla="*/ 525463 h 5095933"/>
+              <a:gd name="connsiteX24" fmla="*/ 6500612 w 12192417"/>
+              <a:gd name="connsiteY24" fmla="*/ 527565 h 5095933"/>
+              <a:gd name="connsiteX25" fmla="*/ 6756638 w 12192417"/>
+              <a:gd name="connsiteY25" fmla="*/ 525463 h 5095933"/>
+              <a:gd name="connsiteX26" fmla="*/ 7016321 w 12192417"/>
+              <a:gd name="connsiteY26" fmla="*/ 521259 h 5095933"/>
+              <a:gd name="connsiteX27" fmla="*/ 7276004 w 12192417"/>
+              <a:gd name="connsiteY27" fmla="*/ 517406 h 5095933"/>
+              <a:gd name="connsiteX28" fmla="*/ 7539344 w 12192417"/>
+              <a:gd name="connsiteY28" fmla="*/ 508998 h 5095933"/>
+              <a:gd name="connsiteX29" fmla="*/ 7805123 w 12192417"/>
+              <a:gd name="connsiteY29" fmla="*/ 500241 h 5095933"/>
+              <a:gd name="connsiteX30" fmla="*/ 8070902 w 12192417"/>
+              <a:gd name="connsiteY30" fmla="*/ 490082 h 5095933"/>
+              <a:gd name="connsiteX31" fmla="*/ 8339120 w 12192417"/>
+              <a:gd name="connsiteY31" fmla="*/ 475719 h 5095933"/>
+              <a:gd name="connsiteX32" fmla="*/ 8609775 w 12192417"/>
+              <a:gd name="connsiteY32" fmla="*/ 458554 h 5095933"/>
+              <a:gd name="connsiteX33" fmla="*/ 8881650 w 12192417"/>
+              <a:gd name="connsiteY33" fmla="*/ 442089 h 5095933"/>
+              <a:gd name="connsiteX34" fmla="*/ 9153525 w 12192417"/>
+              <a:gd name="connsiteY34" fmla="*/ 421071 h 5095933"/>
+              <a:gd name="connsiteX35" fmla="*/ 9429057 w 12192417"/>
+              <a:gd name="connsiteY35" fmla="*/ 395849 h 5095933"/>
+              <a:gd name="connsiteX36" fmla="*/ 9700932 w 12192417"/>
+              <a:gd name="connsiteY36" fmla="*/ 370626 h 5095933"/>
+              <a:gd name="connsiteX37" fmla="*/ 9977683 w 12192417"/>
+              <a:gd name="connsiteY37" fmla="*/ 341551 h 5095933"/>
+              <a:gd name="connsiteX38" fmla="*/ 10255654 w 12192417"/>
+              <a:gd name="connsiteY38" fmla="*/ 309673 h 5095933"/>
+              <a:gd name="connsiteX39" fmla="*/ 10529967 w 12192417"/>
+              <a:gd name="connsiteY39" fmla="*/ 276043 h 5095933"/>
+              <a:gd name="connsiteX40" fmla="*/ 10807938 w 12192417"/>
+              <a:gd name="connsiteY40" fmla="*/ 236809 h 5095933"/>
+              <a:gd name="connsiteX41" fmla="*/ 11084689 w 12192417"/>
+              <a:gd name="connsiteY41" fmla="*/ 194772 h 5095933"/>
+              <a:gd name="connsiteX42" fmla="*/ 11362660 w 12192417"/>
+              <a:gd name="connsiteY42" fmla="*/ 153085 h 5095933"/>
+              <a:gd name="connsiteX43" fmla="*/ 11639411 w 12192417"/>
+              <a:gd name="connsiteY43" fmla="*/ 104392 h 5095933"/>
+              <a:gd name="connsiteX44" fmla="*/ 11914944 w 12192417"/>
+              <a:gd name="connsiteY44" fmla="*/ 54648 h 5095933"/>
+              <a:gd name="connsiteX45" fmla="*/ 12191695 w 12192417"/>
+              <a:gd name="connsiteY45" fmla="*/ 2452 h 5095933"/>
+              <a:gd name="connsiteX46" fmla="*/ 12191695 w 12192417"/>
+              <a:gd name="connsiteY46" fmla="*/ 2162231 h 5095933"/>
+              <a:gd name="connsiteX47" fmla="*/ 12192417 w 12192417"/>
+              <a:gd name="connsiteY47" fmla="*/ 2162231 h 5095933"/>
+              <a:gd name="connsiteX48" fmla="*/ 12192417 w 12192417"/>
+              <a:gd name="connsiteY48" fmla="*/ 5095933 h 5095933"/>
+              <a:gd name="connsiteX49" fmla="*/ 0 w 12192417"/>
+              <a:gd name="connsiteY49" fmla="*/ 5095933 h 5095933"/>
+              <a:gd name="connsiteX50" fmla="*/ 0 w 12192417"/>
+              <a:gd name="connsiteY50" fmla="*/ 2791958 h 5095933"/>
+              <a:gd name="connsiteX51" fmla="*/ 0 w 12192417"/>
+              <a:gd name="connsiteY51" fmla="*/ 2162231 h 5095933"/>
             </a:gdLst>
             <a:ahLst/>
             <a:cxnLst>
@@ -29905,597 +30051,213 @@
               <a:cxn ang="0">
                 <a:pos x="connsiteX35" y="connsiteY35"/>
               </a:cxn>
+              <a:cxn ang="0">
+                <a:pos x="connsiteX36" y="connsiteY36"/>
+              </a:cxn>
+              <a:cxn ang="0">
+                <a:pos x="connsiteX37" y="connsiteY37"/>
+              </a:cxn>
+              <a:cxn ang="0">
+                <a:pos x="connsiteX38" y="connsiteY38"/>
+              </a:cxn>
+              <a:cxn ang="0">
+                <a:pos x="connsiteX39" y="connsiteY39"/>
+              </a:cxn>
+              <a:cxn ang="0">
+                <a:pos x="connsiteX40" y="connsiteY40"/>
+              </a:cxn>
+              <a:cxn ang="0">
+                <a:pos x="connsiteX41" y="connsiteY41"/>
+              </a:cxn>
+              <a:cxn ang="0">
+                <a:pos x="connsiteX42" y="connsiteY42"/>
+              </a:cxn>
+              <a:cxn ang="0">
+                <a:pos x="connsiteX43" y="connsiteY43"/>
+              </a:cxn>
+              <a:cxn ang="0">
+                <a:pos x="connsiteX44" y="connsiteY44"/>
+              </a:cxn>
+              <a:cxn ang="0">
+                <a:pos x="connsiteX45" y="connsiteY45"/>
+              </a:cxn>
+              <a:cxn ang="0">
+                <a:pos x="connsiteX46" y="connsiteY46"/>
+              </a:cxn>
+              <a:cxn ang="0">
+                <a:pos x="connsiteX47" y="connsiteY47"/>
+              </a:cxn>
+              <a:cxn ang="0">
+                <a:pos x="connsiteX48" y="connsiteY48"/>
+              </a:cxn>
+              <a:cxn ang="0">
+                <a:pos x="connsiteX49" y="connsiteY49"/>
+              </a:cxn>
+              <a:cxn ang="0">
+                <a:pos x="connsiteX50" y="connsiteY50"/>
+              </a:cxn>
+              <a:cxn ang="0">
+                <a:pos x="connsiteX51" y="connsiteY51"/>
+              </a:cxn>
             </a:cxnLst>
             <a:rect l="l" t="t" r="r" b="b"/>
             <a:pathLst>
-              <a:path w="559472" h="3709642">
+              <a:path w="12192417" h="5095933">
                 <a:moveTo>
                   <a:pt x="0" y="0"/>
                 </a:moveTo>
                 <a:lnTo>
-                  <a:pt x="473952" y="0"/>
-                </a:lnTo>
-                <a:lnTo>
-                  <a:pt x="485840" y="161194"/>
-                </a:lnTo>
-                <a:cubicBezTo>
-                  <a:pt x="552063" y="1147770"/>
-                  <a:pt x="592441" y="3086737"/>
-                  <a:pt x="523949" y="3672197"/>
-                </a:cubicBezTo>
-                <a:cubicBezTo>
-                  <a:pt x="500842" y="3684557"/>
-                  <a:pt x="477855" y="3697282"/>
-                  <a:pt x="454748" y="3709642"/>
-                </a:cubicBezTo>
-                <a:lnTo>
-                  <a:pt x="448224" y="3510471"/>
-                </a:lnTo>
-                <a:lnTo>
-                  <a:pt x="443564" y="3408563"/>
-                </a:lnTo>
-                <a:lnTo>
-                  <a:pt x="438902" y="3304407"/>
-                </a:lnTo>
-                <a:lnTo>
-                  <a:pt x="433941" y="3198777"/>
-                </a:lnTo>
-                <a:lnTo>
-                  <a:pt x="427584" y="3092510"/>
-                </a:lnTo>
-                <a:lnTo>
-                  <a:pt x="420988" y="2984390"/>
-                </a:lnTo>
-                <a:lnTo>
-                  <a:pt x="414330" y="2874401"/>
-                </a:lnTo>
-                <a:lnTo>
-                  <a:pt x="406840" y="2762980"/>
-                </a:lnTo>
-                <a:lnTo>
-                  <a:pt x="397745" y="2650566"/>
-                </a:lnTo>
-                <a:lnTo>
-                  <a:pt x="389154" y="2536612"/>
-                </a:lnTo>
-                <a:lnTo>
-                  <a:pt x="379225" y="2421642"/>
-                </a:lnTo>
-                <a:lnTo>
-                  <a:pt x="368316" y="2305627"/>
-                </a:lnTo>
-                <a:lnTo>
-                  <a:pt x="357466" y="2189233"/>
-                </a:lnTo>
-                <a:lnTo>
-                  <a:pt x="344982" y="2071473"/>
-                </a:lnTo>
-                <a:lnTo>
-                  <a:pt x="332466" y="1952216"/>
-                </a:lnTo>
-                <a:lnTo>
-                  <a:pt x="319121" y="1833776"/>
-                </a:lnTo>
-                <a:lnTo>
-                  <a:pt x="304408" y="1713948"/>
-                </a:lnTo>
-                <a:lnTo>
-                  <a:pt x="288685" y="1592703"/>
-                </a:lnTo>
-                <a:lnTo>
-                  <a:pt x="273050" y="1471451"/>
-                </a:lnTo>
-                <a:lnTo>
-                  <a:pt x="255813" y="1350328"/>
-                </a:lnTo>
-                <a:lnTo>
-                  <a:pt x="237060" y="1227080"/>
-                </a:lnTo>
-                <a:lnTo>
-                  <a:pt x="218488" y="1106065"/>
-                </a:lnTo>
-                <a:lnTo>
-                  <a:pt x="198221" y="982940"/>
-                </a:lnTo>
-                <a:lnTo>
-                  <a:pt x="177152" y="858755"/>
-                </a:lnTo>
-                <a:lnTo>
-                  <a:pt x="155551" y="736861"/>
-                </a:lnTo>
-                <a:lnTo>
-                  <a:pt x="131782" y="613645"/>
-                </a:lnTo>
-                <a:lnTo>
-                  <a:pt x="107123" y="490500"/>
-                </a:lnTo>
-                <a:lnTo>
-                  <a:pt x="82552" y="367348"/>
-                </a:lnTo>
-                <a:lnTo>
-                  <a:pt x="55608" y="244762"/>
-                </a:lnTo>
-                <a:lnTo>
-                  <a:pt x="28130" y="122220"/>
-                </a:lnTo>
-                <a:lnTo>
-                  <a:pt x="0" y="0"/>
-                </a:lnTo>
-                <a:close/>
-              </a:path>
-            </a:pathLst>
-          </a:custGeom>
-          <a:solidFill>
-            <a:schemeClr val="bg1">
-              <a:alpha val="20000"/>
-            </a:schemeClr>
-          </a:solidFill>
-          <a:ln>
-            <a:noFill/>
-          </a:ln>
-        </p:spPr>
-        <p:txBody>
-          <a:bodyPr rtlCol="0" anchor="ctr"/>
-          <a:lstStyle/>
-          <a:p>
-            <a:pPr algn="ctr"/>
-            <a:endParaRPr lang="en-US"/>
-          </a:p>
-        </p:txBody>
-      </p:sp>
-      <p:sp useBgFill="1">
-        <p:nvSpPr>
-          <p:cNvPr id="24" name="Freeform: Shape 23">
-            <a:extLst>
-              <a:ext uri="{FF2B5EF4-FFF2-40B4-BE49-F238E27FC236}">
-                <a16:creationId xmlns:a16="http://schemas.microsoft.com/office/drawing/2014/main" id="{608F427C-1EC9-4280-9367-F2B3AA063E82}"/>
-              </a:ext>
-              <a:ext uri="{C183D7F6-B498-43B3-948B-1728B52AA6E4}">
-                <adec:decorative xmlns:adec="http://schemas.microsoft.com/office/drawing/2017/decorative" val="1"/>
-              </a:ext>
-            </a:extLst>
-          </p:cNvPr>
-          <p:cNvSpPr>
-            <a:spLocks noGrp="1" noRot="1" noChangeAspect="1" noMove="1" noResize="1" noEditPoints="1" noAdjustHandles="1" noChangeArrowheads="1" noChangeShapeType="1" noTextEdit="1"/>
-          </p:cNvSpPr>
-          <p:nvPr>
-            <p:extLst>
-              <p:ext uri="{386F3935-93C4-4BCD-93E2-E3B085C9AB24}">
-                <p16:designElem xmlns:p16="http://schemas.microsoft.com/office/powerpoint/2015/main" val="1"/>
-              </p:ext>
-            </p:extLst>
-          </p:nvPr>
-        </p:nvSpPr>
-        <p:spPr>
-          <a:xfrm>
-            <a:off x="0" y="0"/>
-            <a:ext cx="5857465" cy="5143500"/>
-          </a:xfrm>
-          <a:custGeom>
-            <a:avLst/>
-            <a:gdLst>
-              <a:gd name="connsiteX0" fmla="*/ 6465239 w 7809954"/>
-              <a:gd name="connsiteY0" fmla="*/ 0 h 6858000"/>
-              <a:gd name="connsiteX1" fmla="*/ 7808777 w 7809954"/>
-              <a:gd name="connsiteY1" fmla="*/ 0 h 6858000"/>
-              <a:gd name="connsiteX2" fmla="*/ 7783732 w 7809954"/>
-              <a:gd name="connsiteY2" fmla="*/ 155676 h 6858000"/>
-              <a:gd name="connsiteX3" fmla="*/ 7759863 w 7809954"/>
-              <a:gd name="connsiteY3" fmla="*/ 310667 h 6858000"/>
-              <a:gd name="connsiteX4" fmla="*/ 7736499 w 7809954"/>
-              <a:gd name="connsiteY4" fmla="*/ 466344 h 6858000"/>
-              <a:gd name="connsiteX5" fmla="*/ 7716496 w 7809954"/>
-              <a:gd name="connsiteY5" fmla="*/ 622706 h 6858000"/>
-              <a:gd name="connsiteX6" fmla="*/ 7696325 w 7809954"/>
-              <a:gd name="connsiteY6" fmla="*/ 778383 h 6858000"/>
-              <a:gd name="connsiteX7" fmla="*/ 7677499 w 7809954"/>
-              <a:gd name="connsiteY7" fmla="*/ 934745 h 6858000"/>
-              <a:gd name="connsiteX8" fmla="*/ 7661363 w 7809954"/>
-              <a:gd name="connsiteY8" fmla="*/ 1089050 h 6858000"/>
-              <a:gd name="connsiteX9" fmla="*/ 7646067 w 7809954"/>
-              <a:gd name="connsiteY9" fmla="*/ 1245413 h 6858000"/>
-              <a:gd name="connsiteX10" fmla="*/ 7632115 w 7809954"/>
-              <a:gd name="connsiteY10" fmla="*/ 1401089 h 6858000"/>
-              <a:gd name="connsiteX11" fmla="*/ 7620013 w 7809954"/>
-              <a:gd name="connsiteY11" fmla="*/ 1554023 h 6858000"/>
-              <a:gd name="connsiteX12" fmla="*/ 7607910 w 7809954"/>
-              <a:gd name="connsiteY12" fmla="*/ 1709013 h 6858000"/>
-              <a:gd name="connsiteX13" fmla="*/ 7597825 w 7809954"/>
-              <a:gd name="connsiteY13" fmla="*/ 1861947 h 6858000"/>
-              <a:gd name="connsiteX14" fmla="*/ 7589925 w 7809954"/>
-              <a:gd name="connsiteY14" fmla="*/ 2014880 h 6858000"/>
-              <a:gd name="connsiteX15" fmla="*/ 7581688 w 7809954"/>
-              <a:gd name="connsiteY15" fmla="*/ 2167128 h 6858000"/>
-              <a:gd name="connsiteX16" fmla="*/ 7574797 w 7809954"/>
-              <a:gd name="connsiteY16" fmla="*/ 2318004 h 6858000"/>
-              <a:gd name="connsiteX17" fmla="*/ 7569922 w 7809954"/>
-              <a:gd name="connsiteY17" fmla="*/ 2467508 h 6858000"/>
-              <a:gd name="connsiteX18" fmla="*/ 7565720 w 7809954"/>
-              <a:gd name="connsiteY18" fmla="*/ 2617013 h 6858000"/>
-              <a:gd name="connsiteX19" fmla="*/ 7561686 w 7809954"/>
-              <a:gd name="connsiteY19" fmla="*/ 2765145 h 6858000"/>
-              <a:gd name="connsiteX20" fmla="*/ 7559837 w 7809954"/>
-              <a:gd name="connsiteY20" fmla="*/ 2911221 h 6858000"/>
-              <a:gd name="connsiteX21" fmla="*/ 7557820 w 7809954"/>
-              <a:gd name="connsiteY21" fmla="*/ 3057296 h 6858000"/>
-              <a:gd name="connsiteX22" fmla="*/ 7556811 w 7809954"/>
-              <a:gd name="connsiteY22" fmla="*/ 3201314 h 6858000"/>
-              <a:gd name="connsiteX23" fmla="*/ 7557820 w 7809954"/>
-              <a:gd name="connsiteY23" fmla="*/ 3343960 h 6858000"/>
-              <a:gd name="connsiteX24" fmla="*/ 7557820 w 7809954"/>
-              <a:gd name="connsiteY24" fmla="*/ 3485235 h 6858000"/>
-              <a:gd name="connsiteX25" fmla="*/ 7559837 w 7809954"/>
-              <a:gd name="connsiteY25" fmla="*/ 3625138 h 6858000"/>
-              <a:gd name="connsiteX26" fmla="*/ 7562862 w 7809954"/>
-              <a:gd name="connsiteY26" fmla="*/ 3762298 h 6858000"/>
-              <a:gd name="connsiteX27" fmla="*/ 7565720 w 7809954"/>
-              <a:gd name="connsiteY27" fmla="*/ 3898087 h 6858000"/>
-              <a:gd name="connsiteX28" fmla="*/ 7568914 w 7809954"/>
-              <a:gd name="connsiteY28" fmla="*/ 4031132 h 6858000"/>
-              <a:gd name="connsiteX29" fmla="*/ 7573788 w 7809954"/>
-              <a:gd name="connsiteY29" fmla="*/ 4163491 h 6858000"/>
-              <a:gd name="connsiteX30" fmla="*/ 7578999 w 7809954"/>
-              <a:gd name="connsiteY30" fmla="*/ 4293793 h 6858000"/>
-              <a:gd name="connsiteX31" fmla="*/ 7583705 w 7809954"/>
-              <a:gd name="connsiteY31" fmla="*/ 4421352 h 6858000"/>
-              <a:gd name="connsiteX32" fmla="*/ 7596985 w 7809954"/>
-              <a:gd name="connsiteY32" fmla="*/ 4670298 h 6858000"/>
-              <a:gd name="connsiteX33" fmla="*/ 7611104 w 7809954"/>
-              <a:gd name="connsiteY33" fmla="*/ 4908956 h 6858000"/>
-              <a:gd name="connsiteX34" fmla="*/ 7625896 w 7809954"/>
-              <a:gd name="connsiteY34" fmla="*/ 5138013 h 6858000"/>
-              <a:gd name="connsiteX35" fmla="*/ 7642201 w 7809954"/>
-              <a:gd name="connsiteY35" fmla="*/ 5354726 h 6858000"/>
-              <a:gd name="connsiteX36" fmla="*/ 7659178 w 7809954"/>
-              <a:gd name="connsiteY36" fmla="*/ 5561838 h 6858000"/>
-              <a:gd name="connsiteX37" fmla="*/ 7677499 w 7809954"/>
-              <a:gd name="connsiteY37" fmla="*/ 5753862 h 6858000"/>
-              <a:gd name="connsiteX38" fmla="*/ 7695485 w 7809954"/>
-              <a:gd name="connsiteY38" fmla="*/ 5934227 h 6858000"/>
-              <a:gd name="connsiteX39" fmla="*/ 7713470 w 7809954"/>
-              <a:gd name="connsiteY39" fmla="*/ 6100191 h 6858000"/>
-              <a:gd name="connsiteX40" fmla="*/ 7730447 w 7809954"/>
-              <a:gd name="connsiteY40" fmla="*/ 6252438 h 6858000"/>
-              <a:gd name="connsiteX41" fmla="*/ 7746584 w 7809954"/>
-              <a:gd name="connsiteY41" fmla="*/ 6387541 h 6858000"/>
-              <a:gd name="connsiteX42" fmla="*/ 7761880 w 7809954"/>
-              <a:gd name="connsiteY42" fmla="*/ 6509613 h 6858000"/>
-              <a:gd name="connsiteX43" fmla="*/ 7774655 w 7809954"/>
-              <a:gd name="connsiteY43" fmla="*/ 6612483 h 6858000"/>
-              <a:gd name="connsiteX44" fmla="*/ 7786757 w 7809954"/>
-              <a:gd name="connsiteY44" fmla="*/ 6698894 h 6858000"/>
-              <a:gd name="connsiteX45" fmla="*/ 7804071 w 7809954"/>
-              <a:gd name="connsiteY45" fmla="*/ 6817538 h 6858000"/>
-              <a:gd name="connsiteX46" fmla="*/ 7809954 w 7809954"/>
-              <a:gd name="connsiteY46" fmla="*/ 6858000 h 6858000"/>
-              <a:gd name="connsiteX47" fmla="*/ 7157124 w 7809954"/>
-              <a:gd name="connsiteY47" fmla="*/ 6858000 h 6858000"/>
-              <a:gd name="connsiteX48" fmla="*/ 7157124 w 7809954"/>
-              <a:gd name="connsiteY48" fmla="*/ 6858000 h 6858000"/>
-              <a:gd name="connsiteX49" fmla="*/ 0 w 7809954"/>
-              <a:gd name="connsiteY49" fmla="*/ 6858000 h 6858000"/>
-              <a:gd name="connsiteX50" fmla="*/ 0 w 7809954"/>
-              <a:gd name="connsiteY50" fmla="*/ 0 h 6858000"/>
-              <a:gd name="connsiteX51" fmla="*/ 6465239 w 7809954"/>
-              <a:gd name="connsiteY51" fmla="*/ 0 h 6858000"/>
-            </a:gdLst>
-            <a:ahLst/>
-            <a:cxnLst>
-              <a:cxn ang="0">
-                <a:pos x="connsiteX0" y="connsiteY0"/>
-              </a:cxn>
-              <a:cxn ang="0">
-                <a:pos x="connsiteX1" y="connsiteY1"/>
-              </a:cxn>
-              <a:cxn ang="0">
-                <a:pos x="connsiteX2" y="connsiteY2"/>
-              </a:cxn>
-              <a:cxn ang="0">
-                <a:pos x="connsiteX3" y="connsiteY3"/>
-              </a:cxn>
-              <a:cxn ang="0">
-                <a:pos x="connsiteX4" y="connsiteY4"/>
-              </a:cxn>
-              <a:cxn ang="0">
-                <a:pos x="connsiteX5" y="connsiteY5"/>
-              </a:cxn>
-              <a:cxn ang="0">
-                <a:pos x="connsiteX6" y="connsiteY6"/>
-              </a:cxn>
-              <a:cxn ang="0">
-                <a:pos x="connsiteX7" y="connsiteY7"/>
-              </a:cxn>
-              <a:cxn ang="0">
-                <a:pos x="connsiteX8" y="connsiteY8"/>
-              </a:cxn>
-              <a:cxn ang="0">
-                <a:pos x="connsiteX9" y="connsiteY9"/>
-              </a:cxn>
-              <a:cxn ang="0">
-                <a:pos x="connsiteX10" y="connsiteY10"/>
-              </a:cxn>
-              <a:cxn ang="0">
-                <a:pos x="connsiteX11" y="connsiteY11"/>
-              </a:cxn>
-              <a:cxn ang="0">
-                <a:pos x="connsiteX12" y="connsiteY12"/>
-              </a:cxn>
-              <a:cxn ang="0">
-                <a:pos x="connsiteX13" y="connsiteY13"/>
-              </a:cxn>
-              <a:cxn ang="0">
-                <a:pos x="connsiteX14" y="connsiteY14"/>
-              </a:cxn>
-              <a:cxn ang="0">
-                <a:pos x="connsiteX15" y="connsiteY15"/>
-              </a:cxn>
-              <a:cxn ang="0">
-                <a:pos x="connsiteX16" y="connsiteY16"/>
-              </a:cxn>
-              <a:cxn ang="0">
-                <a:pos x="connsiteX17" y="connsiteY17"/>
-              </a:cxn>
-              <a:cxn ang="0">
-                <a:pos x="connsiteX18" y="connsiteY18"/>
-              </a:cxn>
-              <a:cxn ang="0">
-                <a:pos x="connsiteX19" y="connsiteY19"/>
-              </a:cxn>
-              <a:cxn ang="0">
-                <a:pos x="connsiteX20" y="connsiteY20"/>
-              </a:cxn>
-              <a:cxn ang="0">
-                <a:pos x="connsiteX21" y="connsiteY21"/>
-              </a:cxn>
-              <a:cxn ang="0">
-                <a:pos x="connsiteX22" y="connsiteY22"/>
-              </a:cxn>
-              <a:cxn ang="0">
-                <a:pos x="connsiteX23" y="connsiteY23"/>
-              </a:cxn>
-              <a:cxn ang="0">
-                <a:pos x="connsiteX24" y="connsiteY24"/>
-              </a:cxn>
-              <a:cxn ang="0">
-                <a:pos x="connsiteX25" y="connsiteY25"/>
-              </a:cxn>
-              <a:cxn ang="0">
-                <a:pos x="connsiteX26" y="connsiteY26"/>
-              </a:cxn>
-              <a:cxn ang="0">
-                <a:pos x="connsiteX27" y="connsiteY27"/>
-              </a:cxn>
-              <a:cxn ang="0">
-                <a:pos x="connsiteX28" y="connsiteY28"/>
-              </a:cxn>
-              <a:cxn ang="0">
-                <a:pos x="connsiteX29" y="connsiteY29"/>
-              </a:cxn>
-              <a:cxn ang="0">
-                <a:pos x="connsiteX30" y="connsiteY30"/>
-              </a:cxn>
-              <a:cxn ang="0">
-                <a:pos x="connsiteX31" y="connsiteY31"/>
-              </a:cxn>
-              <a:cxn ang="0">
-                <a:pos x="connsiteX32" y="connsiteY32"/>
-              </a:cxn>
-              <a:cxn ang="0">
-                <a:pos x="connsiteX33" y="connsiteY33"/>
-              </a:cxn>
-              <a:cxn ang="0">
-                <a:pos x="connsiteX34" y="connsiteY34"/>
-              </a:cxn>
-              <a:cxn ang="0">
-                <a:pos x="connsiteX35" y="connsiteY35"/>
-              </a:cxn>
-              <a:cxn ang="0">
-                <a:pos x="connsiteX36" y="connsiteY36"/>
-              </a:cxn>
-              <a:cxn ang="0">
-                <a:pos x="connsiteX37" y="connsiteY37"/>
-              </a:cxn>
-              <a:cxn ang="0">
-                <a:pos x="connsiteX38" y="connsiteY38"/>
-              </a:cxn>
-              <a:cxn ang="0">
-                <a:pos x="connsiteX39" y="connsiteY39"/>
-              </a:cxn>
-              <a:cxn ang="0">
-                <a:pos x="connsiteX40" y="connsiteY40"/>
-              </a:cxn>
-              <a:cxn ang="0">
-                <a:pos x="connsiteX41" y="connsiteY41"/>
-              </a:cxn>
-              <a:cxn ang="0">
-                <a:pos x="connsiteX42" y="connsiteY42"/>
-              </a:cxn>
-              <a:cxn ang="0">
-                <a:pos x="connsiteX43" y="connsiteY43"/>
-              </a:cxn>
-              <a:cxn ang="0">
-                <a:pos x="connsiteX44" y="connsiteY44"/>
-              </a:cxn>
-              <a:cxn ang="0">
-                <a:pos x="connsiteX45" y="connsiteY45"/>
-              </a:cxn>
-              <a:cxn ang="0">
-                <a:pos x="connsiteX46" y="connsiteY46"/>
-              </a:cxn>
-              <a:cxn ang="0">
-                <a:pos x="connsiteX47" y="connsiteY47"/>
-              </a:cxn>
-              <a:cxn ang="0">
-                <a:pos x="connsiteX48" y="connsiteY48"/>
-              </a:cxn>
-              <a:cxn ang="0">
-                <a:pos x="connsiteX49" y="connsiteY49"/>
-              </a:cxn>
-              <a:cxn ang="0">
-                <a:pos x="connsiteX50" y="connsiteY50"/>
-              </a:cxn>
-              <a:cxn ang="0">
-                <a:pos x="connsiteX51" y="connsiteY51"/>
-              </a:cxn>
-            </a:cxnLst>
-            <a:rect l="l" t="t" r="r" b="b"/>
-            <a:pathLst>
-              <a:path w="7809954" h="6858000">
-                <a:moveTo>
-                  <a:pt x="6465239" y="0"/>
-                </a:moveTo>
-                <a:lnTo>
-                  <a:pt x="7808777" y="0"/>
-                </a:lnTo>
-                <a:lnTo>
-                  <a:pt x="7783732" y="155676"/>
-                </a:lnTo>
-                <a:lnTo>
-                  <a:pt x="7759863" y="310667"/>
-                </a:lnTo>
-                <a:lnTo>
-                  <a:pt x="7736499" y="466344"/>
-                </a:lnTo>
-                <a:lnTo>
-                  <a:pt x="7716496" y="622706"/>
-                </a:lnTo>
-                <a:lnTo>
-                  <a:pt x="7696325" y="778383"/>
-                </a:lnTo>
-                <a:lnTo>
-                  <a:pt x="7677499" y="934745"/>
-                </a:lnTo>
-                <a:lnTo>
-                  <a:pt x="7661363" y="1089050"/>
-                </a:lnTo>
-                <a:lnTo>
-                  <a:pt x="7646067" y="1245413"/>
-                </a:lnTo>
-                <a:lnTo>
-                  <a:pt x="7632115" y="1401089"/>
-                </a:lnTo>
-                <a:lnTo>
-                  <a:pt x="7620013" y="1554023"/>
-                </a:lnTo>
-                <a:lnTo>
-                  <a:pt x="7607910" y="1709013"/>
-                </a:lnTo>
-                <a:lnTo>
-                  <a:pt x="7597825" y="1861947"/>
-                </a:lnTo>
-                <a:lnTo>
-                  <a:pt x="7589925" y="2014880"/>
-                </a:lnTo>
-                <a:lnTo>
-                  <a:pt x="7581688" y="2167128"/>
-                </a:lnTo>
-                <a:lnTo>
-                  <a:pt x="7574797" y="2318004"/>
-                </a:lnTo>
-                <a:lnTo>
-                  <a:pt x="7569922" y="2467508"/>
-                </a:lnTo>
-                <a:lnTo>
-                  <a:pt x="7565720" y="2617013"/>
-                </a:lnTo>
-                <a:lnTo>
-                  <a:pt x="7561686" y="2765145"/>
-                </a:lnTo>
-                <a:lnTo>
-                  <a:pt x="7559837" y="2911221"/>
-                </a:lnTo>
-                <a:lnTo>
-                  <a:pt x="7557820" y="3057296"/>
-                </a:lnTo>
-                <a:lnTo>
-                  <a:pt x="7556811" y="3201314"/>
-                </a:lnTo>
-                <a:lnTo>
-                  <a:pt x="7557820" y="3343960"/>
-                </a:lnTo>
-                <a:lnTo>
-                  <a:pt x="7557820" y="3485235"/>
-                </a:lnTo>
-                <a:lnTo>
-                  <a:pt x="7559837" y="3625138"/>
-                </a:lnTo>
-                <a:lnTo>
-                  <a:pt x="7562862" y="3762298"/>
-                </a:lnTo>
-                <a:lnTo>
-                  <a:pt x="7565720" y="3898087"/>
-                </a:lnTo>
-                <a:lnTo>
-                  <a:pt x="7568914" y="4031132"/>
-                </a:lnTo>
-                <a:lnTo>
-                  <a:pt x="7573788" y="4163491"/>
-                </a:lnTo>
-                <a:lnTo>
-                  <a:pt x="7578999" y="4293793"/>
-                </a:lnTo>
-                <a:lnTo>
-                  <a:pt x="7583705" y="4421352"/>
-                </a:lnTo>
-                <a:lnTo>
-                  <a:pt x="7596985" y="4670298"/>
-                </a:lnTo>
-                <a:lnTo>
-                  <a:pt x="7611104" y="4908956"/>
-                </a:lnTo>
-                <a:lnTo>
-                  <a:pt x="7625896" y="5138013"/>
-                </a:lnTo>
-                <a:lnTo>
-                  <a:pt x="7642201" y="5354726"/>
-                </a:lnTo>
-                <a:lnTo>
-                  <a:pt x="7659178" y="5561838"/>
-                </a:lnTo>
-                <a:lnTo>
-                  <a:pt x="7677499" y="5753862"/>
-                </a:lnTo>
-                <a:lnTo>
-                  <a:pt x="7695485" y="5934227"/>
-                </a:lnTo>
-                <a:lnTo>
-                  <a:pt x="7713470" y="6100191"/>
-                </a:lnTo>
-                <a:lnTo>
-                  <a:pt x="7730447" y="6252438"/>
-                </a:lnTo>
-                <a:lnTo>
-                  <a:pt x="7746584" y="6387541"/>
-                </a:lnTo>
-                <a:lnTo>
-                  <a:pt x="7761880" y="6509613"/>
-                </a:lnTo>
-                <a:lnTo>
-                  <a:pt x="7774655" y="6612483"/>
-                </a:lnTo>
-                <a:lnTo>
-                  <a:pt x="7786757" y="6698894"/>
-                </a:lnTo>
-                <a:lnTo>
-                  <a:pt x="7804071" y="6817538"/>
-                </a:lnTo>
-                <a:lnTo>
-                  <a:pt x="7809954" y="6858000"/>
-                </a:lnTo>
-                <a:lnTo>
-                  <a:pt x="7157124" y="6858000"/>
-                </a:lnTo>
-                <a:lnTo>
-                  <a:pt x="7157124" y="6858000"/>
-                </a:lnTo>
-                <a:lnTo>
-                  <a:pt x="0" y="6858000"/>
-                </a:lnTo>
-                <a:lnTo>
-                  <a:pt x="0" y="0"/>
-                </a:lnTo>
-                <a:lnTo>
-                  <a:pt x="6465239" y="0"/>
+                  <a:pt x="71931" y="12261"/>
+                </a:lnTo>
+                <a:lnTo>
+                  <a:pt x="282848" y="48343"/>
+                </a:lnTo>
+                <a:lnTo>
+                  <a:pt x="436463" y="73565"/>
+                </a:lnTo>
+                <a:lnTo>
+                  <a:pt x="619338" y="100188"/>
+                </a:lnTo>
+                <a:lnTo>
+                  <a:pt x="836350" y="132066"/>
+                </a:lnTo>
+                <a:lnTo>
+                  <a:pt x="1076527" y="165696"/>
+                </a:lnTo>
+                <a:lnTo>
+                  <a:pt x="1347183" y="201077"/>
+                </a:lnTo>
+                <a:lnTo>
+                  <a:pt x="1642222" y="238560"/>
+                </a:lnTo>
+                <a:lnTo>
+                  <a:pt x="1962863" y="276043"/>
+                </a:lnTo>
+                <a:lnTo>
+                  <a:pt x="2304231" y="314227"/>
+                </a:lnTo>
+                <a:lnTo>
+                  <a:pt x="2672420" y="349608"/>
+                </a:lnTo>
+                <a:lnTo>
+                  <a:pt x="3057677" y="383588"/>
+                </a:lnTo>
+                <a:lnTo>
+                  <a:pt x="3464880" y="414415"/>
+                </a:lnTo>
+                <a:lnTo>
+                  <a:pt x="3889151" y="443841"/>
+                </a:lnTo>
+                <a:lnTo>
+                  <a:pt x="4331709" y="471515"/>
+                </a:lnTo>
+                <a:lnTo>
+                  <a:pt x="4558475" y="481324"/>
+                </a:lnTo>
+                <a:lnTo>
+                  <a:pt x="4790117" y="492183"/>
+                </a:lnTo>
+                <a:lnTo>
+                  <a:pt x="5025417" y="502342"/>
+                </a:lnTo>
+                <a:lnTo>
+                  <a:pt x="5261936" y="508998"/>
+                </a:lnTo>
+                <a:lnTo>
+                  <a:pt x="5503331" y="514953"/>
+                </a:lnTo>
+                <a:lnTo>
+                  <a:pt x="5747166" y="521259"/>
+                </a:lnTo>
+                <a:lnTo>
+                  <a:pt x="5995876" y="525463"/>
+                </a:lnTo>
+                <a:lnTo>
+                  <a:pt x="6247025" y="525463"/>
+                </a:lnTo>
+                <a:lnTo>
+                  <a:pt x="6500612" y="527565"/>
+                </a:lnTo>
+                <a:lnTo>
+                  <a:pt x="6756638" y="525463"/>
+                </a:lnTo>
+                <a:lnTo>
+                  <a:pt x="7016321" y="521259"/>
+                </a:lnTo>
+                <a:lnTo>
+                  <a:pt x="7276004" y="517406"/>
+                </a:lnTo>
+                <a:lnTo>
+                  <a:pt x="7539344" y="508998"/>
+                </a:lnTo>
+                <a:lnTo>
+                  <a:pt x="7805123" y="500241"/>
+                </a:lnTo>
+                <a:lnTo>
+                  <a:pt x="8070902" y="490082"/>
+                </a:lnTo>
+                <a:lnTo>
+                  <a:pt x="8339120" y="475719"/>
+                </a:lnTo>
+                <a:lnTo>
+                  <a:pt x="8609775" y="458554"/>
+                </a:lnTo>
+                <a:lnTo>
+                  <a:pt x="8881650" y="442089"/>
+                </a:lnTo>
+                <a:lnTo>
+                  <a:pt x="9153525" y="421071"/>
+                </a:lnTo>
+                <a:lnTo>
+                  <a:pt x="9429057" y="395849"/>
+                </a:lnTo>
+                <a:lnTo>
+                  <a:pt x="9700932" y="370626"/>
+                </a:lnTo>
+                <a:lnTo>
+                  <a:pt x="9977683" y="341551"/>
+                </a:lnTo>
+                <a:lnTo>
+                  <a:pt x="10255654" y="309673"/>
+                </a:lnTo>
+                <a:lnTo>
+                  <a:pt x="10529967" y="276043"/>
+                </a:lnTo>
+                <a:lnTo>
+                  <a:pt x="10807938" y="236809"/>
+                </a:lnTo>
+                <a:lnTo>
+                  <a:pt x="11084689" y="194772"/>
+                </a:lnTo>
+                <a:lnTo>
+                  <a:pt x="11362660" y="153085"/>
+                </a:lnTo>
+                <a:lnTo>
+                  <a:pt x="11639411" y="104392"/>
+                </a:lnTo>
+                <a:lnTo>
+                  <a:pt x="11914944" y="54648"/>
+                </a:lnTo>
+                <a:lnTo>
+                  <a:pt x="12191695" y="2452"/>
+                </a:lnTo>
+                <a:lnTo>
+                  <a:pt x="12191695" y="2162231"/>
+                </a:lnTo>
+                <a:lnTo>
+                  <a:pt x="12192417" y="2162231"/>
+                </a:lnTo>
+                <a:lnTo>
+                  <a:pt x="12192417" y="5095933"/>
+                </a:lnTo>
+                <a:lnTo>
+                  <a:pt x="0" y="5095933"/>
+                </a:lnTo>
+                <a:lnTo>
+                  <a:pt x="0" y="2791958"/>
+                </a:lnTo>
+                <a:lnTo>
+                  <a:pt x="0" y="2162231"/>
                 </a:lnTo>
                 <a:close/>
               </a:path>
@@ -30505,109 +30267,34 @@
             <a:noFill/>
           </a:ln>
         </p:spPr>
-        <p:style>
-          <a:lnRef idx="2">
-            <a:schemeClr val="accent1">
-              <a:shade val="50000"/>
-            </a:schemeClr>
-          </a:lnRef>
-          <a:fillRef idx="1">
-            <a:schemeClr val="accent1"/>
-          </a:fillRef>
-          <a:effectRef idx="0">
-            <a:schemeClr val="accent1"/>
-          </a:effectRef>
-          <a:fontRef idx="minor">
-            <a:schemeClr val="lt1"/>
-          </a:fontRef>
-        </p:style>
-        <p:txBody>
-          <a:bodyPr wrap="square" rtlCol="0" anchor="ctr">
-            <a:noAutofit/>
-          </a:bodyPr>
-          <a:lstStyle/>
-          <a:p>
-            <a:pPr algn="ctr"/>
-            <a:endParaRPr lang="en-US"/>
-          </a:p>
-        </p:txBody>
       </p:sp>
-      <p:sp>
-        <p:nvSpPr>
-          <p:cNvPr id="26" name="Rectangle 25">
+      <p:pic>
+        <p:nvPicPr>
+          <p:cNvPr id="7" name="Grafik 6">
             <a:extLst>
               <a:ext uri="{FF2B5EF4-FFF2-40B4-BE49-F238E27FC236}">
-                <a16:creationId xmlns:a16="http://schemas.microsoft.com/office/drawing/2014/main" id="{F98810A7-E114-447A-A7D6-69B27CFB5650}"/>
-              </a:ext>
-              <a:ext uri="{C183D7F6-B498-43B3-948B-1728B52AA6E4}">
-                <adec:decorative xmlns:adec="http://schemas.microsoft.com/office/drawing/2017/decorative" val="1"/>
+                <a16:creationId xmlns:a16="http://schemas.microsoft.com/office/drawing/2014/main" id="{C2BE78BD-6907-4CE2-45E1-9B0D6D7A72EA}"/>
               </a:ext>
             </a:extLst>
           </p:cNvPr>
-          <p:cNvSpPr>
-            <a:spLocks noGrp="1" noRot="1" noChangeAspect="1" noMove="1" noResize="1" noEditPoints="1" noAdjustHandles="1" noChangeArrowheads="1" noChangeShapeType="1" noTextEdit="1"/>
-          </p:cNvSpPr>
-          <p:nvPr>
-            <p:extLst>
-              <p:ext uri="{386F3935-93C4-4BCD-93E2-E3B085C9AB24}">
-                <p16:designElem xmlns:p16="http://schemas.microsoft.com/office/powerpoint/2015/main" val="1"/>
-              </p:ext>
-            </p:extLst>
-          </p:nvPr>
-        </p:nvSpPr>
+          <p:cNvPicPr>
+            <a:picLocks noChangeAspect="1"/>
+          </p:cNvPicPr>
+          <p:nvPr/>
+        </p:nvPicPr>
+        <p:blipFill rotWithShape="1">
+          <a:blip r:embed="rId3"/>
+          <a:srcRect b="6365"/>
+          <a:stretch/>
+        </p:blipFill>
         <p:spPr>
           <a:xfrm>
-            <a:off x="7828359" y="0"/>
-            <a:ext cx="514350" cy="857250"/>
+            <a:off x="937172" y="1763537"/>
+            <a:ext cx="7269656" cy="3335405"/>
           </a:xfrm>
           <a:prstGeom prst="rect">
             <a:avLst/>
           </a:prstGeom>
-          <a:solidFill>
-            <a:schemeClr val="accent1"/>
-          </a:solidFill>
-          <a:ln>
-            <a:noFill/>
-          </a:ln>
-        </p:spPr>
-        <p:style>
-          <a:lnRef idx="1">
-            <a:schemeClr val="accent1"/>
-          </a:lnRef>
-          <a:fillRef idx="3">
-            <a:schemeClr val="accent1"/>
-          </a:fillRef>
-          <a:effectRef idx="2">
-            <a:schemeClr val="accent1"/>
-          </a:effectRef>
-          <a:fontRef idx="minor">
-            <a:schemeClr val="lt1"/>
-          </a:fontRef>
-        </p:style>
-      </p:sp>
-      <p:pic>
-        <p:nvPicPr>
-          <p:cNvPr id="3" name="Picture 1" descr="presentation_files/figure-pptx/visualize_model-1.png"/>
-          <p:cNvPicPr>
-            <a:picLocks noGrp="1" noChangeAspect="1"/>
-          </p:cNvPicPr>
-          <p:nvPr/>
-        </p:nvPicPr>
-        <p:blipFill>
-          <a:blip r:embed="rId7"/>
-          <a:stretch>
-            <a:fillRect/>
-          </a:stretch>
-        </p:blipFill>
-        <p:spPr bwMode="auto">
-          <a:xfrm>
-            <a:off x="482890" y="690376"/>
-            <a:ext cx="4702997" cy="3762398"/>
-          </a:xfrm>
-          <a:prstGeom prst="rect">
-            <a:avLst/>
-          </a:prstGeom>
-          <a:noFill/>
           <a:effectLst/>
         </p:spPr>
       </p:pic>
@@ -30625,26 +30312,56 @@
         </p:nvSpPr>
         <p:spPr>
           <a:xfrm>
-            <a:off x="7851259" y="476109"/>
-            <a:ext cx="514350" cy="369332"/>
+            <a:off x="7869844" y="451463"/>
+            <a:ext cx="670584" cy="405787"/>
           </a:xfrm>
           <a:prstGeom prst="rect">
             <a:avLst/>
           </a:prstGeom>
-          <a:noFill/>
         </p:spPr>
         <p:txBody>
-          <a:bodyPr wrap="square">
-            <a:spAutoFit/>
+          <a:bodyPr vert="horz" lIns="91440" tIns="45720" rIns="91440" bIns="45720" rtlCol="0">
+            <a:normAutofit/>
           </a:bodyPr>
           <a:lstStyle/>
           <a:p>
+            <a:pPr>
+              <a:spcBef>
+                <a:spcPts val="1000"/>
+              </a:spcBef>
+              <a:buClr>
+                <a:schemeClr val="bg2">
+                  <a:lumMod val="40000"/>
+                  <a:lumOff val="60000"/>
+                </a:schemeClr>
+              </a:buClr>
+              <a:buSzPct val="80000"/>
+            </a:pPr>
             <a:fld id="{C5EF2332-01BF-834F-8236-50238282D533}" type="slidenum">
-              <a:rPr lang="en-US" smtClean="0"/>
-              <a:pPr/>
+              <a:rPr lang="en-US" dirty="0">
+                <a:latin typeface="+mj-lt"/>
+                <a:ea typeface="+mj-ea"/>
+                <a:cs typeface="+mj-cs"/>
+              </a:rPr>
+              <a:pPr>
+                <a:spcBef>
+                  <a:spcPts val="1000"/>
+                </a:spcBef>
+                <a:buClr>
+                  <a:schemeClr val="bg2">
+                    <a:lumMod val="40000"/>
+                    <a:lumOff val="60000"/>
+                  </a:schemeClr>
+                </a:buClr>
+                <a:buSzPct val="80000"/>
+              </a:pPr>
               <a:t>21</a:t>
             </a:fld>
-            <a:endParaRPr lang="de-DE" dirty="0"/>
+            <a:endParaRPr lang="en-US" dirty="0">
+              <a:latin typeface="+mj-lt"/>
+              <a:ea typeface="+mj-ea"/>
+              <a:cs typeface="+mj-cs"/>
+            </a:endParaRPr>
           </a:p>
         </p:txBody>
       </p:sp>

</xml_diff>